<commit_message>
Sofi TMDB Api project User Guide is updated
</commit_message>
<xml_diff>
--- a/SoFi TMDB Api Project User Guide.pptx
+++ b/SoFi TMDB Api Project User Guide.pptx
@@ -6,18 +6,13 @@
     <p:sldMasterId id="2147483660" r:id="rId2"/>
   </p:sldMasterIdLst>
   <p:notesMasterIdLst>
-    <p:notesMasterId r:id="rId12"/>
+    <p:notesMasterId r:id="rId7"/>
   </p:notesMasterIdLst>
   <p:sldIdLst>
-    <p:sldId id="256" r:id="rId3"/>
-    <p:sldId id="257" r:id="rId4"/>
+    <p:sldId id="257" r:id="rId3"/>
+    <p:sldId id="256" r:id="rId4"/>
     <p:sldId id="264" r:id="rId5"/>
     <p:sldId id="258" r:id="rId6"/>
-    <p:sldId id="259" r:id="rId7"/>
-    <p:sldId id="260" r:id="rId8"/>
-    <p:sldId id="261" r:id="rId9"/>
-    <p:sldId id="262" r:id="rId10"/>
-    <p:sldId id="263" r:id="rId11"/>
   </p:sldIdLst>
   <p:sldSz cx="12192000" cy="6858000"/>
   <p:notesSz cx="6858000" cy="9144000"/>
@@ -519,7 +514,7 @@
           <a:p>
             <a:r>
               <a:rPr lang="en-US" dirty="0"/>
-              <a:t>QuickStarter has created an outline to help you get started on your presentation. Some slides include information here in the notes to provide additional topics for you to research.</a:t>
+              <a:t>Author : Arpan Saini</a:t>
             </a:r>
           </a:p>
           <a:p>
@@ -553,7 +548,7 @@
     </p:spTree>
     <p:extLst>
       <p:ext uri="{BB962C8B-B14F-4D97-AF65-F5344CB8AC3E}">
-        <p14:creationId xmlns:p14="http://schemas.microsoft.com/office/powerpoint/2010/main" val="623619605"/>
+        <p14:creationId xmlns:p14="http://schemas.microsoft.com/office/powerpoint/2010/main" val="1602745319"/>
       </p:ext>
     </p:extLst>
   </p:cSld>
@@ -607,9 +602,14 @@
           <a:bodyPr/>
           <a:lstStyle/>
           <a:p>
+            <a:pPr algn="l"/>
+            <a:r>
+              <a:rPr lang="en-US" b="1" dirty="0"/>
+              <a:t>                                                                                                                                                                                                                                                     Area of Improvement can be seen on next slide</a:t>
+            </a:r>
             <a:r>
               <a:rPr lang="en-US" dirty="0"/>
-              <a:t>Author : Arpan Saini</a:t>
+              <a:t>.</a:t>
             </a:r>
           </a:p>
           <a:p>
@@ -643,7 +643,7 @@
     </p:spTree>
     <p:extLst>
       <p:ext uri="{BB962C8B-B14F-4D97-AF65-F5344CB8AC3E}">
-        <p14:creationId xmlns:p14="http://schemas.microsoft.com/office/powerpoint/2010/main" val="1602745319"/>
+        <p14:creationId xmlns:p14="http://schemas.microsoft.com/office/powerpoint/2010/main" val="623619605"/>
       </p:ext>
     </p:extLst>
   </p:cSld>
@@ -699,17 +699,13 @@
           <a:p>
             <a:r>
               <a:rPr lang="en-US" dirty="0"/>
-              <a:t>Consider talking about:</a:t>
-            </a:r>
-          </a:p>
-          <a:p>
-            <a:pPr marL="171450" indent="-171450">
-              <a:buFont typeface="Arial" panose="020B0604020202020204" pitchFamily="34" charset="0"/>
-              <a:buChar char="•"/>
-            </a:pPr>
+              <a:t>                               Scope of Improvement is not just restricted to the above mentioned points. There are more aspects of improvement like Performance, Configurations with External tools, Using Scripting languages to </a:t>
+            </a:r>
+          </a:p>
+          <a:p>
             <a:r>
               <a:rPr lang="en-US" dirty="0"/>
-              <a:t>Gameplay</a:t>
+              <a:t>                               Make Project More dynamic   etc. </a:t>
             </a:r>
           </a:p>
         </p:txBody>
@@ -731,7 +727,7 @@
           <a:p>
             <a:fld id="{E0746DE6-3336-457D-A091-FA20AC1C536E}" type="slidenum">
               <a:rPr lang="en-US" smtClean="0"/>
-              <a:t>5</a:t>
+              <a:t>3</a:t>
             </a:fld>
             <a:endParaRPr lang="en-US"/>
           </a:p>
@@ -740,7 +736,7 @@
     </p:spTree>
     <p:extLst>
       <p:ext uri="{BB962C8B-B14F-4D97-AF65-F5344CB8AC3E}">
-        <p14:creationId xmlns:p14="http://schemas.microsoft.com/office/powerpoint/2010/main" val="429256918"/>
+        <p14:creationId xmlns:p14="http://schemas.microsoft.com/office/powerpoint/2010/main" val="2706509398"/>
       </p:ext>
     </p:extLst>
   </p:cSld>
@@ -794,20 +790,7 @@
           <a:bodyPr/>
           <a:lstStyle/>
           <a:p>
-            <a:r>
-              <a:rPr lang="en-US" dirty="0"/>
-              <a:t>Consider talking about:</a:t>
-            </a:r>
-          </a:p>
-          <a:p>
-            <a:pPr marL="171450" indent="-171450">
-              <a:buFont typeface="Arial" panose="020B0604020202020204" pitchFamily="34" charset="0"/>
-              <a:buChar char="•"/>
-            </a:pPr>
-            <a:r>
-              <a:rPr lang="en-US" dirty="0"/>
-              <a:t>Critical response</a:t>
-            </a:r>
+            <a:endParaRPr lang="en-US" dirty="0"/>
           </a:p>
         </p:txBody>
       </p:sp>
@@ -828,7 +811,7 @@
           <a:p>
             <a:fld id="{E0746DE6-3336-457D-A091-FA20AC1C536E}" type="slidenum">
               <a:rPr lang="en-US" smtClean="0"/>
-              <a:t>8</a:t>
+              <a:t>4</a:t>
             </a:fld>
             <a:endParaRPr lang="en-US"/>
           </a:p>
@@ -837,7 +820,7 @@
     </p:spTree>
     <p:extLst>
       <p:ext uri="{BB962C8B-B14F-4D97-AF65-F5344CB8AC3E}">
-        <p14:creationId xmlns:p14="http://schemas.microsoft.com/office/powerpoint/2010/main" val="2038096920"/>
+        <p14:creationId xmlns:p14="http://schemas.microsoft.com/office/powerpoint/2010/main" val="2520877606"/>
       </p:ext>
     </p:extLst>
   </p:cSld>
@@ -4471,6 +4454,305 @@
 </file>
 
 <file path=ppt/slides/slide1.xml><?xml version="1.0" encoding="utf-8"?>
+<p:sld xmlns:a="http://schemas.openxmlformats.org/drawingml/2006/main" xmlns:r="http://schemas.openxmlformats.org/officeDocument/2006/relationships" xmlns:p="http://schemas.openxmlformats.org/presentationml/2006/main">
+  <p:cSld>
+    <p:bg>
+      <p:bgPr>
+        <a:solidFill>
+          <a:schemeClr val="bg1">
+            <a:tint val="95000"/>
+            <a:satMod val="170000"/>
+          </a:schemeClr>
+        </a:solidFill>
+        <a:effectLst/>
+      </p:bgPr>
+    </p:bg>
+    <p:spTree>
+      <p:nvGrpSpPr>
+        <p:cNvPr id="1" name=""/>
+        <p:cNvGrpSpPr/>
+        <p:nvPr/>
+      </p:nvGrpSpPr>
+      <p:grpSpPr>
+        <a:xfrm>
+          <a:off x="0" y="0"/>
+          <a:ext cx="0" cy="0"/>
+          <a:chOff x="0" y="0"/>
+          <a:chExt cx="0" cy="0"/>
+        </a:xfrm>
+      </p:grpSpPr>
+      <p:grpSp>
+        <p:nvGrpSpPr>
+          <p:cNvPr id="9" name="Group 8" title="intersecting circles">
+            <a:extLst>
+              <a:ext uri="{FF2B5EF4-FFF2-40B4-BE49-F238E27FC236}">
+                <a16:creationId xmlns:a16="http://schemas.microsoft.com/office/drawing/2014/main" id="{D2C4BFA1-2075-4901-9E24-E41D1FDD51FD}"/>
+              </a:ext>
+            </a:extLst>
+          </p:cNvPr>
+          <p:cNvGrpSpPr>
+            <a:grpSpLocks noGrp="1" noUngrp="1" noRot="1" noChangeAspect="1" noMove="1" noResize="1"/>
+          </p:cNvGrpSpPr>
+          <p:nvPr>
+            <p:extLst>
+              <p:ext uri="{386F3935-93C4-4BCD-93E2-E3B085C9AB24}">
+                <p16:designElem xmlns:p16="http://schemas.microsoft.com/office/powerpoint/2015/main" val="1"/>
+              </p:ext>
+            </p:extLst>
+          </p:nvPr>
+        </p:nvGrpSpPr>
+        <p:grpSpPr>
+          <a:xfrm>
+            <a:off x="1155481" y="498348"/>
+            <a:ext cx="9902663" cy="5861304"/>
+            <a:chOff x="1155481" y="498348"/>
+            <a:chExt cx="9902663" cy="5861304"/>
+          </a:xfrm>
+        </p:grpSpPr>
+        <p:sp>
+          <p:nvSpPr>
+            <p:cNvPr id="10" name="Oval 5">
+              <a:extLst>
+                <a:ext uri="{FF2B5EF4-FFF2-40B4-BE49-F238E27FC236}">
+                  <a16:creationId xmlns:a16="http://schemas.microsoft.com/office/drawing/2014/main" id="{985A7375-E3AF-4F5C-85AE-17E8832952CA}"/>
+                </a:ext>
+              </a:extLst>
+            </p:cNvPr>
+            <p:cNvSpPr>
+              <a:spLocks noChangeArrowheads="1"/>
+            </p:cNvSpPr>
+            <p:nvPr>
+              <p:extLst>
+                <p:ext uri="{386F3935-93C4-4BCD-93E2-E3B085C9AB24}">
+                  <p16:designElem xmlns:p16="http://schemas.microsoft.com/office/powerpoint/2015/main" val="1"/>
+                </p:ext>
+              </p:extLst>
+            </p:nvPr>
+          </p:nvSpPr>
+          <p:spPr bwMode="auto">
+            <a:xfrm>
+              <a:off x="1155481" y="498348"/>
+              <a:ext cx="5861304" cy="5861304"/>
+            </a:xfrm>
+            <a:prstGeom prst="ellipse">
+              <a:avLst/>
+            </a:prstGeom>
+            <a:solidFill>
+              <a:schemeClr val="accent1">
+                <a:alpha val="55000"/>
+              </a:schemeClr>
+            </a:solidFill>
+            <a:ln>
+              <a:noFill/>
+            </a:ln>
+          </p:spPr>
+        </p:sp>
+        <p:sp>
+          <p:nvSpPr>
+            <p:cNvPr id="11" name="Oval 10">
+              <a:extLst>
+                <a:ext uri="{FF2B5EF4-FFF2-40B4-BE49-F238E27FC236}">
+                  <a16:creationId xmlns:a16="http://schemas.microsoft.com/office/drawing/2014/main" id="{F0307F65-8304-4FA8-A841-D4D7625411BE}"/>
+                </a:ext>
+              </a:extLst>
+            </p:cNvPr>
+            <p:cNvSpPr>
+              <a:spLocks noChangeArrowheads="1"/>
+            </p:cNvSpPr>
+            <p:nvPr>
+              <p:extLst>
+                <p:ext uri="{386F3935-93C4-4BCD-93E2-E3B085C9AB24}">
+                  <p16:designElem xmlns:p16="http://schemas.microsoft.com/office/powerpoint/2015/main" val="1"/>
+                </p:ext>
+              </p:extLst>
+            </p:nvPr>
+          </p:nvSpPr>
+          <p:spPr bwMode="auto">
+            <a:xfrm>
+              <a:off x="5196840" y="498348"/>
+              <a:ext cx="5861304" cy="5861304"/>
+            </a:xfrm>
+            <a:prstGeom prst="ellipse">
+              <a:avLst/>
+            </a:prstGeom>
+            <a:solidFill>
+              <a:schemeClr val="accent1">
+                <a:alpha val="55000"/>
+              </a:schemeClr>
+            </a:solidFill>
+            <a:ln>
+              <a:noFill/>
+            </a:ln>
+          </p:spPr>
+        </p:sp>
+        <p:sp>
+          <p:nvSpPr>
+            <p:cNvPr id="12" name="Oval 5">
+              <a:extLst>
+                <a:ext uri="{FF2B5EF4-FFF2-40B4-BE49-F238E27FC236}">
+                  <a16:creationId xmlns:a16="http://schemas.microsoft.com/office/drawing/2014/main" id="{C8B8394C-136F-4E05-A002-D93A5E79CD50}"/>
+                </a:ext>
+              </a:extLst>
+            </p:cNvPr>
+            <p:cNvSpPr>
+              <a:spLocks noChangeArrowheads="1"/>
+            </p:cNvSpPr>
+            <p:nvPr>
+              <p:extLst>
+                <p:ext uri="{386F3935-93C4-4BCD-93E2-E3B085C9AB24}">
+                  <p16:designElem xmlns:p16="http://schemas.microsoft.com/office/powerpoint/2015/main" val="1"/>
+                </p:ext>
+              </p:extLst>
+            </p:nvPr>
+          </p:nvSpPr>
+          <p:spPr bwMode="auto">
+            <a:xfrm>
+              <a:off x="3165348" y="498348"/>
+              <a:ext cx="5861304" cy="5861304"/>
+            </a:xfrm>
+            <a:prstGeom prst="ellipse">
+              <a:avLst/>
+            </a:prstGeom>
+            <a:solidFill>
+              <a:schemeClr val="accent1">
+                <a:alpha val="70000"/>
+              </a:schemeClr>
+            </a:solidFill>
+            <a:ln>
+              <a:noFill/>
+            </a:ln>
+          </p:spPr>
+        </p:sp>
+      </p:grpSp>
+      <p:sp>
+        <p:nvSpPr>
+          <p:cNvPr id="14" name="Rectangle 13" title="ribbon">
+            <a:extLst>
+              <a:ext uri="{FF2B5EF4-FFF2-40B4-BE49-F238E27FC236}">
+                <a16:creationId xmlns:a16="http://schemas.microsoft.com/office/drawing/2014/main" id="{053FB2EE-284F-4C87-AB3D-BBF87A9FAB97}"/>
+              </a:ext>
+            </a:extLst>
+          </p:cNvPr>
+          <p:cNvSpPr>
+            <a:spLocks noGrp="1" noRot="1" noChangeAspect="1" noMove="1" noResize="1" noEditPoints="1" noAdjustHandles="1" noChangeArrowheads="1" noChangeShapeType="1" noTextEdit="1"/>
+          </p:cNvSpPr>
+          <p:nvPr>
+            <p:extLst>
+              <p:ext uri="{386F3935-93C4-4BCD-93E2-E3B085C9AB24}">
+                <p16:designElem xmlns:p16="http://schemas.microsoft.com/office/powerpoint/2015/main" val="1"/>
+              </p:ext>
+            </p:extLst>
+          </p:nvPr>
+        </p:nvSpPr>
+        <p:spPr>
+          <a:xfrm>
+            <a:off x="0" y="2514600"/>
+            <a:ext cx="12192000" cy="1828800"/>
+          </a:xfrm>
+          <a:prstGeom prst="rect">
+            <a:avLst/>
+          </a:prstGeom>
+          <a:solidFill>
+            <a:schemeClr val="tx2"/>
+          </a:solidFill>
+          <a:ln>
+            <a:noFill/>
+          </a:ln>
+        </p:spPr>
+        <p:style>
+          <a:lnRef idx="2">
+            <a:schemeClr val="accent1">
+              <a:shade val="50000"/>
+            </a:schemeClr>
+          </a:lnRef>
+          <a:fillRef idx="1">
+            <a:schemeClr val="accent1"/>
+          </a:fillRef>
+          <a:effectRef idx="0">
+            <a:schemeClr val="accent1"/>
+          </a:effectRef>
+          <a:fontRef idx="minor">
+            <a:schemeClr val="lt1"/>
+          </a:fontRef>
+        </p:style>
+      </p:sp>
+      <p:sp>
+        <p:nvSpPr>
+          <p:cNvPr id="2" name="Title 1"/>
+          <p:cNvSpPr>
+            <a:spLocks noGrp="1"/>
+          </p:cNvSpPr>
+          <p:nvPr>
+            <p:ph type="ctrTitle"/>
+          </p:nvPr>
+        </p:nvSpPr>
+        <p:spPr>
+          <a:xfrm>
+            <a:off x="1524000" y="2776538"/>
+            <a:ext cx="9144000" cy="1381188"/>
+          </a:xfrm>
+        </p:spPr>
+        <p:txBody>
+          <a:bodyPr anchor="ctr">
+            <a:normAutofit/>
+          </a:bodyPr>
+          <a:lstStyle/>
+          <a:p>
+            <a:r>
+              <a:rPr lang="en-US" sz="4000" dirty="0">
+                <a:solidFill>
+                  <a:schemeClr val="bg2"/>
+                </a:solidFill>
+              </a:rPr>
+              <a:t>User Guide</a:t>
+            </a:r>
+          </a:p>
+        </p:txBody>
+      </p:sp>
+      <p:sp>
+        <p:nvSpPr>
+          <p:cNvPr id="3" name="Content Placeholder 2"/>
+          <p:cNvSpPr>
+            <a:spLocks noGrp="1"/>
+          </p:cNvSpPr>
+          <p:nvPr>
+            <p:ph type="subTitle" idx="1"/>
+          </p:nvPr>
+        </p:nvSpPr>
+        <p:spPr>
+          <a:xfrm>
+            <a:off x="1368357" y="1883569"/>
+            <a:ext cx="9144000" cy="762000"/>
+          </a:xfrm>
+        </p:spPr>
+        <p:txBody>
+          <a:bodyPr>
+            <a:normAutofit/>
+          </a:bodyPr>
+          <a:lstStyle/>
+          <a:p>
+            <a:r>
+              <a:rPr lang="en-US" sz="4000" dirty="0"/>
+              <a:t>Sofi TMDB API Project</a:t>
+            </a:r>
+            <a:endParaRPr sz="4000" dirty="0"/>
+          </a:p>
+        </p:txBody>
+      </p:sp>
+    </p:spTree>
+    <p:extLst>
+      <p:ext uri="{BB962C8B-B14F-4D97-AF65-F5344CB8AC3E}">
+        <p14:creationId xmlns:p14="http://schemas.microsoft.com/office/powerpoint/2010/main" val="1530454394"/>
+      </p:ext>
+    </p:extLst>
+  </p:cSld>
+  <p:clrMapOvr>
+    <a:overrideClrMapping bg1="dk1" tx1="lt1" bg2="dk2" tx2="lt2" accent1="accent1" accent2="accent2" accent3="accent3" accent4="accent4" accent5="accent5" accent6="accent6" hlink="hlink" folHlink="folHlink"/>
+  </p:clrMapOvr>
+</p:sld>
+</file>
+
+<file path=ppt/slides/slide2.xml><?xml version="1.0" encoding="utf-8"?>
 <p:sld xmlns:a="http://schemas.openxmlformats.org/drawingml/2006/main" xmlns:r="http://schemas.openxmlformats.org/officeDocument/2006/relationships" xmlns:p="http://schemas.openxmlformats.org/presentationml/2006/main" show="0">
   <p:cSld>
     <p:spTree>
@@ -4528,7 +4810,7 @@
         <p:spPr>
           <a:xfrm>
             <a:off x="838200" y="1461299"/>
-            <a:ext cx="10462846" cy="415498"/>
+            <a:ext cx="10462846" cy="375359"/>
           </a:xfrm>
           <a:prstGeom prst="rect">
             <a:avLst/>
@@ -4554,7 +4836,29 @@
                 <a:ea typeface="Segoe UI Semibold" panose="020B0702040204020203" pitchFamily="34" charset="0"/>
                 <a:cs typeface="Segoe UI" panose="020B0502040204020203" pitchFamily="34" charset="0"/>
               </a:rPr>
-              <a:t>Key facts about your topic</a:t>
+              <a:t>Key facts about </a:t>
+            </a:r>
+            <a:r>
+              <a:rPr lang="en-US" sz="1400" dirty="0" err="1">
+                <a:solidFill>
+                  <a:srgbClr val="D24726"/>
+                </a:solidFill>
+                <a:latin typeface="Segoe UI Semibold" panose="020B0702040204020203" pitchFamily="34" charset="0"/>
+                <a:ea typeface="Segoe UI Semibold" panose="020B0702040204020203" pitchFamily="34" charset="0"/>
+                <a:cs typeface="Segoe UI" panose="020B0502040204020203" pitchFamily="34" charset="0"/>
+              </a:rPr>
+              <a:t>SoFi</a:t>
+            </a:r>
+            <a:r>
+              <a:rPr lang="en-US" sz="1400" dirty="0">
+                <a:solidFill>
+                  <a:srgbClr val="D24726"/>
+                </a:solidFill>
+                <a:latin typeface="Segoe UI Semibold" panose="020B0702040204020203" pitchFamily="34" charset="0"/>
+                <a:ea typeface="Segoe UI Semibold" panose="020B0702040204020203" pitchFamily="34" charset="0"/>
+                <a:cs typeface="Segoe UI" panose="020B0502040204020203" pitchFamily="34" charset="0"/>
+              </a:rPr>
+              <a:t> TMDB API Project</a:t>
             </a:r>
           </a:p>
         </p:txBody>
@@ -4569,8 +4873,8 @@
         </p:nvSpPr>
         <p:spPr>
           <a:xfrm>
-            <a:off x="850250" y="1876798"/>
-            <a:ext cx="5028036" cy="4000000"/>
+            <a:off x="834260" y="1923286"/>
+            <a:ext cx="5028036" cy="3934173"/>
           </a:xfrm>
           <a:prstGeom prst="rect">
             <a:avLst/>
@@ -4581,19 +4885,19 @@
         </p:spPr>
         <p:txBody>
           <a:bodyPr vert="horz" lIns="91440" tIns="45720" rIns="91440" bIns="45720" numCol="1" rtlCol="0" anchor="t">
-            <a:normAutofit/>
+            <a:normAutofit fontScale="77500" lnSpcReduction="20000"/>
           </a:bodyPr>
           <a:lstStyle/>
           <a:p>
-            <a:pPr marL="0" indent="0">
+            <a:pPr marL="285750" indent="-285750">
               <a:lnSpc>
                 <a:spcPct val="150000"/>
               </a:lnSpc>
               <a:spcBef>
                 <a:spcPts val="0"/>
               </a:spcBef>
-              <a:buFont typeface="Arial" panose="020B0604020202020204" pitchFamily="34" charset="0"/>
-              <a:buNone/>
+              <a:buFont typeface="Wingdings" panose="05000000000000000000" pitchFamily="2" charset="2"/>
+              <a:buChar char="Ø"/>
             </a:pPr>
             <a:r>
               <a:rPr lang="en-US" sz="1400" dirty="0">
@@ -4607,7 +4911,238 @@
                 <a:ea typeface="Segoe UI" panose="020B0502040204020203" pitchFamily="34" charset="0"/>
                 <a:cs typeface="Segoe UI Semilight" panose="020B0402040204020203" pitchFamily="34" charset="0"/>
               </a:rPr>
-              <a:t>Project Reality is a series of combined arms tactical first-person shooter video game modifications which aim to create a realistic combat environment where the core gameplay encourages teamwork and coordination. The original version, Project Reality: BF2, was released in 2005 for Battlefield 2, it is still being updated on a regular basis and became a stand-alone game in 2015.</a:t>
+              <a:t>Sofi TMDB API Project is designed using SOAP UI Pro that has configured with GIT/GIT Hub for version management and enable a team of multiple people, Sitting at different locations to work simultaneously on the project.</a:t>
+            </a:r>
+          </a:p>
+          <a:p>
+            <a:pPr marL="285750" indent="-285750">
+              <a:lnSpc>
+                <a:spcPct val="150000"/>
+              </a:lnSpc>
+              <a:spcBef>
+                <a:spcPts val="0"/>
+              </a:spcBef>
+              <a:buFont typeface="Wingdings" panose="05000000000000000000" pitchFamily="2" charset="2"/>
+              <a:buChar char="Ø"/>
+            </a:pPr>
+            <a:r>
+              <a:rPr lang="en-US" sz="1400" dirty="0">
+                <a:solidFill>
+                  <a:schemeClr val="tx1">
+                    <a:lumMod val="65000"/>
+                    <a:lumOff val="35000"/>
+                  </a:schemeClr>
+                </a:solidFill>
+                <a:latin typeface="Segoe UI Semilight" panose="020B0402040204020203" pitchFamily="34" charset="0"/>
+                <a:ea typeface="Segoe UI" panose="020B0502040204020203" pitchFamily="34" charset="0"/>
+                <a:cs typeface="Segoe UI Semilight" panose="020B0402040204020203" pitchFamily="34" charset="0"/>
+              </a:rPr>
+              <a:t>Can be run using bat file or from a command line.  </a:t>
+            </a:r>
+          </a:p>
+          <a:p>
+            <a:pPr marL="285750" indent="-285750">
+              <a:lnSpc>
+                <a:spcPct val="150000"/>
+              </a:lnSpc>
+              <a:spcBef>
+                <a:spcPts val="0"/>
+              </a:spcBef>
+              <a:buFont typeface="Wingdings" panose="05000000000000000000" pitchFamily="2" charset="2"/>
+              <a:buChar char="Ø"/>
+            </a:pPr>
+            <a:r>
+              <a:rPr lang="en-US" sz="1400" dirty="0">
+                <a:solidFill>
+                  <a:schemeClr val="tx1">
+                    <a:lumMod val="65000"/>
+                    <a:lumOff val="35000"/>
+                  </a:schemeClr>
+                </a:solidFill>
+                <a:latin typeface="Segoe UI Semilight" panose="020B0402040204020203" pitchFamily="34" charset="0"/>
+                <a:ea typeface="Segoe UI" panose="020B0502040204020203" pitchFamily="34" charset="0"/>
+                <a:cs typeface="Segoe UI Semilight" panose="020B0402040204020203" pitchFamily="34" charset="0"/>
+              </a:rPr>
+              <a:t>Auto generation of Test Execution Reports. </a:t>
+            </a:r>
+          </a:p>
+          <a:p>
+            <a:pPr marL="285750" indent="-285750">
+              <a:lnSpc>
+                <a:spcPct val="150000"/>
+              </a:lnSpc>
+              <a:spcBef>
+                <a:spcPts val="0"/>
+              </a:spcBef>
+              <a:buFont typeface="Wingdings" panose="05000000000000000000" pitchFamily="2" charset="2"/>
+              <a:buChar char="Ø"/>
+            </a:pPr>
+            <a:r>
+              <a:rPr lang="en-US" sz="1400" dirty="0">
+                <a:solidFill>
+                  <a:schemeClr val="tx1">
+                    <a:lumMod val="65000"/>
+                    <a:lumOff val="35000"/>
+                  </a:schemeClr>
+                </a:solidFill>
+                <a:latin typeface="Segoe UI Semilight" panose="020B0402040204020203" pitchFamily="34" charset="0"/>
+                <a:ea typeface="Segoe UI" panose="020B0502040204020203" pitchFamily="34" charset="0"/>
+                <a:cs typeface="Segoe UI Semilight" panose="020B0402040204020203" pitchFamily="34" charset="0"/>
+              </a:rPr>
+              <a:t>Capable enough for generating configurable dashboards.</a:t>
+            </a:r>
+          </a:p>
+          <a:p>
+            <a:pPr marL="285750" indent="-285750">
+              <a:lnSpc>
+                <a:spcPct val="150000"/>
+              </a:lnSpc>
+              <a:spcBef>
+                <a:spcPts val="0"/>
+              </a:spcBef>
+              <a:buFont typeface="Wingdings" panose="05000000000000000000" pitchFamily="2" charset="2"/>
+              <a:buChar char="Ø"/>
+            </a:pPr>
+            <a:r>
+              <a:rPr lang="en-US" sz="1400" dirty="0">
+                <a:solidFill>
+                  <a:schemeClr val="tx1">
+                    <a:lumMod val="65000"/>
+                    <a:lumOff val="35000"/>
+                  </a:schemeClr>
+                </a:solidFill>
+                <a:latin typeface="Segoe UI Semilight" panose="020B0402040204020203" pitchFamily="34" charset="0"/>
+                <a:ea typeface="Segoe UI" panose="020B0502040204020203" pitchFamily="34" charset="0"/>
+                <a:cs typeface="Segoe UI Semilight" panose="020B0402040204020203" pitchFamily="34" charset="0"/>
+              </a:rPr>
+              <a:t>Can be run on Multiple Environments. Environment Variables are configurable. </a:t>
+            </a:r>
+          </a:p>
+          <a:p>
+            <a:pPr marL="285750" indent="-285750">
+              <a:lnSpc>
+                <a:spcPct val="150000"/>
+              </a:lnSpc>
+              <a:spcBef>
+                <a:spcPts val="0"/>
+              </a:spcBef>
+              <a:buFont typeface="Wingdings" panose="05000000000000000000" pitchFamily="2" charset="2"/>
+              <a:buChar char="Ø"/>
+            </a:pPr>
+            <a:r>
+              <a:rPr lang="en-US" sz="1400" dirty="0">
+                <a:solidFill>
+                  <a:schemeClr val="tx1">
+                    <a:lumMod val="65000"/>
+                    <a:lumOff val="35000"/>
+                  </a:schemeClr>
+                </a:solidFill>
+                <a:latin typeface="Segoe UI Semilight" panose="020B0402040204020203" pitchFamily="34" charset="0"/>
+                <a:ea typeface="Segoe UI" panose="020B0502040204020203" pitchFamily="34" charset="0"/>
+                <a:cs typeface="Segoe UI Semilight" panose="020B0402040204020203" pitchFamily="34" charset="0"/>
+              </a:rPr>
+              <a:t>API Key is a configurable. Session ID and Guest session ID are stored on the fly at project level to Reuse it for Another Test cases. </a:t>
+            </a:r>
+          </a:p>
+          <a:p>
+            <a:pPr marL="285750" indent="-285750">
+              <a:lnSpc>
+                <a:spcPct val="150000"/>
+              </a:lnSpc>
+              <a:spcBef>
+                <a:spcPts val="0"/>
+              </a:spcBef>
+              <a:buFont typeface="Wingdings" panose="05000000000000000000" pitchFamily="2" charset="2"/>
+              <a:buChar char="Ø"/>
+            </a:pPr>
+            <a:r>
+              <a:rPr lang="en-US" sz="1400" dirty="0">
+                <a:solidFill>
+                  <a:schemeClr val="tx1">
+                    <a:lumMod val="65000"/>
+                    <a:lumOff val="35000"/>
+                  </a:schemeClr>
+                </a:solidFill>
+                <a:latin typeface="Segoe UI Semilight" panose="020B0402040204020203" pitchFamily="34" charset="0"/>
+                <a:ea typeface="Segoe UI" panose="020B0502040204020203" pitchFamily="34" charset="0"/>
+                <a:cs typeface="Segoe UI Semilight" panose="020B0402040204020203" pitchFamily="34" charset="0"/>
+              </a:rPr>
+              <a:t>Include extensively Positive and Negative scenarios for different aspects of functional Testing. </a:t>
+            </a:r>
+          </a:p>
+          <a:p>
+            <a:pPr marL="285750" indent="-285750">
+              <a:lnSpc>
+                <a:spcPct val="150000"/>
+              </a:lnSpc>
+              <a:spcBef>
+                <a:spcPts val="0"/>
+              </a:spcBef>
+              <a:buFont typeface="Wingdings" panose="05000000000000000000" pitchFamily="2" charset="2"/>
+              <a:buChar char="Ø"/>
+            </a:pPr>
+            <a:r>
+              <a:rPr lang="en-US" sz="1400" dirty="0">
+                <a:solidFill>
+                  <a:schemeClr val="tx1">
+                    <a:lumMod val="65000"/>
+                    <a:lumOff val="35000"/>
+                  </a:schemeClr>
+                </a:solidFill>
+                <a:latin typeface="Segoe UI Semilight" panose="020B0402040204020203" pitchFamily="34" charset="0"/>
+                <a:ea typeface="Segoe UI" panose="020B0502040204020203" pitchFamily="34" charset="0"/>
+                <a:cs typeface="Segoe UI Semilight" panose="020B0402040204020203" pitchFamily="34" charset="0"/>
+              </a:rPr>
+              <a:t>Includes Assertions at each level to verify the Expected Http status and Data validation and different aspects of the Functional testing. </a:t>
+            </a:r>
+          </a:p>
+          <a:p>
+            <a:pPr marL="285750" indent="-285750">
+              <a:lnSpc>
+                <a:spcPct val="150000"/>
+              </a:lnSpc>
+              <a:spcBef>
+                <a:spcPts val="0"/>
+              </a:spcBef>
+              <a:buFont typeface="Wingdings" panose="05000000000000000000" pitchFamily="2" charset="2"/>
+              <a:buChar char="Ø"/>
+            </a:pPr>
+            <a:endParaRPr lang="en-US" sz="1400" dirty="0">
+              <a:solidFill>
+                <a:schemeClr val="tx1">
+                  <a:lumMod val="65000"/>
+                  <a:lumOff val="35000"/>
+                </a:schemeClr>
+              </a:solidFill>
+              <a:latin typeface="Segoe UI Semilight" panose="020B0402040204020203" pitchFamily="34" charset="0"/>
+              <a:ea typeface="Segoe UI" panose="020B0502040204020203" pitchFamily="34" charset="0"/>
+              <a:cs typeface="Segoe UI Semilight" panose="020B0402040204020203" pitchFamily="34" charset="0"/>
+            </a:endParaRPr>
+          </a:p>
+          <a:p>
+            <a:pPr marL="0" indent="0">
+              <a:lnSpc>
+                <a:spcPct val="150000"/>
+              </a:lnSpc>
+              <a:spcBef>
+                <a:spcPts val="0"/>
+              </a:spcBef>
+              <a:buFont typeface="Arial" panose="020B0604020202020204" pitchFamily="34" charset="0"/>
+              <a:buNone/>
+            </a:pPr>
+            <a:r>
+              <a:rPr lang="en-US" sz="1400" dirty="0">
+                <a:solidFill>
+                  <a:schemeClr val="tx1">
+                    <a:lumMod val="65000"/>
+                    <a:lumOff val="35000"/>
+                  </a:schemeClr>
+                </a:solidFill>
+                <a:latin typeface="Segoe UI Semilight" panose="020B0402040204020203" pitchFamily="34" charset="0"/>
+                <a:ea typeface="Segoe UI" panose="020B0502040204020203" pitchFamily="34" charset="0"/>
+                <a:cs typeface="Segoe UI Semilight" panose="020B0402040204020203" pitchFamily="34" charset="0"/>
+              </a:rPr>
+              <a:t> </a:t>
             </a:r>
           </a:p>
         </p:txBody>
@@ -4621,7 +5156,7 @@
         <p:spPr>
           <a:xfrm>
             <a:off x="6211661" y="1760155"/>
-            <a:ext cx="5237389" cy="4000000"/>
+            <a:ext cx="5237389" cy="1668021"/>
           </a:xfrm>
           <a:prstGeom prst="rect">
             <a:avLst/>
@@ -4647,6 +5182,20 @@
                 <a:ea typeface="Segoe UI Semibold" panose="020B0702040204020203" pitchFamily="34" charset="0"/>
               </a:rPr>
               <a:t>Release date: </a:t>
+            </a:r>
+            <a:r>
+              <a:rPr lang="en-US" sz="1400" b="1" dirty="0">
+                <a:solidFill>
+                  <a:schemeClr val="tx1">
+                    <a:lumMod val="65000"/>
+                    <a:lumOff val="35000"/>
+                  </a:schemeClr>
+                </a:solidFill>
+                <a:latin typeface="Segoe UI Semilight" panose="020B0402040204020203" pitchFamily="34" charset="0"/>
+                <a:ea typeface="Segoe UI Semibold" panose="020B0702040204020203" pitchFamily="34" charset="0"/>
+                <a:cs typeface="Segoe UI Semilight" panose="020B0402040204020203" pitchFamily="34" charset="0"/>
+              </a:rPr>
+              <a:t>April</a:t>
             </a:r>
             <a:r>
               <a:rPr lang="en-US" sz="1400" dirty="0">
@@ -4659,27 +5208,10 @@
                 <a:latin typeface="Segoe UI Semilight" panose="020B0402040204020203" pitchFamily="34" charset="0"/>
                 <a:cs typeface="Segoe UI Semilight" panose="020B0402040204020203" pitchFamily="34" charset="0"/>
               </a:rPr>
-              <a:t>Jul 8, 2005</a:t>
-            </a:r>
-          </a:p>
-          <a:p>
-            <a:pPr>
-              <a:lnSpc>
-                <a:spcPct val="150000"/>
-              </a:lnSpc>
-            </a:pPr>
+              <a:t> </a:t>
+            </a:r>
             <a:r>
               <a:rPr lang="en-US" sz="1400" b="1" dirty="0">
-                <a:solidFill>
-                  <a:srgbClr val="D24726"/>
-                </a:solidFill>
-                <a:latin typeface="Segoe UI Semibold" panose="020B0702040204020203" pitchFamily="34" charset="0"/>
-                <a:ea typeface="Segoe UI Semibold" panose="020B0702040204020203" pitchFamily="34" charset="0"/>
-              </a:rPr>
-              <a:t>Series: </a:t>
-            </a:r>
-            <a:r>
-              <a:rPr lang="en-US" sz="1400" dirty="0">
                 <a:solidFill>
                   <a:schemeClr val="tx1">
                     <a:lumMod val="65000"/>
@@ -4689,7 +5221,7 @@
                 <a:latin typeface="Segoe UI Semilight" panose="020B0402040204020203" pitchFamily="34" charset="0"/>
                 <a:cs typeface="Segoe UI Semilight" panose="020B0402040204020203" pitchFamily="34" charset="0"/>
               </a:rPr>
-              <a:t>Battlefield</a:t>
+              <a:t>08, 2018</a:t>
             </a:r>
           </a:p>
           <a:p>
@@ -4709,7 +5241,48 @@
               <a:t>Developer: </a:t>
             </a:r>
             <a:r>
-              <a:rPr lang="en-US" sz="1400" dirty="0">
+              <a:rPr lang="en-US" sz="1400" b="1" dirty="0">
+                <a:solidFill>
+                  <a:schemeClr val="tx1">
+                    <a:lumMod val="65000"/>
+                    <a:lumOff val="35000"/>
+                  </a:schemeClr>
+                </a:solidFill>
+                <a:latin typeface="Segoe UI Semilight" panose="020B0402040204020203" pitchFamily="34" charset="0"/>
+                <a:ea typeface="Segoe UI Semibold" panose="020B0702040204020203" pitchFamily="34" charset="0"/>
+                <a:cs typeface="Segoe UI Semilight" panose="020B0402040204020203" pitchFamily="34" charset="0"/>
+              </a:rPr>
+              <a:t>Arpan Saini</a:t>
+            </a:r>
+            <a:endParaRPr lang="en-US" sz="1400" dirty="0">
+              <a:solidFill>
+                <a:schemeClr val="tx1">
+                  <a:lumMod val="65000"/>
+                  <a:lumOff val="35000"/>
+                </a:schemeClr>
+              </a:solidFill>
+              <a:latin typeface="Segoe UI Semilight" panose="020B0402040204020203" pitchFamily="34" charset="0"/>
+              <a:cs typeface="Segoe UI Semilight" panose="020B0402040204020203" pitchFamily="34" charset="0"/>
+            </a:endParaRPr>
+          </a:p>
+          <a:p>
+            <a:pPr>
+              <a:lnSpc>
+                <a:spcPct val="150000"/>
+              </a:lnSpc>
+            </a:pPr>
+            <a:r>
+              <a:rPr lang="en-US" sz="1400" b="1" dirty="0">
+                <a:solidFill>
+                  <a:srgbClr val="D24726"/>
+                </a:solidFill>
+                <a:latin typeface="Segoe UI Semibold" panose="020B0702040204020203" pitchFamily="34" charset="0"/>
+                <a:ea typeface="Segoe UI Semibold" panose="020B0702040204020203" pitchFamily="34" charset="0"/>
+              </a:rPr>
+              <a:t>Tool Used: </a:t>
+            </a:r>
+            <a:r>
+              <a:rPr lang="en-US" sz="1400" b="1" dirty="0">
                 <a:solidFill>
                   <a:schemeClr val="tx1">
                     <a:lumMod val="65000"/>
@@ -4719,37 +5292,7 @@
                 <a:latin typeface="Segoe UI Semilight" panose="020B0402040204020203" pitchFamily="34" charset="0"/>
                 <a:cs typeface="Segoe UI Semilight" panose="020B0402040204020203" pitchFamily="34" charset="0"/>
               </a:rPr>
-              <a:t>The Project Reality Team</a:t>
-            </a:r>
-          </a:p>
-          <a:p>
-            <a:pPr>
-              <a:lnSpc>
-                <a:spcPct val="150000"/>
-              </a:lnSpc>
-            </a:pPr>
-            <a:r>
-              <a:rPr lang="en-US" sz="1400" b="1" dirty="0">
-                <a:solidFill>
-                  <a:srgbClr val="D24726"/>
-                </a:solidFill>
-                <a:latin typeface="Segoe UI Semibold" panose="020B0702040204020203" pitchFamily="34" charset="0"/>
-                <a:ea typeface="Segoe UI Semibold" panose="020B0702040204020203" pitchFamily="34" charset="0"/>
-              </a:rPr>
-              <a:t>Genre: </a:t>
-            </a:r>
-            <a:r>
-              <a:rPr lang="en-US" sz="1400" dirty="0">
-                <a:solidFill>
-                  <a:schemeClr val="tx1">
-                    <a:lumMod val="65000"/>
-                    <a:lumOff val="35000"/>
-                  </a:schemeClr>
-                </a:solidFill>
-                <a:latin typeface="Segoe UI Semilight" panose="020B0402040204020203" pitchFamily="34" charset="0"/>
-                <a:cs typeface="Segoe UI Semilight" panose="020B0402040204020203" pitchFamily="34" charset="0"/>
-              </a:rPr>
-              <a:t>Tactical shooter</a:t>
+              <a:t>Soap UI NG Pro (Ready API)</a:t>
             </a:r>
           </a:p>
           <a:p>
@@ -4769,7 +5312,7 @@
               <a:t>Publisher: </a:t>
             </a:r>
             <a:r>
-              <a:rPr lang="en-US" sz="1400" dirty="0">
+              <a:rPr lang="en-US" sz="1400" b="1" dirty="0">
                 <a:solidFill>
                   <a:schemeClr val="tx1">
                     <a:lumMod val="65000"/>
@@ -4777,10 +5320,21 @@
                   </a:schemeClr>
                 </a:solidFill>
                 <a:latin typeface="Segoe UI Semilight" panose="020B0402040204020203" pitchFamily="34" charset="0"/>
+                <a:ea typeface="Segoe UI Semibold" panose="020B0702040204020203" pitchFamily="34" charset="0"/>
                 <a:cs typeface="Segoe UI Semilight" panose="020B0402040204020203" pitchFamily="34" charset="0"/>
               </a:rPr>
-              <a:t>The Project Reality Team</a:t>
-            </a:r>
+              <a:t>Arpan Saini</a:t>
+            </a:r>
+            <a:endParaRPr lang="en-US" sz="1400" dirty="0">
+              <a:solidFill>
+                <a:schemeClr val="tx1">
+                  <a:lumMod val="65000"/>
+                  <a:lumOff val="35000"/>
+                </a:schemeClr>
+              </a:solidFill>
+              <a:latin typeface="Segoe UI Semilight" panose="020B0402040204020203" pitchFamily="34" charset="0"/>
+              <a:cs typeface="Segoe UI Semilight" panose="020B0402040204020203" pitchFamily="34" charset="0"/>
+            </a:endParaRPr>
           </a:p>
           <a:p>
             <a:pPr>
@@ -4799,7 +5353,7 @@
               <a:t>Platform: </a:t>
             </a:r>
             <a:r>
-              <a:rPr lang="en-US" sz="1400" dirty="0">
+              <a:rPr lang="en-US" sz="1400" b="1" dirty="0">
                 <a:solidFill>
                   <a:schemeClr val="tx1">
                     <a:lumMod val="65000"/>
@@ -4811,66 +5365,6 @@
               </a:rPr>
               <a:t>Microsoft Windows</a:t>
             </a:r>
-          </a:p>
-        </p:txBody>
-      </p:sp>
-      <p:sp>
-        <p:nvSpPr>
-          <p:cNvPr id="23" name="Footer Placeholder 2"/>
-          <p:cNvSpPr>
-            <a:spLocks noGrp="1"/>
-          </p:cNvSpPr>
-          <p:nvPr>
-            <p:ph type="ftr" sz="quarter" idx="11"/>
-          </p:nvPr>
-        </p:nvSpPr>
-        <p:spPr>
-          <a:xfrm>
-            <a:off x="838199" y="6229028"/>
-            <a:ext cx="5779169" cy="365125"/>
-          </a:xfrm>
-        </p:spPr>
-        <p:txBody>
-          <a:bodyPr/>
-          <a:lstStyle/>
-          <a:p>
-            <a:pPr algn="l"/>
-            <a:r>
-              <a:rPr lang="en-US" dirty="0">
-                <a:solidFill>
-                  <a:schemeClr val="tx2"/>
-                </a:solidFill>
-                <a:latin typeface="Segoe UI" panose="020B0502040204020203" pitchFamily="34" charset="0"/>
-                <a:ea typeface="Segoe UI" panose="020B0502040204020203" pitchFamily="34" charset="0"/>
-                <a:cs typeface="Segoe UI" panose="020B0502040204020203" pitchFamily="34" charset="0"/>
-                <a:hlinkClick r:id="rId3"/>
-              </a:rPr>
-              <a:t>en.wikipedia.org</a:t>
-            </a:r>
-            <a:r>
-              <a:rPr lang="en-US" dirty="0">
-                <a:solidFill>
-                  <a:schemeClr val="tx2"/>
-                </a:solidFill>
-                <a:latin typeface="Segoe UI" panose="020B0502040204020203" pitchFamily="34" charset="0"/>
-                <a:ea typeface="Segoe UI" panose="020B0502040204020203" pitchFamily="34" charset="0"/>
-                <a:cs typeface="Segoe UI" panose="020B0502040204020203" pitchFamily="34" charset="0"/>
-              </a:rPr>
-              <a:t> - Text under </a:t>
-            </a:r>
-            <a:r>
-              <a:rPr lang="en-US" dirty="0">
-                <a:solidFill>
-                  <a:schemeClr val="tx2"/>
-                </a:solidFill>
-                <a:latin typeface="Segoe UI" panose="020B0502040204020203" pitchFamily="34" charset="0"/>
-                <a:ea typeface="Segoe UI" panose="020B0502040204020203" pitchFamily="34" charset="0"/>
-                <a:cs typeface="Segoe UI" panose="020B0502040204020203" pitchFamily="34" charset="0"/>
-                <a:hlinkClick r:id="rId4"/>
-              </a:rPr>
-              <a:t>CC-BY-SA license</a:t>
-            </a:r>
-            <a:endParaRPr lang="en-US" dirty="0"/>
           </a:p>
         </p:txBody>
       </p:sp>
@@ -5018,7 +5512,7 @@
             <p:nvPr/>
           </p:nvPicPr>
           <p:blipFill>
-            <a:blip r:embed="rId5" cstate="print">
+            <a:blip r:embed="rId3" cstate="print">
               <a:extLst>
                 <a:ext uri="{28A0092B-C50C-407E-A947-70E740481C1C}">
                   <a14:useLocalDpi xmlns:a14="http://schemas.microsoft.com/office/drawing/2010/main" val="0"/>
@@ -5031,7 +5525,7 @@
           </p:blipFill>
           <p:spPr>
             <a:xfrm rot="10354591">
-              <a:off x="8375339" y="6310072"/>
+              <a:off x="8424546" y="6310071"/>
               <a:ext cx="712427" cy="504018"/>
             </a:xfrm>
             <a:prstGeom prst="rect">
@@ -5054,7 +5548,7 @@
             <p:nvPr/>
           </p:nvPicPr>
           <p:blipFill>
-            <a:blip r:embed="rId6"/>
+            <a:blip r:embed="rId4"/>
             <a:stretch>
               <a:fillRect/>
             </a:stretch>
@@ -5083,19 +5577,13 @@
 </p:sld>
 </file>
 
-<file path=ppt/slides/slide2.xml><?xml version="1.0" encoding="utf-8"?>
+<file path=ppt/slides/slide3.xml><?xml version="1.0" encoding="utf-8"?>
 <p:sld xmlns:a="http://schemas.openxmlformats.org/drawingml/2006/main" xmlns:r="http://schemas.openxmlformats.org/officeDocument/2006/relationships" xmlns:p="http://schemas.openxmlformats.org/presentationml/2006/main">
   <p:cSld>
     <p:bg>
-      <p:bgPr>
-        <a:solidFill>
-          <a:schemeClr val="bg1">
-            <a:tint val="95000"/>
-            <a:satMod val="170000"/>
-          </a:schemeClr>
-        </a:solidFill>
-        <a:effectLst/>
-      </p:bgPr>
+      <p:bgRef idx="1001">
+        <a:schemeClr val="bg1"/>
+      </p:bgRef>
     </p:bg>
     <p:spTree>
       <p:nvGrpSpPr>
@@ -5111,316 +5599,60 @@
           <a:chExt cx="0" cy="0"/>
         </a:xfrm>
       </p:grpSpPr>
-      <p:grpSp>
-        <p:nvGrpSpPr>
-          <p:cNvPr id="9" name="Group 8" title="intersecting circles">
+      <p:sp>
+        <p:nvSpPr>
+          <p:cNvPr id="4" name="Title 1">
             <a:extLst>
               <a:ext uri="{FF2B5EF4-FFF2-40B4-BE49-F238E27FC236}">
-                <a16:creationId xmlns:a16="http://schemas.microsoft.com/office/drawing/2014/main" id="{D2C4BFA1-2075-4901-9E24-E41D1FDD51FD}"/>
+                <a16:creationId xmlns:a16="http://schemas.microsoft.com/office/drawing/2014/main" id="{4437234B-6223-41F8-B90D-8F11AD61A037}"/>
               </a:ext>
             </a:extLst>
           </p:cNvPr>
-          <p:cNvGrpSpPr>
-            <a:grpSpLocks noGrp="1" noUngrp="1" noRot="1" noChangeAspect="1" noMove="1" noResize="1"/>
-          </p:cNvGrpSpPr>
-          <p:nvPr>
-            <p:extLst>
-              <p:ext uri="{386F3935-93C4-4BCD-93E2-E3B085C9AB24}">
-                <p16:designElem xmlns:p16="http://schemas.microsoft.com/office/powerpoint/2015/main" val="1"/>
-              </p:ext>
-            </p:extLst>
-          </p:nvPr>
-        </p:nvGrpSpPr>
-        <p:grpSpPr>
-          <a:xfrm>
-            <a:off x="1155481" y="498348"/>
-            <a:ext cx="9902663" cy="5861304"/>
-            <a:chOff x="1155481" y="498348"/>
-            <a:chExt cx="9902663" cy="5861304"/>
-          </a:xfrm>
-        </p:grpSpPr>
-        <p:sp>
-          <p:nvSpPr>
-            <p:cNvPr id="10" name="Oval 5">
-              <a:extLst>
-                <a:ext uri="{FF2B5EF4-FFF2-40B4-BE49-F238E27FC236}">
-                  <a16:creationId xmlns:a16="http://schemas.microsoft.com/office/drawing/2014/main" id="{985A7375-E3AF-4F5C-85AE-17E8832952CA}"/>
-                </a:ext>
-              </a:extLst>
-            </p:cNvPr>
-            <p:cNvSpPr>
-              <a:spLocks noChangeArrowheads="1"/>
-            </p:cNvSpPr>
-            <p:nvPr>
-              <p:extLst>
-                <p:ext uri="{386F3935-93C4-4BCD-93E2-E3B085C9AB24}">
-                  <p16:designElem xmlns:p16="http://schemas.microsoft.com/office/powerpoint/2015/main" val="1"/>
-                </p:ext>
-              </p:extLst>
-            </p:nvPr>
-          </p:nvSpPr>
-          <p:spPr bwMode="auto">
-            <a:xfrm>
-              <a:off x="1155481" y="498348"/>
-              <a:ext cx="5861304" cy="5861304"/>
-            </a:xfrm>
-            <a:prstGeom prst="ellipse">
-              <a:avLst/>
-            </a:prstGeom>
-            <a:solidFill>
-              <a:schemeClr val="accent1">
-                <a:alpha val="55000"/>
-              </a:schemeClr>
-            </a:solidFill>
-            <a:ln>
-              <a:noFill/>
-            </a:ln>
-          </p:spPr>
-        </p:sp>
-        <p:sp>
-          <p:nvSpPr>
-            <p:cNvPr id="11" name="Oval 10">
-              <a:extLst>
-                <a:ext uri="{FF2B5EF4-FFF2-40B4-BE49-F238E27FC236}">
-                  <a16:creationId xmlns:a16="http://schemas.microsoft.com/office/drawing/2014/main" id="{F0307F65-8304-4FA8-A841-D4D7625411BE}"/>
-                </a:ext>
-              </a:extLst>
-            </p:cNvPr>
-            <p:cNvSpPr>
-              <a:spLocks noChangeArrowheads="1"/>
-            </p:cNvSpPr>
-            <p:nvPr>
-              <p:extLst>
-                <p:ext uri="{386F3935-93C4-4BCD-93E2-E3B085C9AB24}">
-                  <p16:designElem xmlns:p16="http://schemas.microsoft.com/office/powerpoint/2015/main" val="1"/>
-                </p:ext>
-              </p:extLst>
-            </p:nvPr>
-          </p:nvSpPr>
-          <p:spPr bwMode="auto">
-            <a:xfrm>
-              <a:off x="5196840" y="498348"/>
-              <a:ext cx="5861304" cy="5861304"/>
-            </a:xfrm>
-            <a:prstGeom prst="ellipse">
-              <a:avLst/>
-            </a:prstGeom>
-            <a:solidFill>
-              <a:schemeClr val="accent1">
-                <a:alpha val="55000"/>
-              </a:schemeClr>
-            </a:solidFill>
-            <a:ln>
-              <a:noFill/>
-            </a:ln>
-          </p:spPr>
-        </p:sp>
-        <p:sp>
-          <p:nvSpPr>
-            <p:cNvPr id="12" name="Oval 5">
-              <a:extLst>
-                <a:ext uri="{FF2B5EF4-FFF2-40B4-BE49-F238E27FC236}">
-                  <a16:creationId xmlns:a16="http://schemas.microsoft.com/office/drawing/2014/main" id="{C8B8394C-136F-4E05-A002-D93A5E79CD50}"/>
-                </a:ext>
-              </a:extLst>
-            </p:cNvPr>
-            <p:cNvSpPr>
-              <a:spLocks noChangeArrowheads="1"/>
-            </p:cNvSpPr>
-            <p:nvPr>
-              <p:extLst>
-                <p:ext uri="{386F3935-93C4-4BCD-93E2-E3B085C9AB24}">
-                  <p16:designElem xmlns:p16="http://schemas.microsoft.com/office/powerpoint/2015/main" val="1"/>
-                </p:ext>
-              </p:extLst>
-            </p:nvPr>
-          </p:nvSpPr>
-          <p:spPr bwMode="auto">
-            <a:xfrm>
-              <a:off x="3165348" y="498348"/>
-              <a:ext cx="5861304" cy="5861304"/>
-            </a:xfrm>
-            <a:prstGeom prst="ellipse">
-              <a:avLst/>
-            </a:prstGeom>
-            <a:solidFill>
-              <a:schemeClr val="accent1">
-                <a:alpha val="70000"/>
-              </a:schemeClr>
-            </a:solidFill>
-            <a:ln>
-              <a:noFill/>
-            </a:ln>
-          </p:spPr>
-        </p:sp>
-      </p:grpSp>
-      <p:sp>
-        <p:nvSpPr>
-          <p:cNvPr id="14" name="Rectangle 13" title="ribbon">
-            <a:extLst>
-              <a:ext uri="{FF2B5EF4-FFF2-40B4-BE49-F238E27FC236}">
-                <a16:creationId xmlns:a16="http://schemas.microsoft.com/office/drawing/2014/main" id="{053FB2EE-284F-4C87-AB3D-BBF87A9FAB97}"/>
-              </a:ext>
-            </a:extLst>
-          </p:cNvPr>
-          <p:cNvSpPr>
-            <a:spLocks noGrp="1" noRot="1" noChangeAspect="1" noMove="1" noResize="1" noEditPoints="1" noAdjustHandles="1" noChangeArrowheads="1" noChangeShapeType="1" noTextEdit="1"/>
-          </p:cNvSpPr>
-          <p:nvPr>
-            <p:extLst>
-              <p:ext uri="{386F3935-93C4-4BCD-93E2-E3B085C9AB24}">
-                <p16:designElem xmlns:p16="http://schemas.microsoft.com/office/powerpoint/2015/main" val="1"/>
-              </p:ext>
-            </p:extLst>
+          <p:cNvSpPr>
+            <a:spLocks noGrp="1"/>
+          </p:cNvSpPr>
+          <p:nvPr>
+            <p:ph type="title"/>
           </p:nvPr>
         </p:nvSpPr>
         <p:spPr>
           <a:xfrm>
-            <a:off x="0" y="2514600"/>
-            <a:ext cx="12192000" cy="1828800"/>
-          </a:xfrm>
-          <a:prstGeom prst="rect">
-            <a:avLst/>
-          </a:prstGeom>
-          <a:solidFill>
-            <a:schemeClr val="tx2"/>
-          </a:solidFill>
-          <a:ln>
-            <a:noFill/>
-          </a:ln>
-        </p:spPr>
-        <p:style>
-          <a:lnRef idx="2">
-            <a:schemeClr val="accent1">
-              <a:shade val="50000"/>
-            </a:schemeClr>
-          </a:lnRef>
-          <a:fillRef idx="1">
-            <a:schemeClr val="accent1"/>
-          </a:fillRef>
-          <a:effectRef idx="0">
-            <a:schemeClr val="accent1"/>
-          </a:effectRef>
-          <a:fontRef idx="minor">
-            <a:schemeClr val="lt1"/>
-          </a:fontRef>
-        </p:style>
-      </p:sp>
-      <p:sp>
-        <p:nvSpPr>
-          <p:cNvPr id="2" name="Title 1"/>
-          <p:cNvSpPr>
-            <a:spLocks noGrp="1"/>
-          </p:cNvSpPr>
-          <p:nvPr>
-            <p:ph type="ctrTitle"/>
-          </p:nvPr>
-        </p:nvSpPr>
-        <p:spPr>
-          <a:xfrm>
-            <a:off x="1524000" y="2776538"/>
-            <a:ext cx="9144000" cy="1381188"/>
+            <a:off x="838200" y="681037"/>
+            <a:ext cx="10515600" cy="822263"/>
           </a:xfrm>
         </p:spPr>
         <p:txBody>
-          <a:bodyPr anchor="ctr">
-            <a:normAutofit/>
-          </a:bodyPr>
-          <a:lstStyle/>
-          <a:p>
-            <a:r>
-              <a:rPr lang="en-US" sz="4000" dirty="0">
+          <a:bodyPr/>
+          <a:lstStyle/>
+          <a:p>
+            <a:r>
+              <a:rPr lang="en-US" sz="3600" dirty="0">
                 <a:solidFill>
-                  <a:schemeClr val="bg2"/>
+                  <a:srgbClr val="D24726"/>
                 </a:solidFill>
+                <a:latin typeface="Segoe UI Light" panose="020B0702040204020203" pitchFamily="34" charset="0"/>
+                <a:cs typeface="Segoe UI" panose="020B0502040204020203" pitchFamily="34" charset="0"/>
               </a:rPr>
-              <a:t>User Guide</a:t>
-            </a:r>
-          </a:p>
-        </p:txBody>
-      </p:sp>
-      <p:sp>
-        <p:nvSpPr>
-          <p:cNvPr id="3" name="Content Placeholder 2"/>
-          <p:cNvSpPr>
-            <a:spLocks noGrp="1"/>
-          </p:cNvSpPr>
-          <p:nvPr>
-            <p:ph type="subTitle" idx="1"/>
-          </p:nvPr>
-        </p:nvSpPr>
-        <p:spPr>
-          <a:xfrm>
-            <a:off x="1368357" y="1883569"/>
-            <a:ext cx="9144000" cy="762000"/>
-          </a:xfrm>
-        </p:spPr>
-        <p:txBody>
-          <a:bodyPr>
-            <a:normAutofit/>
-          </a:bodyPr>
-          <a:lstStyle/>
-          <a:p>
-            <a:r>
-              <a:rPr lang="en-US" sz="4000" dirty="0"/>
-              <a:t>Sofi TMDB API Project</a:t>
-            </a:r>
-            <a:endParaRPr sz="4000" dirty="0"/>
-          </a:p>
-        </p:txBody>
-      </p:sp>
-    </p:spTree>
-    <p:extLst>
-      <p:ext uri="{BB962C8B-B14F-4D97-AF65-F5344CB8AC3E}">
-        <p14:creationId xmlns:p14="http://schemas.microsoft.com/office/powerpoint/2010/main" val="1530454394"/>
-      </p:ext>
-    </p:extLst>
-  </p:cSld>
-  <p:clrMapOvr>
-    <a:overrideClrMapping bg1="dk1" tx1="lt1" bg2="dk2" tx2="lt2" accent1="accent1" accent2="accent2" accent3="accent3" accent4="accent4" accent5="accent5" accent6="accent6" hlink="hlink" folHlink="folHlink"/>
-  </p:clrMapOvr>
-</p:sld>
-</file>
-
-<file path=ppt/slides/slide3.xml><?xml version="1.0" encoding="utf-8"?>
-<p:sld xmlns:a="http://schemas.openxmlformats.org/drawingml/2006/main" xmlns:r="http://schemas.openxmlformats.org/officeDocument/2006/relationships" xmlns:p="http://schemas.openxmlformats.org/presentationml/2006/main">
-  <p:cSld>
-    <p:spTree>
-      <p:nvGrpSpPr>
-        <p:cNvPr id="1" name=""/>
-        <p:cNvGrpSpPr/>
-        <p:nvPr/>
-      </p:nvGrpSpPr>
-      <p:grpSpPr>
-        <a:xfrm>
-          <a:off x="0" y="0"/>
-          <a:ext cx="0" cy="0"/>
-          <a:chOff x="0" y="0"/>
-          <a:chExt cx="0" cy="0"/>
-        </a:xfrm>
-      </p:grpSpPr>
-      <p:sp>
-        <p:nvSpPr>
-          <p:cNvPr id="2" name="Title 1">
-            <a:extLst>
-              <a:ext uri="{FF2B5EF4-FFF2-40B4-BE49-F238E27FC236}">
-                <a16:creationId xmlns:a16="http://schemas.microsoft.com/office/drawing/2014/main" id="{A08FE49E-5A44-49E8-9622-E84B70A08BC0}"/>
-              </a:ext>
-            </a:extLst>
-          </p:cNvPr>
-          <p:cNvSpPr>
-            <a:spLocks noGrp="1"/>
-          </p:cNvSpPr>
-          <p:nvPr>
-            <p:ph type="title"/>
-          </p:nvPr>
-        </p:nvSpPr>
-        <p:spPr/>
-        <p:txBody>
-          <a:bodyPr/>
-          <a:lstStyle/>
-          <a:p>
-            <a:endParaRPr lang="en-US"/>
+              <a:t>Area</a:t>
+            </a:r>
+            <a:r>
+              <a:rPr lang="en-US" dirty="0">
+                <a:latin typeface="Segoe UI Light" panose="020B0702040204020203" pitchFamily="34" charset="0"/>
+                <a:ea typeface="Segoe UI Light" panose="020B0702040204020203" pitchFamily="34" charset="0"/>
+                <a:cs typeface="Segoe UI" panose="020B0502040204020203" pitchFamily="34" charset="0"/>
+              </a:rPr>
+              <a:t> </a:t>
+            </a:r>
+            <a:r>
+              <a:rPr lang="en-US" sz="3600" dirty="0">
+                <a:solidFill>
+                  <a:srgbClr val="D24726"/>
+                </a:solidFill>
+                <a:latin typeface="Segoe UI Light" panose="020B0702040204020203" pitchFamily="34" charset="0"/>
+                <a:cs typeface="Segoe UI" panose="020B0502040204020203" pitchFamily="34" charset="0"/>
+              </a:rPr>
+              <a:t>of Improvement</a:t>
+            </a:r>
           </a:p>
         </p:txBody>
       </p:sp>
@@ -5442,13 +5674,374 @@
         </p:nvSpPr>
         <p:spPr/>
         <p:txBody>
-          <a:bodyPr/>
-          <a:lstStyle/>
-          <a:p>
-            <a:endParaRPr lang="en-US"/>
-          </a:p>
-        </p:txBody>
-      </p:sp>
+          <a:bodyPr>
+            <a:normAutofit/>
+          </a:bodyPr>
+          <a:lstStyle/>
+          <a:p>
+            <a:pPr>
+              <a:buFont typeface="Wingdings" panose="05000000000000000000" pitchFamily="2" charset="2"/>
+              <a:buChar char="Ø"/>
+            </a:pPr>
+            <a:r>
+              <a:rPr lang="en-US" sz="1300" dirty="0">
+                <a:solidFill>
+                  <a:schemeClr val="tx1">
+                    <a:lumMod val="65000"/>
+                    <a:lumOff val="35000"/>
+                  </a:schemeClr>
+                </a:solidFill>
+                <a:latin typeface="Segoe UI Semilight" panose="020B0402040204020203" pitchFamily="34" charset="0"/>
+                <a:cs typeface="Segoe UI Semilight" panose="020B0402040204020203" pitchFamily="34" charset="0"/>
+              </a:rPr>
+              <a:t>Can</a:t>
+            </a:r>
+            <a:r>
+              <a:rPr lang="en-US" sz="3600" dirty="0">
+                <a:solidFill>
+                  <a:srgbClr val="D24726"/>
+                </a:solidFill>
+                <a:latin typeface="Segoe UI Light" panose="020B0702040204020203" pitchFamily="34" charset="0"/>
+                <a:cs typeface="Segoe UI" panose="020B0502040204020203" pitchFamily="34" charset="0"/>
+              </a:rPr>
+              <a:t> </a:t>
+            </a:r>
+            <a:r>
+              <a:rPr lang="en-US" sz="1300" dirty="0">
+                <a:solidFill>
+                  <a:schemeClr val="tx1">
+                    <a:lumMod val="65000"/>
+                    <a:lumOff val="35000"/>
+                  </a:schemeClr>
+                </a:solidFill>
+                <a:latin typeface="Segoe UI Semilight" panose="020B0402040204020203" pitchFamily="34" charset="0"/>
+                <a:cs typeface="Segoe UI Semilight" panose="020B0402040204020203" pitchFamily="34" charset="0"/>
+              </a:rPr>
+              <a:t>create Load and Security Test using same function designed test cases. That will save a lot of cost and time in favor of project.  </a:t>
+            </a:r>
+          </a:p>
+          <a:p>
+            <a:pPr>
+              <a:buFont typeface="Wingdings" panose="05000000000000000000" pitchFamily="2" charset="2"/>
+              <a:buChar char="Ø"/>
+            </a:pPr>
+            <a:r>
+              <a:rPr lang="en-US" sz="1300" dirty="0">
+                <a:solidFill>
+                  <a:schemeClr val="tx1">
+                    <a:lumMod val="65000"/>
+                    <a:lumOff val="35000"/>
+                  </a:schemeClr>
+                </a:solidFill>
+                <a:latin typeface="Segoe UI Semilight" panose="020B0402040204020203" pitchFamily="34" charset="0"/>
+                <a:cs typeface="Segoe UI Semilight" panose="020B0402040204020203" pitchFamily="34" charset="0"/>
+              </a:rPr>
+              <a:t>For Data Driven Testing, External source of data can be configured. Like files , Excel and DB. By using data driven testing, Test case can be highly configurable to run on Multiple data that’s not possible using a manual testing. And Expected results can be passed from Data sources to make it highly configurable and reusable Test scripts. </a:t>
+            </a:r>
+          </a:p>
+          <a:p>
+            <a:pPr>
+              <a:buFont typeface="Wingdings" panose="05000000000000000000" pitchFamily="2" charset="2"/>
+              <a:buChar char="Ø"/>
+            </a:pPr>
+            <a:r>
+              <a:rPr lang="en-US" sz="1300" dirty="0">
+                <a:solidFill>
+                  <a:schemeClr val="tx1">
+                    <a:lumMod val="65000"/>
+                    <a:lumOff val="35000"/>
+                  </a:schemeClr>
+                </a:solidFill>
+                <a:latin typeface="Segoe UI Semilight" panose="020B0402040204020203" pitchFamily="34" charset="0"/>
+                <a:cs typeface="Segoe UI Semilight" panose="020B0402040204020203" pitchFamily="34" charset="0"/>
+              </a:rPr>
+              <a:t>Can be configured to run on synthetic as well as on Migrated data. This is help to find out the challenges and problems that we can be faced during productions and will be ready before hand.</a:t>
+            </a:r>
+          </a:p>
+          <a:p>
+            <a:pPr>
+              <a:buFont typeface="Wingdings" panose="05000000000000000000" pitchFamily="2" charset="2"/>
+              <a:buChar char="Ø"/>
+            </a:pPr>
+            <a:r>
+              <a:rPr lang="en-US" sz="1300" dirty="0">
+                <a:solidFill>
+                  <a:schemeClr val="tx1">
+                    <a:lumMod val="65000"/>
+                    <a:lumOff val="35000"/>
+                  </a:schemeClr>
+                </a:solidFill>
+                <a:latin typeface="Segoe UI Semilight" panose="020B0402040204020203" pitchFamily="34" charset="0"/>
+                <a:cs typeface="Segoe UI Semilight" panose="020B0402040204020203" pitchFamily="34" charset="0"/>
+              </a:rPr>
+              <a:t>Can be configured with Build tools like Jenkins. That can eliminate the human intervention for the Building the project and resolve the deployment and build issues. </a:t>
+            </a:r>
+          </a:p>
+          <a:p>
+            <a:pPr>
+              <a:buFont typeface="Wingdings" panose="05000000000000000000" pitchFamily="2" charset="2"/>
+              <a:buChar char="Ø"/>
+            </a:pPr>
+            <a:r>
+              <a:rPr lang="en-US" sz="1300" dirty="0">
+                <a:solidFill>
+                  <a:schemeClr val="tx1">
+                    <a:lumMod val="65000"/>
+                    <a:lumOff val="35000"/>
+                  </a:schemeClr>
+                </a:solidFill>
+                <a:latin typeface="Segoe UI Semilight" panose="020B0402040204020203" pitchFamily="34" charset="0"/>
+                <a:cs typeface="Segoe UI Semilight" panose="020B0402040204020203" pitchFamily="34" charset="0"/>
+              </a:rPr>
+              <a:t>We can use the Data Export Feature of the Tool to configure it with external tool like Jasper soft to make the more beautiful and Configurable Reports for Higher Management Reporting.</a:t>
+            </a:r>
+          </a:p>
+          <a:p>
+            <a:pPr>
+              <a:buFont typeface="Wingdings" panose="05000000000000000000" pitchFamily="2" charset="2"/>
+              <a:buChar char="Ø"/>
+            </a:pPr>
+            <a:endParaRPr lang="en-US" sz="1300" dirty="0">
+              <a:solidFill>
+                <a:schemeClr val="tx1">
+                  <a:lumMod val="65000"/>
+                  <a:lumOff val="35000"/>
+                </a:schemeClr>
+              </a:solidFill>
+              <a:latin typeface="Segoe UI Semilight" panose="020B0402040204020203" pitchFamily="34" charset="0"/>
+              <a:cs typeface="Segoe UI Semilight" panose="020B0402040204020203" pitchFamily="34" charset="0"/>
+            </a:endParaRPr>
+          </a:p>
+          <a:p>
+            <a:pPr>
+              <a:buFont typeface="Wingdings" panose="05000000000000000000" pitchFamily="2" charset="2"/>
+              <a:buChar char="Ø"/>
+            </a:pPr>
+            <a:endParaRPr lang="en-US" sz="1300" dirty="0">
+              <a:solidFill>
+                <a:schemeClr val="tx1">
+                  <a:lumMod val="65000"/>
+                  <a:lumOff val="35000"/>
+                </a:schemeClr>
+              </a:solidFill>
+              <a:latin typeface="Segoe UI Semilight" panose="020B0402040204020203" pitchFamily="34" charset="0"/>
+              <a:cs typeface="Segoe UI Semilight" panose="020B0402040204020203" pitchFamily="34" charset="0"/>
+            </a:endParaRPr>
+          </a:p>
+          <a:p>
+            <a:pPr>
+              <a:buFont typeface="Wingdings" panose="05000000000000000000" pitchFamily="2" charset="2"/>
+              <a:buChar char="Ø"/>
+            </a:pPr>
+            <a:endParaRPr lang="en-US" sz="1300" dirty="0">
+              <a:solidFill>
+                <a:schemeClr val="tx1">
+                  <a:lumMod val="65000"/>
+                  <a:lumOff val="35000"/>
+                </a:schemeClr>
+              </a:solidFill>
+              <a:latin typeface="Segoe UI Semilight" panose="020B0402040204020203" pitchFamily="34" charset="0"/>
+              <a:cs typeface="Segoe UI Semilight" panose="020B0402040204020203" pitchFamily="34" charset="0"/>
+            </a:endParaRPr>
+          </a:p>
+        </p:txBody>
+      </p:sp>
+      <p:grpSp>
+        <p:nvGrpSpPr>
+          <p:cNvPr id="5" name="Group 4">
+            <a:extLst>
+              <a:ext uri="{FF2B5EF4-FFF2-40B4-BE49-F238E27FC236}">
+                <a16:creationId xmlns:a16="http://schemas.microsoft.com/office/drawing/2014/main" id="{FFE9C3FC-0980-4405-919F-D89CA53F1F29}"/>
+              </a:ext>
+            </a:extLst>
+          </p:cNvPr>
+          <p:cNvGrpSpPr/>
+          <p:nvPr/>
+        </p:nvGrpSpPr>
+        <p:grpSpPr>
+          <a:xfrm>
+            <a:off x="6211661" y="5810971"/>
+            <a:ext cx="5188481" cy="1174603"/>
+            <a:chOff x="6211661" y="5810971"/>
+            <a:chExt cx="5188481" cy="1174603"/>
+          </a:xfrm>
+        </p:grpSpPr>
+        <p:sp>
+          <p:nvSpPr>
+            <p:cNvPr id="6" name="Rectangle 8">
+              <a:extLst>
+                <a:ext uri="{FF2B5EF4-FFF2-40B4-BE49-F238E27FC236}">
+                  <a16:creationId xmlns:a16="http://schemas.microsoft.com/office/drawing/2014/main" id="{BE87AEFB-EF17-4DFB-9171-744D64BD38B0}"/>
+                </a:ext>
+              </a:extLst>
+            </p:cNvPr>
+            <p:cNvSpPr/>
+            <p:nvPr/>
+          </p:nvSpPr>
+          <p:spPr>
+            <a:xfrm>
+              <a:off x="6211661" y="6042093"/>
+              <a:ext cx="5138199" cy="630783"/>
+            </a:xfrm>
+            <a:prstGeom prst="rect">
+              <a:avLst/>
+            </a:prstGeom>
+            <a:solidFill>
+              <a:srgbClr val="F2F2F2"/>
+            </a:solidFill>
+            <a:ln>
+              <a:noFill/>
+            </a:ln>
+          </p:spPr>
+          <p:style>
+            <a:lnRef idx="2">
+              <a:schemeClr val="accent1">
+                <a:shade val="50000"/>
+              </a:schemeClr>
+            </a:lnRef>
+            <a:fillRef idx="1">
+              <a:schemeClr val="accent1"/>
+            </a:fillRef>
+            <a:effectRef idx="0">
+              <a:schemeClr val="accent1"/>
+            </a:effectRef>
+            <a:fontRef idx="minor">
+              <a:schemeClr val="lt1"/>
+            </a:fontRef>
+          </p:style>
+          <p:txBody>
+            <a:bodyPr rtlCol="0" anchor="b" anchorCtr="0"/>
+            <a:lstStyle/>
+            <a:p>
+              <a:pPr algn="ctr"/>
+              <a:endParaRPr lang="en-US" sz="1800" dirty="0"/>
+            </a:p>
+          </p:txBody>
+        </p:sp>
+        <p:sp>
+          <p:nvSpPr>
+            <p:cNvPr id="7" name="TextBox 7">
+              <a:extLst>
+                <a:ext uri="{FF2B5EF4-FFF2-40B4-BE49-F238E27FC236}">
+                  <a16:creationId xmlns:a16="http://schemas.microsoft.com/office/drawing/2014/main" id="{671346E6-6110-458B-90AA-B124D8E4075B}"/>
+                </a:ext>
+              </a:extLst>
+            </p:cNvPr>
+            <p:cNvSpPr txBox="1"/>
+            <p:nvPr/>
+          </p:nvSpPr>
+          <p:spPr>
+            <a:xfrm>
+              <a:off x="6289102" y="6139278"/>
+              <a:ext cx="2303691" cy="451406"/>
+            </a:xfrm>
+            <a:prstGeom prst="rect">
+              <a:avLst/>
+            </a:prstGeom>
+            <a:noFill/>
+          </p:spPr>
+          <p:txBody>
+            <a:bodyPr wrap="square" rtlCol="0">
+              <a:spAutoFit/>
+            </a:bodyPr>
+            <a:lstStyle/>
+            <a:p>
+              <a:pPr>
+                <a:lnSpc>
+                  <a:spcPts val="1400"/>
+                </a:lnSpc>
+              </a:pPr>
+              <a:r>
+                <a:rPr lang="en-US" sz="1200" dirty="0">
+                  <a:solidFill>
+                    <a:srgbClr val="D24726"/>
+                  </a:solidFill>
+                  <a:cs typeface="Segoe UI Semibold" panose="020B0702040204020203" pitchFamily="34" charset="0"/>
+                </a:rPr>
+                <a:t>See more: </a:t>
+              </a:r>
+              <a:r>
+                <a:rPr lang="en-US" sz="1200" dirty="0">
+                  <a:solidFill>
+                    <a:schemeClr val="tx1">
+                      <a:lumMod val="65000"/>
+                      <a:lumOff val="35000"/>
+                    </a:schemeClr>
+                  </a:solidFill>
+                  <a:latin typeface="Segoe UI Semilight" panose="020B0402040204020203" pitchFamily="34" charset="0"/>
+                  <a:ea typeface="Segoe UI Symbol" panose="020B0502040204020203" pitchFamily="34" charset="0"/>
+                  <a:cs typeface="Segoe UI Semilight" panose="020B0402040204020203" pitchFamily="34" charset="0"/>
+                </a:rPr>
+                <a:t>Open the Notes below for more information.</a:t>
+              </a:r>
+            </a:p>
+          </p:txBody>
+        </p:sp>
+        <p:pic>
+          <p:nvPicPr>
+            <p:cNvPr id="8" name="Picture 11" descr="Curved arrow">
+              <a:extLst>
+                <a:ext uri="{FF2B5EF4-FFF2-40B4-BE49-F238E27FC236}">
+                  <a16:creationId xmlns:a16="http://schemas.microsoft.com/office/drawing/2014/main" id="{602A4B53-836B-470E-A493-6CC35C7EC03C}"/>
+                </a:ext>
+              </a:extLst>
+            </p:cNvPr>
+            <p:cNvPicPr/>
+            <p:nvPr/>
+          </p:nvPicPr>
+          <p:blipFill>
+            <a:blip r:embed="rId4" cstate="print">
+              <a:extLst>
+                <a:ext uri="{28A0092B-C50C-407E-A947-70E740481C1C}">
+                  <a14:useLocalDpi xmlns:a14="http://schemas.microsoft.com/office/drawing/2010/main" val="0"/>
+                </a:ext>
+              </a:extLst>
+            </a:blip>
+            <a:stretch>
+              <a:fillRect/>
+            </a:stretch>
+          </p:blipFill>
+          <p:spPr>
+            <a:xfrm rot="10354591">
+              <a:off x="8424546" y="6310071"/>
+              <a:ext cx="712427" cy="504018"/>
+            </a:xfrm>
+            <a:prstGeom prst="rect">
+              <a:avLst/>
+            </a:prstGeom>
+          </p:spPr>
+        </p:pic>
+        <p:pic>
+          <p:nvPicPr>
+            <p:cNvPr id="9" name="Picture 6" descr="Notes button in status bar">
+              <a:extLst>
+                <a:ext uri="{FF2B5EF4-FFF2-40B4-BE49-F238E27FC236}">
+                  <a16:creationId xmlns:a16="http://schemas.microsoft.com/office/drawing/2014/main" id="{719EBAB6-7BE8-4156-A858-588B85842106}"/>
+                </a:ext>
+              </a:extLst>
+            </p:cNvPr>
+            <p:cNvPicPr>
+              <a:picLocks noChangeAspect="1"/>
+            </p:cNvPicPr>
+            <p:nvPr/>
+          </p:nvPicPr>
+          <p:blipFill>
+            <a:blip r:embed="rId5"/>
+            <a:stretch>
+              <a:fillRect/>
+            </a:stretch>
+          </p:blipFill>
+          <p:spPr>
+            <a:xfrm>
+              <a:off x="9025539" y="5810971"/>
+              <a:ext cx="2374603" cy="1174603"/>
+            </a:xfrm>
+            <a:prstGeom prst="rect">
+              <a:avLst/>
+            </a:prstGeom>
+          </p:spPr>
+        </p:pic>
+      </p:grpSp>
     </p:spTree>
     <p:extLst>
       <p:ext uri="{BB962C8B-B14F-4D97-AF65-F5344CB8AC3E}">
@@ -5457,7 +6050,7 @@
     </p:extLst>
   </p:cSld>
   <p:clrMapOvr>
-    <a:masterClrMapping/>
+    <a:overrideClrMapping bg1="lt1" tx1="dk1" bg2="lt2" tx2="dk2" accent1="accent1" accent2="accent2" accent3="accent3" accent4="accent4" accent5="accent5" accent6="accent6" hlink="hlink" folHlink="folHlink"/>
   </p:clrMapOvr>
 </p:sld>
 </file>
@@ -5489,10 +6082,10 @@
       </p:grpSpPr>
       <p:sp>
         <p:nvSpPr>
-          <p:cNvPr id="9" name="Rectangle 8">
+          <p:cNvPr id="18" name="Rectangle 17">
             <a:extLst>
               <a:ext uri="{FF2B5EF4-FFF2-40B4-BE49-F238E27FC236}">
-                <a16:creationId xmlns:a16="http://schemas.microsoft.com/office/drawing/2014/main" id="{8D70B121-56F4-4848-B38B-182089D909FA}"/>
+                <a16:creationId xmlns:a16="http://schemas.microsoft.com/office/drawing/2014/main" id="{E186B68C-84BC-4A6E-99D1-EE87483C1349}"/>
               </a:ext>
             </a:extLst>
           </p:cNvPr>
@@ -5507,20 +6100,18 @@
             </p:extLst>
           </p:nvPr>
         </p:nvSpPr>
-        <p:spPr bwMode="ltGray">
+        <p:spPr>
           <a:xfrm>
-            <a:off x="321564" y="320040"/>
-            <a:ext cx="11548872" cy="6217920"/>
+            <a:off x="5048949" y="450221"/>
+            <a:ext cx="2115455" cy="1898903"/>
           </a:xfrm>
           <a:prstGeom prst="rect">
             <a:avLst/>
           </a:prstGeom>
           <a:solidFill>
-            <a:schemeClr val="tx1">
-              <a:alpha val="8000"/>
-            </a:schemeClr>
+            <a:srgbClr val="A5A5A5"/>
           </a:solidFill>
-          <a:ln w="127000" cap="sq" cmpd="thinThick">
+          <a:ln w="25400">
             <a:noFill/>
           </a:ln>
         </p:spPr>
@@ -5545,22 +6136,26 @@
           <a:lstStyle/>
           <a:p>
             <a:pPr algn="ctr"/>
-            <a:endParaRPr lang="en-US"/>
-          </a:p>
-        </p:txBody>
-      </p:sp>
-      <p:cxnSp>
-        <p:nvCxnSpPr>
-          <p:cNvPr id="11" name="Straight Connector 10">
+            <a:endParaRPr lang="en-US">
+              <a:solidFill>
+                <a:srgbClr val="FFFFFF"/>
+              </a:solidFill>
+            </a:endParaRPr>
+          </a:p>
+        </p:txBody>
+      </p:sp>
+      <p:sp>
+        <p:nvSpPr>
+          <p:cNvPr id="20" name="Rectangle 19">
             <a:extLst>
               <a:ext uri="{FF2B5EF4-FFF2-40B4-BE49-F238E27FC236}">
-                <a16:creationId xmlns:a16="http://schemas.microsoft.com/office/drawing/2014/main" id="{2D72A2C9-F3CA-4216-8BAD-FA4C970C3C4E}"/>
+                <a16:creationId xmlns:a16="http://schemas.microsoft.com/office/drawing/2014/main" id="{1C091803-41C2-48E0-9228-5148460C7479}"/>
               </a:ext>
             </a:extLst>
           </p:cNvPr>
-          <p:cNvCxnSpPr>
-            <a:cxnSpLocks noGrp="1" noRot="1" noChangeAspect="1" noMove="1" noResize="1" noEditPoints="1" noAdjustHandles="1" noChangeArrowheads="1" noChangeShapeType="1"/>
-          </p:cNvCxnSpPr>
+          <p:cNvSpPr>
+            <a:spLocks noGrp="1" noRot="1" noChangeAspect="1" noMove="1" noResize="1" noEditPoints="1" noAdjustHandles="1" noChangeArrowheads="1" noChangeShapeType="1" noTextEdit="1"/>
+          </p:cNvSpPr>
           <p:nvPr>
             <p:extLst>
               <p:ext uri="{386F3935-93C4-4BCD-93E2-E3B085C9AB24}">
@@ -5568,188 +6163,21 @@
               </p:ext>
             </p:extLst>
           </p:nvPr>
-        </p:nvCxnSpPr>
+        </p:nvSpPr>
         <p:spPr>
           <a:xfrm>
-            <a:off x="4654296" y="2057400"/>
-            <a:ext cx="0" cy="2743200"/>
-          </a:xfrm>
-          <a:prstGeom prst="line">
-            <a:avLst/>
-          </a:prstGeom>
-          <a:ln w="19050">
-            <a:solidFill>
-              <a:schemeClr val="tx1">
-                <a:lumMod val="85000"/>
-                <a:lumOff val="15000"/>
-              </a:schemeClr>
-            </a:solidFill>
-          </a:ln>
-        </p:spPr>
-        <p:style>
-          <a:lnRef idx="1">
-            <a:schemeClr val="accent1"/>
-          </a:lnRef>
-          <a:fillRef idx="0">
-            <a:schemeClr val="accent1"/>
-          </a:fillRef>
-          <a:effectRef idx="0">
-            <a:schemeClr val="accent1"/>
-          </a:effectRef>
-          <a:fontRef idx="minor">
-            <a:schemeClr val="tx1"/>
-          </a:fontRef>
-        </p:style>
-      </p:cxnSp>
-      <p:sp>
-        <p:nvSpPr>
-          <p:cNvPr id="2" name="Title 1"/>
-          <p:cNvSpPr>
-            <a:spLocks noGrp="1"/>
-          </p:cNvSpPr>
-          <p:nvPr>
-            <p:ph type="title"/>
-          </p:nvPr>
-        </p:nvSpPr>
-        <p:spPr>
-          <a:xfrm>
-            <a:off x="838200" y="963877"/>
-            <a:ext cx="3494362" cy="4930246"/>
-          </a:xfrm>
-        </p:spPr>
-        <p:txBody>
-          <a:bodyPr>
-            <a:normAutofit/>
-          </a:bodyPr>
-          <a:lstStyle/>
-          <a:p>
-            <a:pPr algn="r"/>
-            <a:r>
-              <a:rPr lang="en-US">
-                <a:solidFill>
-                  <a:schemeClr val="accent1"/>
-                </a:solidFill>
-              </a:rPr>
-              <a:t>Contents</a:t>
-            </a:r>
-          </a:p>
-        </p:txBody>
-      </p:sp>
-      <p:sp>
-        <p:nvSpPr>
-          <p:cNvPr id="3" name="Content Placeholder 2"/>
-          <p:cNvSpPr>
-            <a:spLocks noGrp="1"/>
-          </p:cNvSpPr>
-          <p:nvPr>
-            <p:ph type="body" idx="1"/>
-          </p:nvPr>
-        </p:nvSpPr>
-        <p:spPr>
-          <a:xfrm>
-            <a:off x="4976031" y="963877"/>
-            <a:ext cx="6377769" cy="4930246"/>
-          </a:xfrm>
-        </p:spPr>
-        <p:txBody>
-          <a:bodyPr anchor="ctr">
-            <a:normAutofit/>
-          </a:bodyPr>
-          <a:lstStyle/>
-          <a:p>
-            <a:r>
-              <a:rPr lang="en-US" sz="2400"/>
-              <a:t>Project Reality: BF2</a:t>
-            </a:r>
-          </a:p>
-          <a:p>
-            <a:r>
-              <a:rPr lang="en-US" sz="2400"/>
-              <a:t>Project Reality: ARMA 2</a:t>
-            </a:r>
-          </a:p>
-          <a:p>
-            <a:r>
-              <a:rPr lang="en-US" sz="2400"/>
-              <a:t>Successors</a:t>
-            </a:r>
-          </a:p>
-          <a:p>
-            <a:r>
-              <a:rPr lang="en-US" sz="2400"/>
-              <a:t>Reception</a:t>
-            </a:r>
-          </a:p>
-        </p:txBody>
-      </p:sp>
-    </p:spTree>
-    <p:extLst>
-      <p:ext uri="{BB962C8B-B14F-4D97-AF65-F5344CB8AC3E}">
-        <p14:creationId xmlns:p14="http://schemas.microsoft.com/office/powerpoint/2010/main" val="3671686824"/>
-      </p:ext>
-    </p:extLst>
-  </p:cSld>
-  <p:clrMapOvr>
-    <a:masterClrMapping/>
-  </p:clrMapOvr>
-</p:sld>
-</file>
-
-<file path=ppt/slides/slide5.xml><?xml version="1.0" encoding="utf-8"?>
-<p:sld xmlns:a="http://schemas.openxmlformats.org/drawingml/2006/main" xmlns:r="http://schemas.openxmlformats.org/officeDocument/2006/relationships" xmlns:p="http://schemas.openxmlformats.org/presentationml/2006/main">
-  <p:cSld>
-    <p:bg>
-      <p:bgPr>
-        <a:solidFill>
-          <a:schemeClr val="tx1"/>
-        </a:solidFill>
-        <a:effectLst/>
-      </p:bgPr>
-    </p:bg>
-    <p:spTree>
-      <p:nvGrpSpPr>
-        <p:cNvPr id="1" name=""/>
-        <p:cNvGrpSpPr/>
-        <p:nvPr/>
-      </p:nvGrpSpPr>
-      <p:grpSpPr>
-        <a:xfrm>
-          <a:off x="0" y="0"/>
-          <a:ext cx="0" cy="0"/>
-          <a:chOff x="0" y="0"/>
-          <a:chExt cx="0" cy="0"/>
-        </a:xfrm>
-      </p:grpSpPr>
-      <p:sp>
-        <p:nvSpPr>
-          <p:cNvPr id="9" name="Rectangle 8">
-            <a:extLst>
-              <a:ext uri="{FF2B5EF4-FFF2-40B4-BE49-F238E27FC236}">
-                <a16:creationId xmlns:a16="http://schemas.microsoft.com/office/drawing/2014/main" id="{2A8AA5BC-4F7A-4226-8F99-6D824B226A97}"/>
-              </a:ext>
-            </a:extLst>
-          </p:cNvPr>
-          <p:cNvSpPr>
-            <a:spLocks noGrp="1" noRot="1" noChangeAspect="1" noMove="1" noResize="1" noEditPoints="1" noAdjustHandles="1" noChangeArrowheads="1" noChangeShapeType="1" noTextEdit="1"/>
-          </p:cNvSpPr>
-          <p:nvPr>
-            <p:extLst>
-              <p:ext uri="{386F3935-93C4-4BCD-93E2-E3B085C9AB24}">
-                <p16:designElem xmlns:p16="http://schemas.microsoft.com/office/powerpoint/2015/main" val="1"/>
-              </p:ext>
-            </p:extLst>
-          </p:nvPr>
-        </p:nvSpPr>
-        <p:spPr>
-          <a:xfrm>
-            <a:off x="0" y="-3324"/>
-            <a:ext cx="12192000" cy="6861324"/>
+            <a:off x="7311418" y="450221"/>
+            <a:ext cx="4421661" cy="5948858"/>
           </a:xfrm>
           <a:prstGeom prst="rect">
             <a:avLst/>
           </a:prstGeom>
           <a:solidFill>
-            <a:schemeClr val="tx1"/>
+            <a:schemeClr val="tx1">
+              <a:lumMod val="50000"/>
+              <a:lumOff val="50000"/>
+              <a:alpha val="20000"/>
+            </a:schemeClr>
           </a:solidFill>
           <a:ln>
             <a:noFill/>
@@ -5776,16 +6204,22 @@
           <a:lstStyle/>
           <a:p>
             <a:pPr algn="ctr"/>
-            <a:endParaRPr lang="en-US"/>
-          </a:p>
-        </p:txBody>
-      </p:sp>
-      <p:sp>
-        <p:nvSpPr>
-          <p:cNvPr id="11" name="Rectangle 10">
+            <a:endParaRPr lang="en-US">
+              <a:solidFill>
+                <a:schemeClr val="bg1">
+                  <a:lumMod val="85000"/>
+                </a:schemeClr>
+              </a:solidFill>
+            </a:endParaRPr>
+          </a:p>
+        </p:txBody>
+      </p:sp>
+      <p:sp>
+        <p:nvSpPr>
+          <p:cNvPr id="25" name="Rectangle 21">
             <a:extLst>
               <a:ext uri="{FF2B5EF4-FFF2-40B4-BE49-F238E27FC236}">
-                <a16:creationId xmlns:a16="http://schemas.microsoft.com/office/drawing/2014/main" id="{3E5445C6-DD42-4979-86FF-03730E8C6DB0}"/>
+                <a16:creationId xmlns:a16="http://schemas.microsoft.com/office/drawing/2014/main" id="{6166C6D1-23AC-49C4-BA07-238E4E9F8CEB}"/>
               </a:ext>
             </a:extLst>
           </p:cNvPr>
@@ -5800,253 +6234,18 @@
             </p:extLst>
           </p:nvPr>
         </p:nvSpPr>
-        <p:spPr bwMode="ltGray">
+        <p:spPr>
           <a:xfrm>
-            <a:off x="321734" y="321733"/>
-            <a:ext cx="11573488" cy="6214534"/>
+            <a:off x="462058" y="450221"/>
+            <a:ext cx="4402377" cy="3918123"/>
           </a:xfrm>
           <a:prstGeom prst="rect">
             <a:avLst/>
           </a:prstGeom>
           <a:solidFill>
-            <a:schemeClr val="bg1">
-              <a:lumMod val="75000"/>
-              <a:lumOff val="25000"/>
-            </a:schemeClr>
+            <a:srgbClr val="595959"/>
           </a:solidFill>
-          <a:ln w="127000" cap="sq" cmpd="thinThick">
-            <a:solidFill>
-              <a:schemeClr val="bg1">
-                <a:lumMod val="75000"/>
-                <a:lumOff val="25000"/>
-              </a:schemeClr>
-            </a:solidFill>
-          </a:ln>
-        </p:spPr>
-        <p:style>
-          <a:lnRef idx="2">
-            <a:schemeClr val="accent1">
-              <a:shade val="50000"/>
-            </a:schemeClr>
-          </a:lnRef>
-          <a:fillRef idx="1">
-            <a:schemeClr val="accent1"/>
-          </a:fillRef>
-          <a:effectRef idx="0">
-            <a:schemeClr val="accent1"/>
-          </a:effectRef>
-          <a:fontRef idx="minor">
-            <a:schemeClr val="lt1"/>
-          </a:fontRef>
-        </p:style>
-        <p:txBody>
-          <a:bodyPr rtlCol="0" anchor="ctr"/>
-          <a:lstStyle/>
-          <a:p>
-            <a:pPr algn="ctr"/>
-            <a:endParaRPr lang="en-US"/>
-          </a:p>
-        </p:txBody>
-      </p:sp>
-      <p:cxnSp>
-        <p:nvCxnSpPr>
-          <p:cNvPr id="13" name="Straight Connector 12">
-            <a:extLst>
-              <a:ext uri="{FF2B5EF4-FFF2-40B4-BE49-F238E27FC236}">
-                <a16:creationId xmlns:a16="http://schemas.microsoft.com/office/drawing/2014/main" id="{45000665-DFC7-417E-8FD7-516A0F15C975}"/>
-              </a:ext>
-            </a:extLst>
-          </p:cNvPr>
-          <p:cNvCxnSpPr>
-            <a:cxnSpLocks noGrp="1" noRot="1" noChangeAspect="1" noMove="1" noResize="1" noEditPoints="1" noAdjustHandles="1" noChangeArrowheads="1" noChangeShapeType="1"/>
-          </p:cNvCxnSpPr>
-          <p:nvPr>
-            <p:extLst>
-              <p:ext uri="{386F3935-93C4-4BCD-93E2-E3B085C9AB24}">
-                <p16:designElem xmlns:p16="http://schemas.microsoft.com/office/powerpoint/2015/main" val="1"/>
-              </p:ext>
-            </p:extLst>
-          </p:nvPr>
-        </p:nvCxnSpPr>
-        <p:spPr>
-          <a:xfrm>
-            <a:off x="4724400" y="4109417"/>
-            <a:ext cx="2743200" cy="0"/>
-          </a:xfrm>
-          <a:prstGeom prst="line">
-            <a:avLst/>
-          </a:prstGeom>
-          <a:ln w="12700">
-            <a:solidFill>
-              <a:schemeClr val="tx1">
-                <a:lumMod val="85000"/>
-              </a:schemeClr>
-            </a:solidFill>
-          </a:ln>
-        </p:spPr>
-        <p:style>
-          <a:lnRef idx="1">
-            <a:schemeClr val="accent1"/>
-          </a:lnRef>
-          <a:fillRef idx="0">
-            <a:schemeClr val="accent1"/>
-          </a:fillRef>
-          <a:effectRef idx="0">
-            <a:schemeClr val="accent1"/>
-          </a:effectRef>
-          <a:fontRef idx="minor">
-            <a:schemeClr val="tx1"/>
-          </a:fontRef>
-        </p:style>
-      </p:cxnSp>
-      <p:sp>
-        <p:nvSpPr>
-          <p:cNvPr id="2" name="Title 1"/>
-          <p:cNvSpPr>
-            <a:spLocks noGrp="1"/>
-          </p:cNvSpPr>
-          <p:nvPr>
-            <p:ph type="title"/>
-          </p:nvPr>
-        </p:nvSpPr>
-        <p:spPr>
-          <a:xfrm>
-            <a:off x="1524000" y="1122362"/>
-            <a:ext cx="9144000" cy="2840037"/>
-          </a:xfrm>
-        </p:spPr>
-        <p:txBody>
-          <a:bodyPr vert="horz" lIns="91440" tIns="45720" rIns="91440" bIns="45720" rtlCol="0" anchor="b">
-            <a:normAutofit/>
-          </a:bodyPr>
-          <a:lstStyle/>
-          <a:p>
-            <a:pPr algn="ctr"/>
-            <a:r>
-              <a:rPr lang="en-US" sz="5800" kern="1200">
-                <a:solidFill>
-                  <a:schemeClr val="tx1"/>
-                </a:solidFill>
-                <a:latin typeface="+mj-lt"/>
-                <a:ea typeface="+mj-ea"/>
-                <a:cs typeface="+mj-cs"/>
-              </a:rPr>
-              <a:t>Project Reality: BF2</a:t>
-            </a:r>
-          </a:p>
-        </p:txBody>
-      </p:sp>
-      <p:sp>
-        <p:nvSpPr>
-          <p:cNvPr id="3" name="Content Placeholder 2"/>
-          <p:cNvSpPr>
-            <a:spLocks noGrp="1"/>
-          </p:cNvSpPr>
-          <p:nvPr>
-            <p:ph idx="1"/>
-          </p:nvPr>
-        </p:nvSpPr>
-        <p:spPr>
-          <a:xfrm>
-            <a:off x="1524000" y="4256436"/>
-            <a:ext cx="9144000" cy="1600818"/>
-          </a:xfrm>
-        </p:spPr>
-        <p:txBody>
-          <a:bodyPr vert="horz" lIns="91440" tIns="45720" rIns="91440" bIns="45720" rtlCol="0">
-            <a:normAutofit/>
-          </a:bodyPr>
-          <a:lstStyle/>
-          <a:p>
-            <a:pPr marL="0" indent="0" algn="ctr">
-              <a:buNone/>
-            </a:pPr>
-            <a:r>
-              <a:rPr lang="en-US" sz="2400" kern="1200">
-                <a:solidFill>
-                  <a:schemeClr val="accent1"/>
-                </a:solidFill>
-                <a:latin typeface="+mn-lt"/>
-                <a:ea typeface="+mn-ea"/>
-                <a:cs typeface="+mn-cs"/>
-              </a:rPr>
-              <a:t>Look in the slide notes below for topics to consider talking about</a:t>
-            </a:r>
-          </a:p>
-        </p:txBody>
-      </p:sp>
-    </p:spTree>
-    <p:extLst>
-      <p:ext uri="{BB962C8B-B14F-4D97-AF65-F5344CB8AC3E}">
-        <p14:creationId xmlns:p14="http://schemas.microsoft.com/office/powerpoint/2010/main" val="1584319767"/>
-      </p:ext>
-    </p:extLst>
-  </p:cSld>
-  <p:clrMapOvr>
-    <a:overrideClrMapping bg1="dk1" tx1="lt1" bg2="dk2" tx2="lt2" accent1="accent1" accent2="accent2" accent3="accent3" accent4="accent4" accent5="accent5" accent6="accent6" hlink="hlink" folHlink="folHlink"/>
-  </p:clrMapOvr>
-</p:sld>
-</file>
-
-<file path=ppt/slides/slide6.xml><?xml version="1.0" encoding="utf-8"?>
-<p:sld xmlns:a="http://schemas.openxmlformats.org/drawingml/2006/main" xmlns:r="http://schemas.openxmlformats.org/officeDocument/2006/relationships" xmlns:p="http://schemas.openxmlformats.org/presentationml/2006/main">
-  <p:cSld>
-    <p:bg>
-      <p:bgPr>
-        <a:solidFill>
-          <a:schemeClr val="bg1"/>
-        </a:solidFill>
-        <a:effectLst/>
-      </p:bgPr>
-    </p:bg>
-    <p:spTree>
-      <p:nvGrpSpPr>
-        <p:cNvPr id="1" name=""/>
-        <p:cNvGrpSpPr/>
-        <p:nvPr/>
-      </p:nvGrpSpPr>
-      <p:grpSpPr>
-        <a:xfrm>
-          <a:off x="0" y="0"/>
-          <a:ext cx="0" cy="0"/>
-          <a:chOff x="0" y="0"/>
-          <a:chExt cx="0" cy="0"/>
-        </a:xfrm>
-      </p:grpSpPr>
-      <p:sp>
-        <p:nvSpPr>
-          <p:cNvPr id="9" name="Rectangle 8">
-            <a:extLst>
-              <a:ext uri="{FF2B5EF4-FFF2-40B4-BE49-F238E27FC236}">
-                <a16:creationId xmlns:a16="http://schemas.microsoft.com/office/drawing/2014/main" id="{8D70B121-56F4-4848-B38B-182089D909FA}"/>
-              </a:ext>
-            </a:extLst>
-          </p:cNvPr>
-          <p:cNvSpPr>
-            <a:spLocks noGrp="1" noRot="1" noChangeAspect="1" noMove="1" noResize="1" noEditPoints="1" noAdjustHandles="1" noChangeArrowheads="1" noChangeShapeType="1" noTextEdit="1"/>
-          </p:cNvSpPr>
-          <p:nvPr>
-            <p:extLst>
-              <p:ext uri="{386F3935-93C4-4BCD-93E2-E3B085C9AB24}">
-                <p16:designElem xmlns:p16="http://schemas.microsoft.com/office/powerpoint/2015/main" val="1"/>
-              </p:ext>
-            </p:extLst>
-          </p:nvPr>
-        </p:nvSpPr>
-        <p:spPr bwMode="ltGray">
-          <a:xfrm>
-            <a:off x="321564" y="320040"/>
-            <a:ext cx="11548872" cy="6217920"/>
-          </a:xfrm>
-          <a:prstGeom prst="rect">
-            <a:avLst/>
-          </a:prstGeom>
-          <a:solidFill>
-            <a:schemeClr val="tx1">
-              <a:alpha val="8000"/>
-            </a:schemeClr>
-          </a:solidFill>
-          <a:ln w="127000" cap="sq" cmpd="thinThick">
+          <a:ln w="25400">
             <a:noFill/>
           </a:ln>
         </p:spPr>
@@ -6071,22 +6270,26 @@
           <a:lstStyle/>
           <a:p>
             <a:pPr algn="ctr"/>
-            <a:endParaRPr lang="en-US"/>
-          </a:p>
-        </p:txBody>
-      </p:sp>
-      <p:cxnSp>
-        <p:nvCxnSpPr>
-          <p:cNvPr id="11" name="Straight Connector 10">
+            <a:endParaRPr lang="en-US">
+              <a:solidFill>
+                <a:srgbClr val="FFFFFF"/>
+              </a:solidFill>
+            </a:endParaRPr>
+          </a:p>
+        </p:txBody>
+      </p:sp>
+      <p:sp>
+        <p:nvSpPr>
+          <p:cNvPr id="24" name="Rectangle 23">
             <a:extLst>
               <a:ext uri="{FF2B5EF4-FFF2-40B4-BE49-F238E27FC236}">
-                <a16:creationId xmlns:a16="http://schemas.microsoft.com/office/drawing/2014/main" id="{2D72A2C9-F3CA-4216-8BAD-FA4C970C3C4E}"/>
+                <a16:creationId xmlns:a16="http://schemas.microsoft.com/office/drawing/2014/main" id="{B775CD93-9DF2-48CB-9F57-1BCA9A46C7FA}"/>
               </a:ext>
             </a:extLst>
           </p:cNvPr>
-          <p:cNvCxnSpPr>
-            <a:cxnSpLocks noGrp="1" noRot="1" noChangeAspect="1" noMove="1" noResize="1" noEditPoints="1" noAdjustHandles="1" noChangeArrowheads="1" noChangeShapeType="1"/>
-          </p:cNvCxnSpPr>
+          <p:cNvSpPr>
+            <a:spLocks noGrp="1" noRot="1" noChangeAspect="1" noMove="1" noResize="1" noEditPoints="1" noAdjustHandles="1" noChangeArrowheads="1" noChangeShapeType="1" noTextEdit="1"/>
+          </p:cNvSpPr>
           <p:nvPr>
             <p:extLst>
               <p:ext uri="{386F3935-93C4-4BCD-93E2-E3B085C9AB24}">
@@ -6094,171 +6297,19 @@
               </p:ext>
             </p:extLst>
           </p:nvPr>
-        </p:nvCxnSpPr>
+        </p:nvSpPr>
         <p:spPr>
           <a:xfrm>
-            <a:off x="4654296" y="2057400"/>
-            <a:ext cx="0" cy="2743200"/>
-          </a:xfrm>
-          <a:prstGeom prst="line">
-            <a:avLst/>
-          </a:prstGeom>
-          <a:ln w="19050">
-            <a:solidFill>
-              <a:schemeClr val="tx1">
-                <a:lumMod val="85000"/>
-                <a:lumOff val="15000"/>
-              </a:schemeClr>
-            </a:solidFill>
-          </a:ln>
-        </p:spPr>
-        <p:style>
-          <a:lnRef idx="1">
-            <a:schemeClr val="accent1"/>
-          </a:lnRef>
-          <a:fillRef idx="0">
-            <a:schemeClr val="accent1"/>
-          </a:fillRef>
-          <a:effectRef idx="0">
-            <a:schemeClr val="accent1"/>
-          </a:effectRef>
-          <a:fontRef idx="minor">
-            <a:schemeClr val="tx1"/>
-          </a:fontRef>
-        </p:style>
-      </p:cxnSp>
-      <p:sp>
-        <p:nvSpPr>
-          <p:cNvPr id="2" name="Title 1"/>
-          <p:cNvSpPr>
-            <a:spLocks noGrp="1"/>
-          </p:cNvSpPr>
-          <p:nvPr>
-            <p:ph type="title"/>
-          </p:nvPr>
-        </p:nvSpPr>
-        <p:spPr>
-          <a:xfrm>
-            <a:off x="838200" y="963877"/>
-            <a:ext cx="3494362" cy="4930246"/>
-          </a:xfrm>
-        </p:spPr>
-        <p:txBody>
-          <a:bodyPr>
-            <a:normAutofit/>
-          </a:bodyPr>
-          <a:lstStyle/>
-          <a:p>
-            <a:pPr algn="r"/>
-            <a:r>
-              <a:rPr lang="en-US">
-                <a:solidFill>
-                  <a:schemeClr val="accent1"/>
-                </a:solidFill>
-              </a:rPr>
-              <a:t>Project Reality: ARMA 2</a:t>
-            </a:r>
-          </a:p>
-        </p:txBody>
-      </p:sp>
-      <p:sp>
-        <p:nvSpPr>
-          <p:cNvPr id="3" name="Content Placeholder 2"/>
-          <p:cNvSpPr>
-            <a:spLocks noGrp="1"/>
-          </p:cNvSpPr>
-          <p:nvPr>
-            <p:ph idx="1"/>
-          </p:nvPr>
-        </p:nvSpPr>
-        <p:spPr>
-          <a:xfrm>
-            <a:off x="4976031" y="963877"/>
-            <a:ext cx="6377769" cy="4930246"/>
-          </a:xfrm>
-        </p:spPr>
-        <p:txBody>
-          <a:bodyPr anchor="ctr">
-            <a:normAutofit/>
-          </a:bodyPr>
-          <a:lstStyle/>
-          <a:p>
-            <a:endParaRPr sz="2400"/>
-          </a:p>
-        </p:txBody>
-      </p:sp>
-    </p:spTree>
-    <p:extLst>
-      <p:ext uri="{BB962C8B-B14F-4D97-AF65-F5344CB8AC3E}">
-        <p14:creationId xmlns:p14="http://schemas.microsoft.com/office/powerpoint/2010/main" val="4086298038"/>
-      </p:ext>
-    </p:extLst>
-  </p:cSld>
-  <p:clrMapOvr>
-    <a:masterClrMapping/>
-  </p:clrMapOvr>
-</p:sld>
-</file>
-
-<file path=ppt/slides/slide7.xml><?xml version="1.0" encoding="utf-8"?>
-<p:sld xmlns:a="http://schemas.openxmlformats.org/drawingml/2006/main" xmlns:r="http://schemas.openxmlformats.org/officeDocument/2006/relationships" xmlns:p="http://schemas.openxmlformats.org/presentationml/2006/main">
-  <p:cSld>
-    <p:bg>
-      <p:bgPr>
-        <a:solidFill>
-          <a:schemeClr val="bg1"/>
-        </a:solidFill>
-        <a:effectLst/>
-      </p:bgPr>
-    </p:bg>
-    <p:spTree>
-      <p:nvGrpSpPr>
-        <p:cNvPr id="1" name=""/>
-        <p:cNvGrpSpPr/>
-        <p:nvPr/>
-      </p:nvGrpSpPr>
-      <p:grpSpPr>
-        <a:xfrm>
-          <a:off x="0" y="0"/>
-          <a:ext cx="0" cy="0"/>
-          <a:chOff x="0" y="0"/>
-          <a:chExt cx="0" cy="0"/>
-        </a:xfrm>
-      </p:grpSpPr>
-      <p:sp>
-        <p:nvSpPr>
-          <p:cNvPr id="9" name="Rectangle 8">
-            <a:extLst>
-              <a:ext uri="{FF2B5EF4-FFF2-40B4-BE49-F238E27FC236}">
-                <a16:creationId xmlns:a16="http://schemas.microsoft.com/office/drawing/2014/main" id="{8D70B121-56F4-4848-B38B-182089D909FA}"/>
-              </a:ext>
-            </a:extLst>
-          </p:cNvPr>
-          <p:cNvSpPr>
-            <a:spLocks noGrp="1" noRot="1" noChangeAspect="1" noMove="1" noResize="1" noEditPoints="1" noAdjustHandles="1" noChangeArrowheads="1" noChangeShapeType="1" noTextEdit="1"/>
-          </p:cNvSpPr>
-          <p:nvPr>
-            <p:extLst>
-              <p:ext uri="{386F3935-93C4-4BCD-93E2-E3B085C9AB24}">
-                <p16:designElem xmlns:p16="http://schemas.microsoft.com/office/powerpoint/2015/main" val="1"/>
-              </p:ext>
-            </p:extLst>
-          </p:nvPr>
-        </p:nvSpPr>
-        <p:spPr bwMode="ltGray">
-          <a:xfrm>
-            <a:off x="321564" y="320040"/>
-            <a:ext cx="11548872" cy="6217920"/>
+            <a:off x="458921" y="4521269"/>
+            <a:ext cx="6697525" cy="1877811"/>
           </a:xfrm>
           <a:prstGeom prst="rect">
             <a:avLst/>
           </a:prstGeom>
           <a:solidFill>
-            <a:schemeClr val="tx1">
-              <a:alpha val="8000"/>
-            </a:schemeClr>
+            <a:schemeClr val="accent1"/>
           </a:solidFill>
-          <a:ln w="127000" cap="sq" cmpd="thinThick">
+          <a:ln w="25400">
             <a:noFill/>
           </a:ln>
         </p:spPr>
@@ -6283,786 +6334,237 @@
           <a:lstStyle/>
           <a:p>
             <a:pPr algn="ctr"/>
-            <a:endParaRPr lang="en-US"/>
-          </a:p>
-        </p:txBody>
-      </p:sp>
-      <p:cxnSp>
-        <p:nvCxnSpPr>
-          <p:cNvPr id="11" name="Straight Connector 10">
+            <a:endParaRPr lang="en-US">
+              <a:solidFill>
+                <a:srgbClr val="FFFFFF"/>
+              </a:solidFill>
+            </a:endParaRPr>
+          </a:p>
+        </p:txBody>
+      </p:sp>
+      <p:pic>
+        <p:nvPicPr>
+          <p:cNvPr id="15" name="Graphic 14">
             <a:extLst>
               <a:ext uri="{FF2B5EF4-FFF2-40B4-BE49-F238E27FC236}">
-                <a16:creationId xmlns:a16="http://schemas.microsoft.com/office/drawing/2014/main" id="{2D72A2C9-F3CA-4216-8BAD-FA4C970C3C4E}"/>
+                <a16:creationId xmlns:a16="http://schemas.microsoft.com/office/drawing/2014/main" id="{0D20834C-6D87-4B4E-BD86-3ABB81CEA6CC}"/>
               </a:ext>
             </a:extLst>
           </p:cNvPr>
-          <p:cNvCxnSpPr>
-            <a:cxnSpLocks noGrp="1" noRot="1" noChangeAspect="1" noMove="1" noResize="1" noEditPoints="1" noAdjustHandles="1" noChangeArrowheads="1" noChangeShapeType="1"/>
-          </p:cNvCxnSpPr>
-          <p:nvPr>
-            <p:extLst>
-              <p:ext uri="{386F3935-93C4-4BCD-93E2-E3B085C9AB24}">
-                <p16:designElem xmlns:p16="http://schemas.microsoft.com/office/powerpoint/2015/main" val="1"/>
-              </p:ext>
-            </p:extLst>
-          </p:nvPr>
-        </p:nvCxnSpPr>
+          <p:cNvPicPr>
+            <a:picLocks noChangeAspect="1"/>
+          </p:cNvPicPr>
+          <p:nvPr/>
+        </p:nvPicPr>
+        <p:blipFill>
+          <a:blip r:embed="rId3">
+            <a:extLst>
+              <a:ext uri="{28A0092B-C50C-407E-A947-70E740481C1C}">
+                <a14:useLocalDpi xmlns:a14="http://schemas.microsoft.com/office/drawing/2010/main" val="0"/>
+              </a:ext>
+              <a:ext uri="{96DAC541-7B7A-43D3-8B79-37D633B846F1}">
+                <asvg:svgBlip xmlns:asvg="http://schemas.microsoft.com/office/drawing/2016/SVG/main" r:embed="rId4"/>
+              </a:ext>
+            </a:extLst>
+          </a:blip>
+          <a:stretch>
+            <a:fillRect/>
+          </a:stretch>
+        </p:blipFill>
         <p:spPr>
           <a:xfrm>
-            <a:off x="4654296" y="2057400"/>
-            <a:ext cx="0" cy="2743200"/>
-          </a:xfrm>
-          <a:prstGeom prst="line">
-            <a:avLst/>
-          </a:prstGeom>
-          <a:ln w="19050">
-            <a:solidFill>
-              <a:schemeClr val="tx1">
-                <a:lumMod val="85000"/>
-                <a:lumOff val="15000"/>
-              </a:schemeClr>
-            </a:solidFill>
-          </a:ln>
-        </p:spPr>
-        <p:style>
-          <a:lnRef idx="1">
-            <a:schemeClr val="accent1"/>
-          </a:lnRef>
-          <a:fillRef idx="0">
-            <a:schemeClr val="accent1"/>
-          </a:fillRef>
-          <a:effectRef idx="0">
-            <a:schemeClr val="accent1"/>
-          </a:effectRef>
-          <a:fontRef idx="minor">
-            <a:schemeClr val="tx1"/>
-          </a:fontRef>
-        </p:style>
-      </p:cxnSp>
-      <p:sp>
-        <p:nvSpPr>
-          <p:cNvPr id="2" name="Title 1"/>
-          <p:cNvSpPr>
-            <a:spLocks noGrp="1"/>
-          </p:cNvSpPr>
-          <p:nvPr>
-            <p:ph type="title"/>
-          </p:nvPr>
-        </p:nvSpPr>
-        <p:spPr>
-          <a:xfrm>
-            <a:off x="838200" y="963877"/>
-            <a:ext cx="3494362" cy="4930246"/>
-          </a:xfrm>
-        </p:spPr>
-        <p:txBody>
-          <a:bodyPr>
-            <a:normAutofit/>
-          </a:bodyPr>
-          <a:lstStyle/>
-          <a:p>
-            <a:pPr algn="r"/>
-            <a:r>
-              <a:rPr lang="en-US">
-                <a:solidFill>
-                  <a:schemeClr val="accent1"/>
-                </a:solidFill>
-              </a:rPr>
-              <a:t>Successors</a:t>
-            </a:r>
-          </a:p>
-        </p:txBody>
-      </p:sp>
-      <p:sp>
-        <p:nvSpPr>
-          <p:cNvPr id="3" name="Content Placeholder 2"/>
-          <p:cNvSpPr>
-            <a:spLocks noGrp="1"/>
-          </p:cNvSpPr>
-          <p:nvPr>
-            <p:ph idx="1"/>
-          </p:nvPr>
-        </p:nvSpPr>
-        <p:spPr>
-          <a:xfrm>
-            <a:off x="4976031" y="963877"/>
-            <a:ext cx="6377769" cy="4930246"/>
-          </a:xfrm>
-        </p:spPr>
-        <p:txBody>
-          <a:bodyPr anchor="ctr">
-            <a:normAutofit/>
-          </a:bodyPr>
-          <a:lstStyle/>
-          <a:p>
-            <a:endParaRPr sz="2400"/>
-          </a:p>
-        </p:txBody>
-      </p:sp>
-    </p:spTree>
-    <p:extLst>
-      <p:ext uri="{BB962C8B-B14F-4D97-AF65-F5344CB8AC3E}">
-        <p14:creationId xmlns:p14="http://schemas.microsoft.com/office/powerpoint/2010/main" val="501283776"/>
-      </p:ext>
-    </p:extLst>
-  </p:cSld>
-  <p:clrMapOvr>
-    <a:masterClrMapping/>
-  </p:clrMapOvr>
-</p:sld>
-</file>
-
-<file path=ppt/slides/slide8.xml><?xml version="1.0" encoding="utf-8"?>
-<p:sld xmlns:a="http://schemas.openxmlformats.org/drawingml/2006/main" xmlns:r="http://schemas.openxmlformats.org/officeDocument/2006/relationships" xmlns:p="http://schemas.openxmlformats.org/presentationml/2006/main">
-  <p:cSld>
-    <p:bg>
-      <p:bgPr>
-        <a:solidFill>
-          <a:schemeClr val="bg1"/>
-        </a:solidFill>
-        <a:effectLst/>
-      </p:bgPr>
-    </p:bg>
-    <p:spTree>
-      <p:nvGrpSpPr>
-        <p:cNvPr id="1" name=""/>
-        <p:cNvGrpSpPr/>
-        <p:nvPr/>
-      </p:nvGrpSpPr>
-      <p:grpSpPr>
-        <a:xfrm>
-          <a:off x="0" y="0"/>
-          <a:ext cx="0" cy="0"/>
-          <a:chOff x="0" y="0"/>
-          <a:chExt cx="0" cy="0"/>
-        </a:xfrm>
-      </p:grpSpPr>
-      <p:sp useBgFill="1">
-        <p:nvSpPr>
-          <p:cNvPr id="9" name="Rectangle 8">
-            <a:extLst>
-              <a:ext uri="{FF2B5EF4-FFF2-40B4-BE49-F238E27FC236}">
-                <a16:creationId xmlns:a16="http://schemas.microsoft.com/office/drawing/2014/main" id="{559AE206-7EBA-4D33-8BC9-9D8158553F0E}"/>
-              </a:ext>
-            </a:extLst>
-          </p:cNvPr>
-          <p:cNvSpPr>
-            <a:spLocks noGrp="1" noRot="1" noChangeAspect="1" noMove="1" noResize="1" noEditPoints="1" noAdjustHandles="1" noChangeArrowheads="1" noChangeShapeType="1" noTextEdit="1"/>
-          </p:cNvSpPr>
-          <p:nvPr>
-            <p:extLst>
-              <p:ext uri="{386F3935-93C4-4BCD-93E2-E3B085C9AB24}">
-                <p16:designElem xmlns:p16="http://schemas.microsoft.com/office/powerpoint/2015/main" val="1"/>
-              </p:ext>
-            </p:extLst>
-          </p:nvPr>
-        </p:nvSpPr>
-        <p:spPr>
-          <a:xfrm>
-            <a:off x="0" y="0"/>
-            <a:ext cx="12192000" cy="6858000"/>
+            <a:off x="5243078" y="2576514"/>
+            <a:ext cx="1705848" cy="1705848"/>
           </a:xfrm>
           <a:prstGeom prst="rect">
             <a:avLst/>
           </a:prstGeom>
-          <a:ln>
-            <a:noFill/>
-          </a:ln>
         </p:spPr>
-        <p:style>
-          <a:lnRef idx="2">
-            <a:schemeClr val="accent1">
-              <a:shade val="50000"/>
-            </a:schemeClr>
-          </a:lnRef>
-          <a:fillRef idx="1">
-            <a:schemeClr val="accent1"/>
-          </a:fillRef>
-          <a:effectRef idx="0">
-            <a:schemeClr val="accent1"/>
-          </a:effectRef>
-          <a:fontRef idx="minor">
-            <a:schemeClr val="lt1"/>
-          </a:fontRef>
-        </p:style>
-        <p:txBody>
-          <a:bodyPr rtlCol="0" anchor="ctr"/>
-          <a:lstStyle/>
-          <a:p>
-            <a:pPr marL="0" marR="0" lvl="0" indent="0" algn="ctr" defTabSz="914400" rtl="0" eaLnBrk="1" fontAlgn="auto" latinLnBrk="0" hangingPunct="1">
-              <a:lnSpc>
-                <a:spcPct val="100000"/>
-              </a:lnSpc>
-              <a:spcBef>
-                <a:spcPts val="0"/>
-              </a:spcBef>
-              <a:spcAft>
-                <a:spcPts val="0"/>
-              </a:spcAft>
-              <a:buClrTx/>
-              <a:buSzTx/>
-              <a:buFontTx/>
-              <a:buNone/>
-              <a:tabLst/>
-              <a:defRPr/>
-            </a:pPr>
-            <a:endParaRPr kumimoji="0" lang="en-US" sz="1800" b="0" i="0" u="none" strike="noStrike" kern="1200" cap="none" spc="0" normalizeH="0" baseline="0" noProof="0">
-              <a:ln>
-                <a:noFill/>
-              </a:ln>
-              <a:solidFill>
-                <a:prstClr val="white"/>
-              </a:solidFill>
-              <a:effectLst/>
-              <a:uLnTx/>
-              <a:uFillTx/>
-              <a:latin typeface="Calibri" panose="020F0502020204030204"/>
-              <a:ea typeface="+mn-ea"/>
-              <a:cs typeface="+mn-cs"/>
-            </a:endParaRPr>
-          </a:p>
-        </p:txBody>
-      </p:sp>
-      <p:cxnSp>
-        <p:nvCxnSpPr>
-          <p:cNvPr id="11" name="Straight Connector 10">
-            <a:extLst>
-              <a:ext uri="{FF2B5EF4-FFF2-40B4-BE49-F238E27FC236}">
-                <a16:creationId xmlns:a16="http://schemas.microsoft.com/office/drawing/2014/main" id="{9E8E38ED-369A-44C2-B635-0BED0E48A6E8}"/>
-              </a:ext>
-            </a:extLst>
-          </p:cNvPr>
-          <p:cNvCxnSpPr>
-            <a:cxnSpLocks noGrp="1" noRot="1" noChangeAspect="1" noMove="1" noResize="1" noEditPoints="1" noAdjustHandles="1" noChangeArrowheads="1" noChangeShapeType="1"/>
-          </p:cNvCxnSpPr>
-          <p:nvPr>
-            <p:extLst>
-              <p:ext uri="{386F3935-93C4-4BCD-93E2-E3B085C9AB24}">
-                <p16:designElem xmlns:p16="http://schemas.microsoft.com/office/powerpoint/2015/main" val="1"/>
-              </p:ext>
-            </p:extLst>
-          </p:nvPr>
-        </p:nvCxnSpPr>
+      </p:pic>
+      <p:sp>
+        <p:nvSpPr>
+          <p:cNvPr id="2" name="Title 1"/>
+          <p:cNvSpPr>
+            <a:spLocks noGrp="1"/>
+          </p:cNvSpPr>
+          <p:nvPr>
+            <p:ph type="title"/>
+          </p:nvPr>
+        </p:nvSpPr>
         <p:spPr>
           <a:xfrm>
-            <a:off x="7800392" y="4525347"/>
-            <a:ext cx="0" cy="1737360"/>
+            <a:off x="774700" y="762000"/>
+            <a:ext cx="3759200" cy="3340100"/>
           </a:xfrm>
-          <a:prstGeom prst="line">
-            <a:avLst/>
-          </a:prstGeom>
-          <a:ln w="19050" cap="sq">
-            <a:solidFill>
-              <a:schemeClr val="tx1"/>
-            </a:solidFill>
-          </a:ln>
         </p:spPr>
-        <p:style>
-          <a:lnRef idx="1">
-            <a:schemeClr val="accent1"/>
-          </a:lnRef>
-          <a:fillRef idx="0">
-            <a:schemeClr val="accent1"/>
-          </a:fillRef>
-          <a:effectRef idx="0">
-            <a:schemeClr val="accent1"/>
-          </a:effectRef>
-          <a:fontRef idx="minor">
-            <a:schemeClr val="tx1"/>
-          </a:fontRef>
-        </p:style>
-      </p:cxnSp>
-      <p:sp>
-        <p:nvSpPr>
-          <p:cNvPr id="13" name="Oval 12">
-            <a:extLst>
-              <a:ext uri="{FF2B5EF4-FFF2-40B4-BE49-F238E27FC236}">
-                <a16:creationId xmlns:a16="http://schemas.microsoft.com/office/drawing/2014/main" id="{B672F332-AF08-46C6-94F0-77684310D7B7}"/>
-              </a:ext>
-            </a:extLst>
-          </p:cNvPr>
-          <p:cNvSpPr>
-            <a:spLocks noGrp="1" noRot="1" noChangeAspect="1" noMove="1" noResize="1" noEditPoints="1" noAdjustHandles="1" noChangeArrowheads="1" noChangeShapeType="1" noTextEdit="1"/>
-          </p:cNvSpPr>
-          <p:nvPr>
-            <p:extLst>
-              <p:ext uri="{386F3935-93C4-4BCD-93E2-E3B085C9AB24}">
-                <p16:designElem xmlns:p16="http://schemas.microsoft.com/office/powerpoint/2015/main" val="1"/>
-              </p:ext>
-            </p:extLst>
+        <p:txBody>
+          <a:bodyPr>
+            <a:normAutofit/>
+          </a:bodyPr>
+          <a:lstStyle/>
+          <a:p>
+            <a:r>
+              <a:rPr lang="en-US" dirty="0">
+                <a:solidFill>
+                  <a:srgbClr val="FFFFFF"/>
+                </a:solidFill>
+              </a:rPr>
+              <a:t>INSTALLATION GUIDE</a:t>
+            </a:r>
+          </a:p>
+        </p:txBody>
+      </p:sp>
+      <p:sp>
+        <p:nvSpPr>
+          <p:cNvPr id="3" name="Content Placeholder 2"/>
+          <p:cNvSpPr>
+            <a:spLocks noGrp="1"/>
+          </p:cNvSpPr>
+          <p:nvPr>
+            <p:ph type="body" idx="1"/>
           </p:nvPr>
         </p:nvSpPr>
         <p:spPr>
           <a:xfrm>
-            <a:off x="3395001" y="2466604"/>
-            <a:ext cx="962395" cy="962395"/>
-          </a:xfrm>
-          <a:prstGeom prst="ellipse">
-            <a:avLst/>
-          </a:prstGeom>
-          <a:solidFill>
-            <a:schemeClr val="accent4"/>
-          </a:solidFill>
-          <a:ln>
-            <a:noFill/>
-          </a:ln>
-        </p:spPr>
-        <p:style>
-          <a:lnRef idx="2">
-            <a:schemeClr val="accent1">
-              <a:shade val="50000"/>
-            </a:schemeClr>
-          </a:lnRef>
-          <a:fillRef idx="1">
-            <a:schemeClr val="accent1"/>
-          </a:fillRef>
-          <a:effectRef idx="0">
-            <a:schemeClr val="accent1"/>
-          </a:effectRef>
-          <a:fontRef idx="minor">
-            <a:schemeClr val="lt1"/>
-          </a:fontRef>
-        </p:style>
-        <p:txBody>
-          <a:bodyPr rtlCol="0" anchor="ctr"/>
-          <a:lstStyle/>
-          <a:p>
-            <a:pPr marL="0" marR="0" lvl="0" indent="0" algn="ctr" defTabSz="914400" rtl="0" eaLnBrk="1" fontAlgn="auto" latinLnBrk="0" hangingPunct="1">
-              <a:lnSpc>
-                <a:spcPct val="100000"/>
-              </a:lnSpc>
-              <a:spcBef>
-                <a:spcPts val="0"/>
-              </a:spcBef>
-              <a:spcAft>
-                <a:spcPts val="0"/>
-              </a:spcAft>
-              <a:buClrTx/>
-              <a:buSzTx/>
-              <a:buFontTx/>
-              <a:buNone/>
-              <a:tabLst/>
-              <a:defRPr/>
-            </a:pPr>
-            <a:endParaRPr kumimoji="0" lang="en-US" sz="1800" b="0" i="0" u="none" strike="noStrike" kern="1200" cap="none" spc="0" normalizeH="0" baseline="0" noProof="0">
-              <a:ln>
-                <a:noFill/>
-              </a:ln>
-              <a:solidFill>
-                <a:prstClr val="white"/>
-              </a:solidFill>
-              <a:effectLst/>
-              <a:uLnTx/>
-              <a:uFillTx/>
-              <a:latin typeface="Calibri" panose="020F0502020204030204"/>
-              <a:ea typeface="+mn-ea"/>
-              <a:cs typeface="+mn-cs"/>
-            </a:endParaRPr>
-          </a:p>
-        </p:txBody>
-      </p:sp>
-      <p:sp>
-        <p:nvSpPr>
-          <p:cNvPr id="15" name="Oval 14">
-            <a:extLst>
-              <a:ext uri="{FF2B5EF4-FFF2-40B4-BE49-F238E27FC236}">
-                <a16:creationId xmlns:a16="http://schemas.microsoft.com/office/drawing/2014/main" id="{34244EF8-D73A-40E1-BE73-D46E6B4B04ED}"/>
-              </a:ext>
-            </a:extLst>
-          </p:cNvPr>
-          <p:cNvSpPr>
-            <a:spLocks noGrp="1" noRot="1" noChangeAspect="1" noMove="1" noResize="1" noEditPoints="1" noAdjustHandles="1" noChangeArrowheads="1" noChangeShapeType="1" noTextEdit="1"/>
-          </p:cNvSpPr>
-          <p:nvPr>
-            <p:extLst>
-              <p:ext uri="{386F3935-93C4-4BCD-93E2-E3B085C9AB24}">
-                <p16:designElem xmlns:p16="http://schemas.microsoft.com/office/powerpoint/2015/main" val="1"/>
-              </p:ext>
-            </p:extLst>
-          </p:nvPr>
-        </p:nvSpPr>
-        <p:spPr>
-          <a:xfrm>
-            <a:off x="5125829" y="2327988"/>
-            <a:ext cx="293695" cy="293695"/>
-          </a:xfrm>
-          <a:prstGeom prst="ellipse">
-            <a:avLst/>
-          </a:prstGeom>
-          <a:solidFill>
-            <a:schemeClr val="accent3"/>
-          </a:solidFill>
-          <a:ln>
-            <a:noFill/>
-          </a:ln>
-        </p:spPr>
-        <p:style>
-          <a:lnRef idx="2">
-            <a:schemeClr val="accent1">
-              <a:shade val="50000"/>
-            </a:schemeClr>
-          </a:lnRef>
-          <a:fillRef idx="1">
-            <a:schemeClr val="accent1"/>
-          </a:fillRef>
-          <a:effectRef idx="0">
-            <a:schemeClr val="accent1"/>
-          </a:effectRef>
-          <a:fontRef idx="minor">
-            <a:schemeClr val="lt1"/>
-          </a:fontRef>
-        </p:style>
-        <p:txBody>
-          <a:bodyPr rtlCol="0" anchor="ctr"/>
-          <a:lstStyle/>
-          <a:p>
-            <a:pPr marL="0" marR="0" lvl="0" indent="0" algn="ctr" defTabSz="914400" rtl="0" eaLnBrk="1" fontAlgn="auto" latinLnBrk="0" hangingPunct="1">
-              <a:lnSpc>
-                <a:spcPct val="100000"/>
-              </a:lnSpc>
-              <a:spcBef>
-                <a:spcPts val="0"/>
-              </a:spcBef>
-              <a:spcAft>
-                <a:spcPts val="0"/>
-              </a:spcAft>
-              <a:buClrTx/>
-              <a:buSzTx/>
-              <a:buFontTx/>
-              <a:buNone/>
-              <a:tabLst/>
-              <a:defRPr/>
-            </a:pPr>
-            <a:endParaRPr kumimoji="0" lang="en-US" sz="1800" b="0" i="0" u="none" strike="noStrike" kern="1200" cap="none" spc="0" normalizeH="0" baseline="0" noProof="0">
-              <a:ln>
-                <a:noFill/>
-              </a:ln>
-              <a:solidFill>
-                <a:prstClr val="white"/>
-              </a:solidFill>
-              <a:effectLst/>
-              <a:uLnTx/>
-              <a:uFillTx/>
-              <a:latin typeface="Calibri" panose="020F0502020204030204"/>
-              <a:ea typeface="+mn-ea"/>
-              <a:cs typeface="+mn-cs"/>
-            </a:endParaRPr>
-          </a:p>
-        </p:txBody>
-      </p:sp>
-      <p:sp>
-        <p:nvSpPr>
-          <p:cNvPr id="17" name="Oval 16">
-            <a:extLst>
-              <a:ext uri="{FF2B5EF4-FFF2-40B4-BE49-F238E27FC236}">
-                <a16:creationId xmlns:a16="http://schemas.microsoft.com/office/drawing/2014/main" id="{6437D937-A7F1-4011-92B4-328E5BE1B166}"/>
-              </a:ext>
-            </a:extLst>
-          </p:cNvPr>
-          <p:cNvSpPr>
-            <a:spLocks noGrp="1" noRot="1" noChangeAspect="1" noMove="1" noResize="1" noEditPoints="1" noAdjustHandles="1" noChangeArrowheads="1" noChangeShapeType="1" noTextEdit="1"/>
-          </p:cNvSpPr>
-          <p:nvPr>
-            <p:extLst>
-              <p:ext uri="{386F3935-93C4-4BCD-93E2-E3B085C9AB24}">
-                <p16:designElem xmlns:p16="http://schemas.microsoft.com/office/powerpoint/2015/main" val="1"/>
-              </p:ext>
-            </p:extLst>
-          </p:nvPr>
-        </p:nvSpPr>
-        <p:spPr>
-          <a:xfrm>
-            <a:off x="588567" y="620480"/>
-            <a:ext cx="2243800" cy="2243796"/>
-          </a:xfrm>
-          <a:prstGeom prst="ellipse">
-            <a:avLst/>
-          </a:prstGeom>
-          <a:solidFill>
-            <a:schemeClr val="accent5"/>
-          </a:solidFill>
-          <a:ln>
-            <a:noFill/>
-          </a:ln>
-        </p:spPr>
-        <p:style>
-          <a:lnRef idx="2">
-            <a:schemeClr val="accent1">
-              <a:shade val="50000"/>
-            </a:schemeClr>
-          </a:lnRef>
-          <a:fillRef idx="1">
-            <a:schemeClr val="accent1"/>
-          </a:fillRef>
-          <a:effectRef idx="0">
-            <a:schemeClr val="accent1"/>
-          </a:effectRef>
-          <a:fontRef idx="minor">
-            <a:schemeClr val="lt1"/>
-          </a:fontRef>
-        </p:style>
-        <p:txBody>
-          <a:bodyPr rtlCol="0" anchor="ctr"/>
-          <a:lstStyle/>
-          <a:p>
-            <a:pPr marL="0" marR="0" lvl="0" indent="0" algn="ctr" defTabSz="914400" rtl="0" eaLnBrk="1" fontAlgn="auto" latinLnBrk="0" hangingPunct="1">
-              <a:lnSpc>
-                <a:spcPct val="100000"/>
-              </a:lnSpc>
-              <a:spcBef>
-                <a:spcPts val="0"/>
-              </a:spcBef>
-              <a:spcAft>
-                <a:spcPts val="0"/>
-              </a:spcAft>
-              <a:buClrTx/>
-              <a:buSzTx/>
-              <a:buFontTx/>
-              <a:buNone/>
-              <a:tabLst/>
-              <a:defRPr/>
-            </a:pPr>
-            <a:endParaRPr kumimoji="0" lang="en-US" sz="1800" b="0" i="0" u="none" strike="noStrike" kern="1200" cap="none" spc="0" normalizeH="0" baseline="0" noProof="0">
-              <a:ln>
-                <a:noFill/>
-              </a:ln>
-              <a:solidFill>
-                <a:prstClr val="white"/>
-              </a:solidFill>
-              <a:effectLst/>
-              <a:uLnTx/>
-              <a:uFillTx/>
-              <a:latin typeface="Calibri" panose="020F0502020204030204"/>
-              <a:ea typeface="+mn-ea"/>
-              <a:cs typeface="+mn-cs"/>
-            </a:endParaRPr>
-          </a:p>
-        </p:txBody>
-      </p:sp>
-      <p:sp>
-        <p:nvSpPr>
-          <p:cNvPr id="19" name="Freeform: Shape 18">
-            <a:extLst>
-              <a:ext uri="{FF2B5EF4-FFF2-40B4-BE49-F238E27FC236}">
-                <a16:creationId xmlns:a16="http://schemas.microsoft.com/office/drawing/2014/main" id="{AB84D7E8-4ECB-42D7-ADBF-01689B0F24AE}"/>
-              </a:ext>
-            </a:extLst>
-          </p:cNvPr>
-          <p:cNvSpPr>
-            <a:spLocks noGrp="1" noRot="1" noChangeAspect="1" noMove="1" noResize="1" noEditPoints="1" noAdjustHandles="1" noChangeArrowheads="1" noChangeShapeType="1" noTextEdit="1"/>
-          </p:cNvSpPr>
-          <p:nvPr>
-            <p:extLst>
-              <p:ext uri="{386F3935-93C4-4BCD-93E2-E3B085C9AB24}">
-                <p16:designElem xmlns:p16="http://schemas.microsoft.com/office/powerpoint/2015/main" val="1"/>
-              </p:ext>
-            </p:extLst>
-          </p:nvPr>
-        </p:nvSpPr>
-        <p:spPr>
-          <a:xfrm>
-            <a:off x="6492113" y="0"/>
-            <a:ext cx="5699887" cy="4059244"/>
-          </a:xfrm>
-          <a:custGeom>
-            <a:avLst/>
-            <a:gdLst>
-              <a:gd name="connsiteX0" fmla="*/ 0 w 5699887"/>
-              <a:gd name="connsiteY0" fmla="*/ 0 h 4059244"/>
-              <a:gd name="connsiteX1" fmla="*/ 5699887 w 5699887"/>
-              <a:gd name="connsiteY1" fmla="*/ 0 h 4059244"/>
-              <a:gd name="connsiteX2" fmla="*/ 5699887 w 5699887"/>
-              <a:gd name="connsiteY2" fmla="*/ 3944096 h 4059244"/>
-              <a:gd name="connsiteX3" fmla="*/ 5525775 w 5699887"/>
-              <a:gd name="connsiteY3" fmla="*/ 3980429 h 4059244"/>
-              <a:gd name="connsiteX4" fmla="*/ 4663256 w 5699887"/>
-              <a:gd name="connsiteY4" fmla="*/ 4059244 h 4059244"/>
-              <a:gd name="connsiteX5" fmla="*/ 8566 w 5699887"/>
-              <a:gd name="connsiteY5" fmla="*/ 67422 h 4059244"/>
-            </a:gdLst>
-            <a:ahLst/>
-            <a:cxnLst>
-              <a:cxn ang="0">
-                <a:pos x="connsiteX0" y="connsiteY0"/>
-              </a:cxn>
-              <a:cxn ang="0">
-                <a:pos x="connsiteX1" y="connsiteY1"/>
-              </a:cxn>
-              <a:cxn ang="0">
-                <a:pos x="connsiteX2" y="connsiteY2"/>
-              </a:cxn>
-              <a:cxn ang="0">
-                <a:pos x="connsiteX3" y="connsiteY3"/>
-              </a:cxn>
-              <a:cxn ang="0">
-                <a:pos x="connsiteX4" y="connsiteY4"/>
-              </a:cxn>
-              <a:cxn ang="0">
-                <a:pos x="connsiteX5" y="connsiteY5"/>
-              </a:cxn>
-            </a:cxnLst>
-            <a:rect l="l" t="t" r="r" b="b"/>
-            <a:pathLst>
-              <a:path w="5699887" h="4059244">
-                <a:moveTo>
-                  <a:pt x="0" y="0"/>
-                </a:moveTo>
-                <a:lnTo>
-                  <a:pt x="5699887" y="0"/>
-                </a:lnTo>
-                <a:lnTo>
-                  <a:pt x="5699887" y="3944096"/>
-                </a:lnTo>
-                <a:lnTo>
-                  <a:pt x="5525775" y="3980429"/>
-                </a:lnTo>
-                <a:cubicBezTo>
-                  <a:pt x="5246154" y="4032190"/>
-                  <a:pt x="4957865" y="4059244"/>
-                  <a:pt x="4663256" y="4059244"/>
-                </a:cubicBezTo>
-                <a:cubicBezTo>
-                  <a:pt x="2306390" y="4059244"/>
-                  <a:pt x="353936" y="2327747"/>
-                  <a:pt x="8566" y="67422"/>
-                </a:cubicBezTo>
-                <a:close/>
-              </a:path>
-            </a:pathLst>
-          </a:custGeom>
-          <a:solidFill>
-            <a:srgbClr val="595959"/>
-          </a:solidFill>
-          <a:ln>
-            <a:noFill/>
-          </a:ln>
-        </p:spPr>
-        <p:style>
-          <a:lnRef idx="2">
-            <a:schemeClr val="accent1">
-              <a:shade val="50000"/>
-            </a:schemeClr>
-          </a:lnRef>
-          <a:fillRef idx="1">
-            <a:schemeClr val="accent1"/>
-          </a:fillRef>
-          <a:effectRef idx="0">
-            <a:schemeClr val="accent1"/>
-          </a:effectRef>
-          <a:fontRef idx="minor">
-            <a:schemeClr val="lt1"/>
-          </a:fontRef>
-        </p:style>
-        <p:txBody>
-          <a:bodyPr rtlCol="0" anchor="ctr"/>
-          <a:lstStyle/>
-          <a:p>
-            <a:pPr marL="0" marR="0" lvl="0" indent="0" algn="ctr" defTabSz="914400" rtl="0" eaLnBrk="1" fontAlgn="auto" latinLnBrk="0" hangingPunct="1">
-              <a:lnSpc>
-                <a:spcPct val="100000"/>
-              </a:lnSpc>
-              <a:spcBef>
-                <a:spcPts val="0"/>
-              </a:spcBef>
-              <a:spcAft>
-                <a:spcPts val="0"/>
-              </a:spcAft>
-              <a:buClrTx/>
-              <a:buSzTx/>
-              <a:buFontTx/>
-              <a:buNone/>
-              <a:tabLst/>
-              <a:defRPr/>
-            </a:pPr>
-            <a:endParaRPr kumimoji="0" lang="en-US" sz="1800" b="0" i="0" u="none" strike="noStrike" kern="1200" cap="none" spc="0" normalizeH="0" baseline="0" noProof="0">
-              <a:ln>
-                <a:noFill/>
-              </a:ln>
-              <a:solidFill>
-                <a:prstClr val="white"/>
-              </a:solidFill>
-              <a:effectLst/>
-              <a:uLnTx/>
-              <a:uFillTx/>
-              <a:latin typeface="Calibri" panose="020F0502020204030204"/>
-              <a:ea typeface="+mn-ea"/>
-              <a:cs typeface="+mn-cs"/>
-            </a:endParaRPr>
-          </a:p>
-        </p:txBody>
-      </p:sp>
-      <p:sp>
-        <p:nvSpPr>
-          <p:cNvPr id="2" name="Title 1"/>
-          <p:cNvSpPr>
-            <a:spLocks noGrp="1"/>
-          </p:cNvSpPr>
-          <p:nvPr>
-            <p:ph type="title"/>
-          </p:nvPr>
-        </p:nvSpPr>
-        <p:spPr>
-          <a:xfrm>
-            <a:off x="838199" y="4525347"/>
-            <a:ext cx="6801321" cy="1737360"/>
+            <a:off x="7658103" y="795548"/>
+            <a:ext cx="3759198" cy="5275603"/>
           </a:xfrm>
         </p:spPr>
         <p:txBody>
-          <a:bodyPr vert="horz" lIns="91440" tIns="45720" rIns="91440" bIns="45720" rtlCol="0" anchor="ctr">
+          <a:bodyPr anchor="ctr">
             <a:normAutofit/>
           </a:bodyPr>
           <a:lstStyle/>
           <a:p>
-            <a:pPr algn="r"/>
-            <a:r>
-              <a:rPr lang="en-US" sz="6000" kern="1200">
-                <a:solidFill>
-                  <a:schemeClr val="tx1"/>
-                </a:solidFill>
-                <a:latin typeface="+mj-lt"/>
-                <a:ea typeface="+mj-ea"/>
-                <a:cs typeface="+mj-cs"/>
+            <a:pPr marL="0" indent="0">
+              <a:buNone/>
+            </a:pPr>
+            <a:r>
+              <a:rPr lang="en-US" sz="2000" dirty="0"/>
+              <a:t>1</a:t>
+            </a:r>
+            <a:r>
+              <a:rPr lang="en-US" sz="1500" dirty="0"/>
+              <a:t>. Sign up at </a:t>
+            </a:r>
+            <a:r>
+              <a:rPr lang="en-US" sz="1500" dirty="0">
+                <a:hlinkClick r:id="rId5"/>
               </a:rPr>
-              <a:t>Reception</a:t>
-            </a:r>
-          </a:p>
-        </p:txBody>
-      </p:sp>
-      <p:sp>
-        <p:nvSpPr>
-          <p:cNvPr id="3" name="Content Placeholder 2"/>
-          <p:cNvSpPr>
-            <a:spLocks noGrp="1"/>
-          </p:cNvSpPr>
-          <p:nvPr>
-            <p:ph idx="1"/>
-          </p:nvPr>
-        </p:nvSpPr>
-        <p:spPr>
-          <a:xfrm>
-            <a:off x="7961258" y="4525347"/>
-            <a:ext cx="3258675" cy="1737360"/>
-          </a:xfrm>
-        </p:spPr>
-        <p:txBody>
-          <a:bodyPr vert="horz" lIns="91440" tIns="45720" rIns="91440" bIns="45720" rtlCol="0" anchor="ctr">
-            <a:normAutofit/>
-          </a:bodyPr>
-          <a:lstStyle/>
+              <a:t>https://www.themoviedb.org/</a:t>
+            </a:r>
+            <a:endParaRPr lang="en-US" sz="1500" dirty="0"/>
+          </a:p>
           <a:p>
             <a:pPr marL="0" indent="0">
               <a:buNone/>
             </a:pPr>
             <a:r>
-              <a:rPr lang="en-US" sz="2400" kern="1200">
-                <a:solidFill>
-                  <a:schemeClr val="tx1"/>
-                </a:solidFill>
-                <a:latin typeface="+mn-lt"/>
-                <a:ea typeface="+mn-ea"/>
-                <a:cs typeface="+mn-cs"/>
-              </a:rPr>
-              <a:t>Look in the slide notes below for topics to consider talking about</a:t>
+              <a:rPr lang="en-US" sz="1500" dirty="0"/>
+              <a:t>2. Request for </a:t>
+            </a:r>
+            <a:r>
+              <a:rPr lang="en-US" sz="1500" dirty="0" err="1"/>
+              <a:t>Api</a:t>
+            </a:r>
+            <a:r>
+              <a:rPr lang="en-US" sz="1500" dirty="0"/>
+              <a:t> Key.</a:t>
+            </a:r>
+          </a:p>
+          <a:p>
+            <a:pPr marL="0" indent="0">
+              <a:buNone/>
+            </a:pPr>
+            <a:r>
+              <a:rPr lang="en-US" sz="1500" dirty="0"/>
+              <a:t>3. How To Clone Project From </a:t>
+            </a:r>
+            <a:r>
+              <a:rPr lang="en-US" sz="1500" dirty="0" err="1"/>
+              <a:t>GITHub</a:t>
+            </a:r>
+            <a:r>
+              <a:rPr lang="en-US" sz="1500" dirty="0"/>
+              <a:t>. </a:t>
+            </a:r>
+          </a:p>
+          <a:p>
+            <a:pPr marL="0" indent="0">
+              <a:buNone/>
+            </a:pPr>
+            <a:r>
+              <a:rPr lang="en-US" sz="1500" dirty="0"/>
+              <a:t>4. How To Import Composite Project to Your SOAP UI Pro tool.</a:t>
+            </a:r>
+          </a:p>
+          <a:p>
+            <a:pPr marL="0" indent="0">
+              <a:buNone/>
+            </a:pPr>
+            <a:r>
+              <a:rPr lang="en-US" sz="1500" dirty="0"/>
+              <a:t>5. Configuration Changes. </a:t>
+            </a:r>
+          </a:p>
+          <a:p>
+            <a:pPr marL="0" indent="0">
+              <a:buNone/>
+            </a:pPr>
+            <a:r>
+              <a:rPr lang="en-US" sz="1500" dirty="0"/>
+              <a:t>6. How to Run Project using SOAP UI Pro from different Level like Project , Test Suite and Test Case Level. </a:t>
+            </a:r>
+          </a:p>
+          <a:p>
+            <a:pPr marL="0" indent="0">
+              <a:buNone/>
+            </a:pPr>
+            <a:r>
+              <a:rPr lang="en-US" sz="1500" dirty="0"/>
+              <a:t>7. How to Run Project using Command Line. </a:t>
+            </a:r>
+          </a:p>
+          <a:p>
+            <a:pPr marL="0" indent="0">
+              <a:buNone/>
+            </a:pPr>
+            <a:r>
+              <a:rPr lang="en-US" sz="1500" dirty="0"/>
+              <a:t>8. How To Run Project using bat file. </a:t>
+            </a:r>
+          </a:p>
+          <a:p>
+            <a:pPr marL="0" indent="0">
+              <a:buNone/>
+            </a:pPr>
+            <a:r>
+              <a:rPr lang="en-US" sz="1500" dirty="0"/>
+              <a:t>9. How to Get Test Execution Reports. </a:t>
+            </a:r>
+          </a:p>
+          <a:p>
+            <a:pPr marL="0" indent="0">
+              <a:buNone/>
+            </a:pPr>
+            <a:r>
+              <a:rPr lang="en-US" sz="1500" dirty="0"/>
+              <a:t> 10. How to check Dashboard.</a:t>
+            </a:r>
+          </a:p>
+          <a:p>
+            <a:pPr marL="0" indent="0">
+              <a:buNone/>
+            </a:pPr>
+            <a:endParaRPr lang="en-US" sz="1500" dirty="0"/>
+          </a:p>
+          <a:p>
+            <a:pPr marL="0" indent="0">
+              <a:buNone/>
+            </a:pPr>
+            <a:r>
+              <a:rPr lang="en-US" sz="1500" dirty="0"/>
+              <a:t> </a:t>
             </a:r>
           </a:p>
         </p:txBody>
@@ -7070,219 +6572,7 @@
     </p:spTree>
     <p:extLst>
       <p:ext uri="{BB962C8B-B14F-4D97-AF65-F5344CB8AC3E}">
-        <p14:creationId xmlns:p14="http://schemas.microsoft.com/office/powerpoint/2010/main" val="2965073847"/>
-      </p:ext>
-    </p:extLst>
-  </p:cSld>
-  <p:clrMapOvr>
-    <a:masterClrMapping/>
-  </p:clrMapOvr>
-</p:sld>
-</file>
-
-<file path=ppt/slides/slide9.xml><?xml version="1.0" encoding="utf-8"?>
-<p:sld xmlns:a="http://schemas.openxmlformats.org/drawingml/2006/main" xmlns:r="http://schemas.openxmlformats.org/officeDocument/2006/relationships" xmlns:p="http://schemas.openxmlformats.org/presentationml/2006/main">
-  <p:cSld>
-    <p:bg>
-      <p:bgPr>
-        <a:solidFill>
-          <a:schemeClr val="bg1"/>
-        </a:solidFill>
-        <a:effectLst/>
-      </p:bgPr>
-    </p:bg>
-    <p:spTree>
-      <p:nvGrpSpPr>
-        <p:cNvPr id="1" name=""/>
-        <p:cNvGrpSpPr/>
-        <p:nvPr/>
-      </p:nvGrpSpPr>
-      <p:grpSpPr>
-        <a:xfrm>
-          <a:off x="0" y="0"/>
-          <a:ext cx="0" cy="0"/>
-          <a:chOff x="0" y="0"/>
-          <a:chExt cx="0" cy="0"/>
-        </a:xfrm>
-      </p:grpSpPr>
-      <p:sp>
-        <p:nvSpPr>
-          <p:cNvPr id="9" name="Rectangle 8">
-            <a:extLst>
-              <a:ext uri="{FF2B5EF4-FFF2-40B4-BE49-F238E27FC236}">
-                <a16:creationId xmlns:a16="http://schemas.microsoft.com/office/drawing/2014/main" id="{8D70B121-56F4-4848-B38B-182089D909FA}"/>
-              </a:ext>
-            </a:extLst>
-          </p:cNvPr>
-          <p:cNvSpPr>
-            <a:spLocks noGrp="1" noRot="1" noChangeAspect="1" noMove="1" noResize="1" noEditPoints="1" noAdjustHandles="1" noChangeArrowheads="1" noChangeShapeType="1" noTextEdit="1"/>
-          </p:cNvSpPr>
-          <p:nvPr>
-            <p:extLst>
-              <p:ext uri="{386F3935-93C4-4BCD-93E2-E3B085C9AB24}">
-                <p16:designElem xmlns:p16="http://schemas.microsoft.com/office/powerpoint/2015/main" val="1"/>
-              </p:ext>
-            </p:extLst>
-          </p:nvPr>
-        </p:nvSpPr>
-        <p:spPr bwMode="ltGray">
-          <a:xfrm>
-            <a:off x="321564" y="320040"/>
-            <a:ext cx="11548872" cy="6217920"/>
-          </a:xfrm>
-          <a:prstGeom prst="rect">
-            <a:avLst/>
-          </a:prstGeom>
-          <a:solidFill>
-            <a:schemeClr val="tx1">
-              <a:alpha val="8000"/>
-            </a:schemeClr>
-          </a:solidFill>
-          <a:ln w="127000" cap="sq" cmpd="thinThick">
-            <a:noFill/>
-          </a:ln>
-        </p:spPr>
-        <p:style>
-          <a:lnRef idx="2">
-            <a:schemeClr val="accent1">
-              <a:shade val="50000"/>
-            </a:schemeClr>
-          </a:lnRef>
-          <a:fillRef idx="1">
-            <a:schemeClr val="accent1"/>
-          </a:fillRef>
-          <a:effectRef idx="0">
-            <a:schemeClr val="accent1"/>
-          </a:effectRef>
-          <a:fontRef idx="minor">
-            <a:schemeClr val="lt1"/>
-          </a:fontRef>
-        </p:style>
-        <p:txBody>
-          <a:bodyPr rtlCol="0" anchor="ctr"/>
-          <a:lstStyle/>
-          <a:p>
-            <a:pPr algn="ctr"/>
-            <a:endParaRPr lang="en-US"/>
-          </a:p>
-        </p:txBody>
-      </p:sp>
-      <p:cxnSp>
-        <p:nvCxnSpPr>
-          <p:cNvPr id="11" name="Straight Connector 10">
-            <a:extLst>
-              <a:ext uri="{FF2B5EF4-FFF2-40B4-BE49-F238E27FC236}">
-                <a16:creationId xmlns:a16="http://schemas.microsoft.com/office/drawing/2014/main" id="{2D72A2C9-F3CA-4216-8BAD-FA4C970C3C4E}"/>
-              </a:ext>
-            </a:extLst>
-          </p:cNvPr>
-          <p:cNvCxnSpPr>
-            <a:cxnSpLocks noGrp="1" noRot="1" noChangeAspect="1" noMove="1" noResize="1" noEditPoints="1" noAdjustHandles="1" noChangeArrowheads="1" noChangeShapeType="1"/>
-          </p:cNvCxnSpPr>
-          <p:nvPr>
-            <p:extLst>
-              <p:ext uri="{386F3935-93C4-4BCD-93E2-E3B085C9AB24}">
-                <p16:designElem xmlns:p16="http://schemas.microsoft.com/office/powerpoint/2015/main" val="1"/>
-              </p:ext>
-            </p:extLst>
-          </p:nvPr>
-        </p:nvCxnSpPr>
-        <p:spPr>
-          <a:xfrm>
-            <a:off x="4654296" y="2057400"/>
-            <a:ext cx="0" cy="2743200"/>
-          </a:xfrm>
-          <a:prstGeom prst="line">
-            <a:avLst/>
-          </a:prstGeom>
-          <a:ln w="19050">
-            <a:solidFill>
-              <a:schemeClr val="tx1">
-                <a:lumMod val="85000"/>
-                <a:lumOff val="15000"/>
-              </a:schemeClr>
-            </a:solidFill>
-          </a:ln>
-        </p:spPr>
-        <p:style>
-          <a:lnRef idx="1">
-            <a:schemeClr val="accent1"/>
-          </a:lnRef>
-          <a:fillRef idx="0">
-            <a:schemeClr val="accent1"/>
-          </a:fillRef>
-          <a:effectRef idx="0">
-            <a:schemeClr val="accent1"/>
-          </a:effectRef>
-          <a:fontRef idx="minor">
-            <a:schemeClr val="tx1"/>
-          </a:fontRef>
-        </p:style>
-      </p:cxnSp>
-      <p:sp>
-        <p:nvSpPr>
-          <p:cNvPr id="2" name="Title 1"/>
-          <p:cNvSpPr>
-            <a:spLocks noGrp="1"/>
-          </p:cNvSpPr>
-          <p:nvPr>
-            <p:ph type="title"/>
-          </p:nvPr>
-        </p:nvSpPr>
-        <p:spPr>
-          <a:xfrm>
-            <a:off x="838200" y="963877"/>
-            <a:ext cx="3494362" cy="4930246"/>
-          </a:xfrm>
-        </p:spPr>
-        <p:txBody>
-          <a:bodyPr>
-            <a:normAutofit/>
-          </a:bodyPr>
-          <a:lstStyle/>
-          <a:p>
-            <a:pPr algn="r"/>
-            <a:r>
-              <a:rPr lang="en-US">
-                <a:solidFill>
-                  <a:schemeClr val="accent1"/>
-                </a:solidFill>
-              </a:rPr>
-              <a:t>Works cited</a:t>
-            </a:r>
-          </a:p>
-        </p:txBody>
-      </p:sp>
-      <p:sp>
-        <p:nvSpPr>
-          <p:cNvPr id="3" name="Content Placeholder 2"/>
-          <p:cNvSpPr>
-            <a:spLocks noGrp="1"/>
-          </p:cNvSpPr>
-          <p:nvPr>
-            <p:ph type="body" idx="1"/>
-          </p:nvPr>
-        </p:nvSpPr>
-        <p:spPr>
-          <a:xfrm>
-            <a:off x="4976031" y="963877"/>
-            <a:ext cx="6377769" cy="4930246"/>
-          </a:xfrm>
-        </p:spPr>
-        <p:txBody>
-          <a:bodyPr anchor="ctr">
-            <a:normAutofit/>
-          </a:bodyPr>
-          <a:lstStyle/>
-          <a:p>
-            <a:endParaRPr sz="2400"/>
-          </a:p>
-        </p:txBody>
-      </p:sp>
-    </p:spTree>
-    <p:extLst>
-      <p:ext uri="{BB962C8B-B14F-4D97-AF65-F5344CB8AC3E}">
-        <p14:creationId xmlns:p14="http://schemas.microsoft.com/office/powerpoint/2010/main" val="4216411337"/>
+        <p14:creationId xmlns:p14="http://schemas.microsoft.com/office/powerpoint/2010/main" val="3671686824"/>
       </p:ext>
     </p:extLst>
   </p:cSld>
@@ -8081,4 +7371,47 @@
     </a:ext>
   </a:extLst>
 </a:theme>
+</file>
+
+<file path=ppt/theme/themeOverride1.xml><?xml version="1.0" encoding="utf-8"?>
+<a:themeOverride xmlns:a="http://schemas.openxmlformats.org/drawingml/2006/main">
+  <a:clrScheme name="Office">
+    <a:dk1>
+      <a:sysClr val="windowText" lastClr="000000"/>
+    </a:dk1>
+    <a:lt1>
+      <a:sysClr val="window" lastClr="FFFFFF"/>
+    </a:lt1>
+    <a:dk2>
+      <a:srgbClr val="44546A"/>
+    </a:dk2>
+    <a:lt2>
+      <a:srgbClr val="E7E6E6"/>
+    </a:lt2>
+    <a:accent1>
+      <a:srgbClr val="5B9BD5"/>
+    </a:accent1>
+    <a:accent2>
+      <a:srgbClr val="ED7D31"/>
+    </a:accent2>
+    <a:accent3>
+      <a:srgbClr val="A5A5A5"/>
+    </a:accent3>
+    <a:accent4>
+      <a:srgbClr val="FFC000"/>
+    </a:accent4>
+    <a:accent5>
+      <a:srgbClr val="4472C4"/>
+    </a:accent5>
+    <a:accent6>
+      <a:srgbClr val="70AD47"/>
+    </a:accent6>
+    <a:hlink>
+      <a:srgbClr val="0563C1"/>
+    </a:hlink>
+    <a:folHlink>
+      <a:srgbClr val="954F72"/>
+    </a:folHlink>
+  </a:clrScheme>
+</a:themeOverride>
 </file>
</xml_diff>

<commit_message>
adding User Manuals in the Project
</commit_message>
<xml_diff>
--- a/SoFi TMDB Api Project User Guide.pptx
+++ b/SoFi TMDB Api Project User Guide.pptx
@@ -6,13 +6,15 @@
     <p:sldMasterId id="2147483660" r:id="rId2"/>
   </p:sldMasterIdLst>
   <p:notesMasterIdLst>
-    <p:notesMasterId r:id="rId7"/>
+    <p:notesMasterId r:id="rId9"/>
   </p:notesMasterIdLst>
   <p:sldIdLst>
     <p:sldId id="257" r:id="rId3"/>
     <p:sldId id="256" r:id="rId4"/>
     <p:sldId id="264" r:id="rId5"/>
     <p:sldId id="258" r:id="rId6"/>
+    <p:sldId id="265" r:id="rId7"/>
+    <p:sldId id="266" r:id="rId8"/>
   </p:sldIdLst>
   <p:sldSz cx="12192000" cy="6858000"/>
   <p:notesSz cx="6858000" cy="9144000"/>
@@ -6573,6 +6575,358 @@
     <p:extLst>
       <p:ext uri="{BB962C8B-B14F-4D97-AF65-F5344CB8AC3E}">
         <p14:creationId xmlns:p14="http://schemas.microsoft.com/office/powerpoint/2010/main" val="3671686824"/>
+      </p:ext>
+    </p:extLst>
+  </p:cSld>
+  <p:clrMapOvr>
+    <a:masterClrMapping/>
+  </p:clrMapOvr>
+</p:sld>
+</file>
+
+<file path=ppt/slides/slide5.xml><?xml version="1.0" encoding="utf-8"?>
+<p:sld xmlns:a="http://schemas.openxmlformats.org/drawingml/2006/main" xmlns:r="http://schemas.openxmlformats.org/officeDocument/2006/relationships" xmlns:p="http://schemas.openxmlformats.org/presentationml/2006/main">
+  <p:cSld>
+    <p:spTree>
+      <p:nvGrpSpPr>
+        <p:cNvPr id="1" name=""/>
+        <p:cNvGrpSpPr/>
+        <p:nvPr/>
+      </p:nvGrpSpPr>
+      <p:grpSpPr>
+        <a:xfrm>
+          <a:off x="0" y="0"/>
+          <a:ext cx="0" cy="0"/>
+          <a:chOff x="0" y="0"/>
+          <a:chExt cx="0" cy="0"/>
+        </a:xfrm>
+      </p:grpSpPr>
+      <p:sp>
+        <p:nvSpPr>
+          <p:cNvPr id="2" name="Title 1">
+            <a:extLst>
+              <a:ext uri="{FF2B5EF4-FFF2-40B4-BE49-F238E27FC236}">
+                <a16:creationId xmlns:a16="http://schemas.microsoft.com/office/drawing/2014/main" id="{F2CD7C71-5E47-4A03-BEC1-278C98E4160B}"/>
+              </a:ext>
+            </a:extLst>
+          </p:cNvPr>
+          <p:cNvSpPr>
+            <a:spLocks noGrp="1"/>
+          </p:cNvSpPr>
+          <p:nvPr>
+            <p:ph type="title"/>
+          </p:nvPr>
+        </p:nvSpPr>
+        <p:spPr>
+          <a:xfrm>
+            <a:off x="838200" y="345670"/>
+            <a:ext cx="10515600" cy="1325563"/>
+          </a:xfrm>
+        </p:spPr>
+        <p:txBody>
+          <a:bodyPr/>
+          <a:lstStyle/>
+          <a:p>
+            <a:r>
+              <a:rPr lang="en-US" dirty="0"/>
+              <a:t>Sign up at </a:t>
+            </a:r>
+            <a:r>
+              <a:rPr lang="en-US" dirty="0">
+                <a:hlinkClick r:id="rId2"/>
+              </a:rPr>
+              <a:t>https://www.themoviedb.org/</a:t>
+            </a:r>
+            <a:endParaRPr lang="en-US" dirty="0"/>
+          </a:p>
+        </p:txBody>
+      </p:sp>
+      <p:sp>
+        <p:nvSpPr>
+          <p:cNvPr id="5" name="TextBox 4">
+            <a:extLst>
+              <a:ext uri="{FF2B5EF4-FFF2-40B4-BE49-F238E27FC236}">
+                <a16:creationId xmlns:a16="http://schemas.microsoft.com/office/drawing/2014/main" id="{6772DE96-0820-41E2-83A1-602191135105}"/>
+              </a:ext>
+            </a:extLst>
+          </p:cNvPr>
+          <p:cNvSpPr txBox="1"/>
+          <p:nvPr/>
+        </p:nvSpPr>
+        <p:spPr>
+          <a:xfrm>
+            <a:off x="1235413" y="2003898"/>
+            <a:ext cx="8920264" cy="646331"/>
+          </a:xfrm>
+          <a:prstGeom prst="rect">
+            <a:avLst/>
+          </a:prstGeom>
+          <a:noFill/>
+        </p:spPr>
+        <p:txBody>
+          <a:bodyPr wrap="square" rtlCol="0">
+            <a:spAutoFit/>
+          </a:bodyPr>
+          <a:lstStyle/>
+          <a:p>
+            <a:r>
+              <a:rPr lang="en-US" dirty="0"/>
+              <a:t>Please check with the instructions in the embeded document given below.</a:t>
+            </a:r>
+          </a:p>
+          <a:p>
+            <a:endParaRPr lang="en-US" b="1" dirty="0"/>
+          </a:p>
+        </p:txBody>
+      </p:sp>
+      <p:sp>
+        <p:nvSpPr>
+          <p:cNvPr id="6" name="TextBox 5">
+            <a:extLst>
+              <a:ext uri="{FF2B5EF4-FFF2-40B4-BE49-F238E27FC236}">
+                <a16:creationId xmlns:a16="http://schemas.microsoft.com/office/drawing/2014/main" id="{E4CDEC08-6AEF-41F4-ABC0-B89430F7EB9D}"/>
+              </a:ext>
+            </a:extLst>
+          </p:cNvPr>
+          <p:cNvSpPr txBox="1"/>
+          <p:nvPr/>
+        </p:nvSpPr>
+        <p:spPr>
+          <a:xfrm>
+            <a:off x="1378085" y="5298332"/>
+            <a:ext cx="8920264" cy="646331"/>
+          </a:xfrm>
+          <a:prstGeom prst="rect">
+            <a:avLst/>
+          </a:prstGeom>
+          <a:noFill/>
+        </p:spPr>
+        <p:txBody>
+          <a:bodyPr wrap="square" rtlCol="0">
+            <a:spAutoFit/>
+          </a:bodyPr>
+          <a:lstStyle/>
+          <a:p>
+            <a:r>
+              <a:rPr lang="en-US" dirty="0"/>
+              <a:t>Please check with the instructions in the embeded document given below.</a:t>
+            </a:r>
+          </a:p>
+          <a:p>
+            <a:endParaRPr lang="en-US" b="1" dirty="0"/>
+          </a:p>
+        </p:txBody>
+      </p:sp>
+    </p:spTree>
+    <p:extLst>
+      <p:ext uri="{BB962C8B-B14F-4D97-AF65-F5344CB8AC3E}">
+        <p14:creationId xmlns:p14="http://schemas.microsoft.com/office/powerpoint/2010/main" val="647740310"/>
+      </p:ext>
+    </p:extLst>
+  </p:cSld>
+  <p:clrMapOvr>
+    <a:masterClrMapping/>
+  </p:clrMapOvr>
+</p:sld>
+</file>
+
+<file path=ppt/slides/slide6.xml><?xml version="1.0" encoding="utf-8"?>
+<p:sld xmlns:a="http://schemas.openxmlformats.org/drawingml/2006/main" xmlns:r="http://schemas.openxmlformats.org/officeDocument/2006/relationships" xmlns:p="http://schemas.openxmlformats.org/presentationml/2006/main">
+  <p:cSld>
+    <p:spTree>
+      <p:nvGrpSpPr>
+        <p:cNvPr id="1" name=""/>
+        <p:cNvGrpSpPr/>
+        <p:nvPr/>
+      </p:nvGrpSpPr>
+      <p:grpSpPr>
+        <a:xfrm>
+          <a:off x="0" y="0"/>
+          <a:ext cx="0" cy="0"/>
+          <a:chOff x="0" y="0"/>
+          <a:chExt cx="0" cy="0"/>
+        </a:xfrm>
+      </p:grpSpPr>
+      <p:sp>
+        <p:nvSpPr>
+          <p:cNvPr id="2" name="Title 1">
+            <a:extLst>
+              <a:ext uri="{FF2B5EF4-FFF2-40B4-BE49-F238E27FC236}">
+                <a16:creationId xmlns:a16="http://schemas.microsoft.com/office/drawing/2014/main" id="{455E1979-85C8-413A-BC9A-8475121DAE7B}"/>
+              </a:ext>
+            </a:extLst>
+          </p:cNvPr>
+          <p:cNvSpPr>
+            <a:spLocks noGrp="1"/>
+          </p:cNvSpPr>
+          <p:nvPr>
+            <p:ph type="title"/>
+          </p:nvPr>
+        </p:nvSpPr>
+        <p:spPr>
+          <a:xfrm>
+            <a:off x="838200" y="583660"/>
+            <a:ext cx="10515600" cy="1060314"/>
+          </a:xfrm>
+        </p:spPr>
+        <p:txBody>
+          <a:bodyPr>
+            <a:normAutofit/>
+          </a:bodyPr>
+          <a:lstStyle/>
+          <a:p>
+            <a:r>
+              <a:rPr lang="en-US" dirty="0"/>
+              <a:t>How To Request for </a:t>
+            </a:r>
+            <a:r>
+              <a:rPr lang="en-US" dirty="0" err="1"/>
+              <a:t>Api</a:t>
+            </a:r>
+            <a:r>
+              <a:rPr lang="en-US" dirty="0"/>
+              <a:t> Key.</a:t>
+            </a:r>
+          </a:p>
+        </p:txBody>
+      </p:sp>
+      <p:sp>
+        <p:nvSpPr>
+          <p:cNvPr id="3" name="Content Placeholder 2">
+            <a:extLst>
+              <a:ext uri="{FF2B5EF4-FFF2-40B4-BE49-F238E27FC236}">
+                <a16:creationId xmlns:a16="http://schemas.microsoft.com/office/drawing/2014/main" id="{7764B78C-9E50-4EFD-82BB-24B4D0FDE39A}"/>
+              </a:ext>
+            </a:extLst>
+          </p:cNvPr>
+          <p:cNvSpPr>
+            <a:spLocks noGrp="1"/>
+          </p:cNvSpPr>
+          <p:nvPr>
+            <p:ph idx="1"/>
+          </p:nvPr>
+        </p:nvSpPr>
+        <p:spPr>
+          <a:xfrm>
+            <a:off x="740923" y="1923002"/>
+            <a:ext cx="10515600" cy="4351338"/>
+          </a:xfrm>
+        </p:spPr>
+        <p:txBody>
+          <a:bodyPr/>
+          <a:lstStyle/>
+          <a:p>
+            <a:r>
+              <a:rPr lang="en-US" dirty="0"/>
+              <a:t>Please follow the instruction in embeded document given below.</a:t>
+            </a:r>
+          </a:p>
+          <a:p>
+            <a:endParaRPr lang="en-US" dirty="0"/>
+          </a:p>
+          <a:p>
+            <a:pPr marL="0" indent="0">
+              <a:buNone/>
+            </a:pPr>
+            <a:r>
+              <a:rPr lang="en-US" dirty="0"/>
+              <a:t> </a:t>
+            </a:r>
+          </a:p>
+          <a:p>
+            <a:endParaRPr lang="en-US" dirty="0"/>
+          </a:p>
+          <a:p>
+            <a:endParaRPr lang="en-US" dirty="0"/>
+          </a:p>
+          <a:p>
+            <a:r>
+              <a:rPr lang="en-US" b="1" dirty="0"/>
+              <a:t>Project Location:</a:t>
+            </a:r>
+          </a:p>
+          <a:p>
+            <a:pPr marL="0" indent="0">
+              <a:buNone/>
+            </a:pPr>
+            <a:r>
+              <a:rPr lang="en-US" b="1" dirty="0"/>
+              <a:t>	</a:t>
+            </a:r>
+            <a:r>
+              <a:rPr lang="en-US" dirty="0"/>
+              <a:t>SoFi_TMDB_API_Project/Test Results/How_To_get_API_Key.pdf</a:t>
+            </a:r>
+          </a:p>
+        </p:txBody>
+      </p:sp>
+      <p:graphicFrame>
+        <p:nvGraphicFramePr>
+          <p:cNvPr id="4" name="Object 3">
+            <a:extLst>
+              <a:ext uri="{FF2B5EF4-FFF2-40B4-BE49-F238E27FC236}">
+                <a16:creationId xmlns:a16="http://schemas.microsoft.com/office/drawing/2014/main" id="{45BA2319-F6C8-4590-92D4-066BE387E9E8}"/>
+              </a:ext>
+            </a:extLst>
+          </p:cNvPr>
+          <p:cNvGraphicFramePr>
+            <a:graphicFrameLocks noChangeAspect="1"/>
+          </p:cNvGraphicFramePr>
+          <p:nvPr>
+            <p:extLst>
+              <p:ext uri="{D42A27DB-BD31-4B8C-83A1-F6EECF244321}">
+                <p14:modId xmlns:p14="http://schemas.microsoft.com/office/powerpoint/2010/main" val="1280066338"/>
+              </p:ext>
+            </p:extLst>
+          </p:nvPr>
+        </p:nvGraphicFramePr>
+        <p:xfrm>
+          <a:off x="5084323" y="3148654"/>
+          <a:ext cx="914400" cy="771525"/>
+        </p:xfrm>
+        <a:graphic>
+          <a:graphicData uri="http://schemas.openxmlformats.org/presentationml/2006/ole">
+            <mc:AlternateContent xmlns:mc="http://schemas.openxmlformats.org/markup-compatibility/2006">
+              <mc:Choice xmlns:v="urn:schemas-microsoft-com:vml" Requires="v">
+                <p:oleObj spid="_x0000_s2051" name="Acrobat Document" showAsIcon="1" r:id="rId3" imgW="914400" imgH="771480" progId="AcroExch.Document.DC">
+                  <p:embed/>
+                </p:oleObj>
+              </mc:Choice>
+              <mc:Fallback>
+                <p:oleObj name="Acrobat Document" showAsIcon="1" r:id="rId3" imgW="914400" imgH="771480" progId="AcroExch.Document.DC">
+                  <p:embed/>
+                  <p:pic>
+                    <p:nvPicPr>
+                      <p:cNvPr id="0" name=""/>
+                      <p:cNvPicPr/>
+                      <p:nvPr/>
+                    </p:nvPicPr>
+                    <p:blipFill>
+                      <a:blip r:embed="rId4"/>
+                      <a:stretch>
+                        <a:fillRect/>
+                      </a:stretch>
+                    </p:blipFill>
+                    <p:spPr>
+                      <a:xfrm>
+                        <a:off x="5084323" y="3148654"/>
+                        <a:ext cx="914400" cy="771525"/>
+                      </a:xfrm>
+                      <a:prstGeom prst="rect">
+                        <a:avLst/>
+                      </a:prstGeom>
+                    </p:spPr>
+                  </p:pic>
+                </p:oleObj>
+              </mc:Fallback>
+            </mc:AlternateContent>
+          </a:graphicData>
+        </a:graphic>
+      </p:graphicFrame>
+    </p:spTree>
+    <p:extLst>
+      <p:ext uri="{BB962C8B-B14F-4D97-AF65-F5344CB8AC3E}">
+        <p14:creationId xmlns:p14="http://schemas.microsoft.com/office/powerpoint/2010/main" val="1365438557"/>
       </p:ext>
     </p:extLst>
   </p:cSld>

</xml_diff>

<commit_message>
User Manual folder is updated
</commit_message>
<xml_diff>
--- a/SoFi TMDB Api Project User Guide.pptx
+++ b/SoFi TMDB Api Project User Guide.pptx
@@ -6,7 +6,7 @@
     <p:sldMasterId id="2147483660" r:id="rId2"/>
   </p:sldMasterIdLst>
   <p:notesMasterIdLst>
-    <p:notesMasterId r:id="rId9"/>
+    <p:notesMasterId r:id="rId10"/>
   </p:notesMasterIdLst>
   <p:sldIdLst>
     <p:sldId id="257" r:id="rId3"/>
@@ -14,7 +14,8 @@
     <p:sldId id="264" r:id="rId5"/>
     <p:sldId id="258" r:id="rId6"/>
     <p:sldId id="265" r:id="rId7"/>
-    <p:sldId id="266" r:id="rId8"/>
+    <p:sldId id="267" r:id="rId8"/>
+    <p:sldId id="268" r:id="rId9"/>
   </p:sldIdLst>
   <p:sldSz cx="12192000" cy="6858000"/>
   <p:notesSz cx="6858000" cy="9144000"/>
@@ -4838,29 +4839,7 @@
                 <a:ea typeface="Segoe UI Semibold" panose="020B0702040204020203" pitchFamily="34" charset="0"/>
                 <a:cs typeface="Segoe UI" panose="020B0502040204020203" pitchFamily="34" charset="0"/>
               </a:rPr>
-              <a:t>Key facts about </a:t>
-            </a:r>
-            <a:r>
-              <a:rPr lang="en-US" sz="1400" dirty="0" err="1">
-                <a:solidFill>
-                  <a:srgbClr val="D24726"/>
-                </a:solidFill>
-                <a:latin typeface="Segoe UI Semibold" panose="020B0702040204020203" pitchFamily="34" charset="0"/>
-                <a:ea typeface="Segoe UI Semibold" panose="020B0702040204020203" pitchFamily="34" charset="0"/>
-                <a:cs typeface="Segoe UI" panose="020B0502040204020203" pitchFamily="34" charset="0"/>
-              </a:rPr>
-              <a:t>SoFi</a:t>
-            </a:r>
-            <a:r>
-              <a:rPr lang="en-US" sz="1400" dirty="0">
-                <a:solidFill>
-                  <a:srgbClr val="D24726"/>
-                </a:solidFill>
-                <a:latin typeface="Segoe UI Semibold" panose="020B0702040204020203" pitchFamily="34" charset="0"/>
-                <a:ea typeface="Segoe UI Semibold" panose="020B0702040204020203" pitchFamily="34" charset="0"/>
-                <a:cs typeface="Segoe UI" panose="020B0502040204020203" pitchFamily="34" charset="0"/>
-              </a:rPr>
-              <a:t> TMDB API Project</a:t>
+              <a:t>Key facts about SoFi TMDB API Project</a:t>
             </a:r>
           </a:p>
         </p:txBody>
@@ -4875,8 +4854,8 @@
         </p:nvSpPr>
         <p:spPr>
           <a:xfrm>
-            <a:off x="834260" y="1923286"/>
-            <a:ext cx="5028036" cy="3934173"/>
+            <a:off x="834260" y="1923285"/>
+            <a:ext cx="5028036" cy="4749591"/>
           </a:xfrm>
           <a:prstGeom prst="rect">
             <a:avLst/>
@@ -4887,7 +4866,7 @@
         </p:spPr>
         <p:txBody>
           <a:bodyPr vert="horz" lIns="91440" tIns="45720" rIns="91440" bIns="45720" numCol="1" rtlCol="0" anchor="t">
-            <a:normAutofit fontScale="77500" lnSpcReduction="20000"/>
+            <a:normAutofit fontScale="70000" lnSpcReduction="20000"/>
           </a:bodyPr>
           <a:lstStyle/>
           <a:p>
@@ -4902,7 +4881,7 @@
               <a:buChar char="Ø"/>
             </a:pPr>
             <a:r>
-              <a:rPr lang="en-US" sz="1400" dirty="0">
+              <a:rPr lang="en-US" sz="1700" dirty="0">
                 <a:solidFill>
                   <a:schemeClr val="tx1">
                     <a:lumMod val="65000"/>
@@ -4928,7 +4907,7 @@
               <a:buChar char="Ø"/>
             </a:pPr>
             <a:r>
-              <a:rPr lang="en-US" sz="1400" dirty="0">
+              <a:rPr lang="en-US" sz="1700" dirty="0">
                 <a:solidFill>
                   <a:schemeClr val="tx1">
                     <a:lumMod val="65000"/>
@@ -4954,7 +4933,7 @@
               <a:buChar char="Ø"/>
             </a:pPr>
             <a:r>
-              <a:rPr lang="en-US" sz="1400" dirty="0">
+              <a:rPr lang="en-US" sz="1700" dirty="0">
                 <a:solidFill>
                   <a:schemeClr val="tx1">
                     <a:lumMod val="65000"/>
@@ -4980,7 +4959,7 @@
               <a:buChar char="Ø"/>
             </a:pPr>
             <a:r>
-              <a:rPr lang="en-US" sz="1400" dirty="0">
+              <a:rPr lang="en-US" sz="1700" dirty="0">
                 <a:solidFill>
                   <a:schemeClr val="tx1">
                     <a:lumMod val="65000"/>
@@ -5006,7 +4985,7 @@
               <a:buChar char="Ø"/>
             </a:pPr>
             <a:r>
-              <a:rPr lang="en-US" sz="1400" dirty="0">
+              <a:rPr lang="en-US" sz="1700" dirty="0">
                 <a:solidFill>
                   <a:schemeClr val="tx1">
                     <a:lumMod val="65000"/>
@@ -5032,7 +5011,7 @@
               <a:buChar char="Ø"/>
             </a:pPr>
             <a:r>
-              <a:rPr lang="en-US" sz="1400" dirty="0">
+              <a:rPr lang="en-US" sz="1700" dirty="0">
                 <a:solidFill>
                   <a:schemeClr val="tx1">
                     <a:lumMod val="65000"/>
@@ -5058,7 +5037,7 @@
               <a:buChar char="Ø"/>
             </a:pPr>
             <a:r>
-              <a:rPr lang="en-US" sz="1400" dirty="0">
+              <a:rPr lang="en-US" sz="1700" dirty="0">
                 <a:solidFill>
                   <a:schemeClr val="tx1">
                     <a:lumMod val="65000"/>
@@ -5084,7 +5063,7 @@
               <a:buChar char="Ø"/>
             </a:pPr>
             <a:r>
-              <a:rPr lang="en-US" sz="1400" dirty="0">
+              <a:rPr lang="en-US" sz="1700" dirty="0">
                 <a:solidFill>
                   <a:schemeClr val="tx1">
                     <a:lumMod val="65000"/>
@@ -6628,16 +6607,33 @@
           <a:lstStyle/>
           <a:p>
             <a:r>
-              <a:rPr lang="en-US" dirty="0"/>
+              <a:rPr lang="en-US" sz="3600" dirty="0">
+                <a:solidFill>
+                  <a:srgbClr val="D24726"/>
+                </a:solidFill>
+                <a:latin typeface="Segoe UI Light" panose="020B0702040204020203" pitchFamily="34" charset="0"/>
+                <a:cs typeface="Segoe UI" panose="020B0502040204020203" pitchFamily="34" charset="0"/>
+              </a:rPr>
               <a:t>Sign up at </a:t>
             </a:r>
             <a:r>
-              <a:rPr lang="en-US" dirty="0">
-                <a:hlinkClick r:id="rId2"/>
+              <a:rPr lang="en-US" sz="3600" dirty="0">
+                <a:solidFill>
+                  <a:srgbClr val="D24726"/>
+                </a:solidFill>
+                <a:latin typeface="Segoe UI Light" panose="020B0702040204020203" pitchFamily="34" charset="0"/>
+                <a:cs typeface="Segoe UI" panose="020B0502040204020203" pitchFamily="34" charset="0"/>
+                <a:hlinkClick r:id="rId3"/>
               </a:rPr>
               <a:t>https://www.themoviedb.org/</a:t>
             </a:r>
-            <a:endParaRPr lang="en-US" dirty="0"/>
+            <a:endParaRPr lang="en-US" sz="3600" dirty="0">
+              <a:solidFill>
+                <a:srgbClr val="D24726"/>
+              </a:solidFill>
+              <a:latin typeface="Segoe UI Light" panose="020B0702040204020203" pitchFamily="34" charset="0"/>
+              <a:cs typeface="Segoe UI" panose="020B0502040204020203" pitchFamily="34" charset="0"/>
+            </a:endParaRPr>
           </a:p>
         </p:txBody>
       </p:sp>
@@ -6656,7 +6652,7 @@
         <p:spPr>
           <a:xfrm>
             <a:off x="1235413" y="2003898"/>
-            <a:ext cx="8920264" cy="646331"/>
+            <a:ext cx="8920264" cy="569387"/>
           </a:xfrm>
           <a:prstGeom prst="rect">
             <a:avLst/>
@@ -6669,9 +6665,22 @@
           </a:bodyPr>
           <a:lstStyle/>
           <a:p>
-            <a:r>
-              <a:rPr lang="en-US" dirty="0"/>
-              <a:t>Please check with the instructions in the embeded document given below.</a:t>
+            <a:pPr marL="285750" indent="-285750">
+              <a:buFont typeface="Wingdings" panose="05000000000000000000" pitchFamily="2" charset="2"/>
+              <a:buChar char="Ø"/>
+            </a:pPr>
+            <a:r>
+              <a:rPr lang="en-US" sz="1300" b="1" dirty="0">
+                <a:solidFill>
+                  <a:schemeClr val="tx1">
+                    <a:lumMod val="65000"/>
+                    <a:lumOff val="35000"/>
+                  </a:schemeClr>
+                </a:solidFill>
+                <a:latin typeface="Segoe UI Semilight" panose="020B0402040204020203" pitchFamily="34" charset="0"/>
+                <a:cs typeface="Segoe UI Semilight" panose="020B0402040204020203" pitchFamily="34" charset="0"/>
+              </a:rPr>
+              <a:t> Please check with the instructions in the embeded document given below.</a:t>
             </a:r>
           </a:p>
           <a:p>
@@ -6693,8 +6702,8 @@
         </p:nvSpPr>
         <p:spPr>
           <a:xfrm>
-            <a:off x="1378085" y="5298332"/>
-            <a:ext cx="8920264" cy="646331"/>
+            <a:off x="1439694" y="4309782"/>
+            <a:ext cx="8920264" cy="877163"/>
           </a:xfrm>
           <a:prstGeom prst="rect">
             <a:avLst/>
@@ -6708,15 +6717,100 @@
           <a:lstStyle/>
           <a:p>
             <a:r>
-              <a:rPr lang="en-US" dirty="0"/>
-              <a:t>Please check with the instructions in the embeded document given below.</a:t>
-            </a:r>
-          </a:p>
-          <a:p>
-            <a:endParaRPr lang="en-US" b="1" dirty="0"/>
-          </a:p>
-        </p:txBody>
-      </p:sp>
+              <a:rPr lang="en-US" sz="2000" dirty="0">
+                <a:solidFill>
+                  <a:srgbClr val="D24726"/>
+                </a:solidFill>
+                <a:latin typeface="Segoe UI Light" panose="020B0702040204020203" pitchFamily="34" charset="0"/>
+                <a:ea typeface="+mj-ea"/>
+                <a:cs typeface="Segoe UI" panose="020B0502040204020203" pitchFamily="34" charset="0"/>
+              </a:rPr>
+              <a:t>File Location in Project</a:t>
+            </a:r>
+          </a:p>
+          <a:p>
+            <a:endParaRPr lang="en-US" dirty="0"/>
+          </a:p>
+          <a:p>
+            <a:r>
+              <a:rPr lang="en-US" sz="1300" b="1" dirty="0">
+                <a:solidFill>
+                  <a:schemeClr val="tx1">
+                    <a:lumMod val="65000"/>
+                    <a:lumOff val="35000"/>
+                  </a:schemeClr>
+                </a:solidFill>
+                <a:latin typeface="Segoe UI Semilight" panose="020B0402040204020203" pitchFamily="34" charset="0"/>
+                <a:cs typeface="Segoe UI Semilight" panose="020B0402040204020203" pitchFamily="34" charset="0"/>
+              </a:rPr>
+              <a:t>                         SoFi_TMDB_API_Project/User Manuals/ The movie DB Signup Manual</a:t>
+            </a:r>
+          </a:p>
+        </p:txBody>
+      </p:sp>
+      <p:graphicFrame>
+        <p:nvGraphicFramePr>
+          <p:cNvPr id="3" name="Object 2">
+            <a:extLst>
+              <a:ext uri="{FF2B5EF4-FFF2-40B4-BE49-F238E27FC236}">
+                <a16:creationId xmlns:a16="http://schemas.microsoft.com/office/drawing/2014/main" id="{9CBD8099-8690-47F2-9CCC-F84F101CD937}"/>
+              </a:ext>
+            </a:extLst>
+          </p:cNvPr>
+          <p:cNvGraphicFramePr>
+            <a:graphicFrameLocks noChangeAspect="1"/>
+          </p:cNvGraphicFramePr>
+          <p:nvPr>
+            <p:extLst>
+              <p:ext uri="{D42A27DB-BD31-4B8C-83A1-F6EECF244321}">
+                <p14:modId xmlns:p14="http://schemas.microsoft.com/office/powerpoint/2010/main" val="1445513653"/>
+              </p:ext>
+            </p:extLst>
+          </p:nvPr>
+        </p:nvGraphicFramePr>
+        <p:xfrm>
+          <a:off x="4088860" y="3143099"/>
+          <a:ext cx="1695855" cy="1166256"/>
+        </p:xfrm>
+        <a:graphic>
+          <a:graphicData uri="http://schemas.openxmlformats.org/presentationml/2006/ole">
+            <mc:AlternateContent xmlns:mc="http://schemas.openxmlformats.org/markup-compatibility/2006">
+              <mc:Choice xmlns:v="urn:schemas-microsoft-com:vml" Requires="v">
+                <p:oleObj spid="_x0000_s3076" name="Acrobat Document" showAsIcon="1" r:id="rId4" imgW="914400" imgH="771480" progId="AcroExch.Document.DC">
+                  <p:embed/>
+                </p:oleObj>
+              </mc:Choice>
+              <mc:Fallback>
+                <p:oleObj name="Acrobat Document" showAsIcon="1" r:id="rId4" imgW="914400" imgH="771480" progId="AcroExch.Document.DC">
+                  <p:embed/>
+                  <p:pic>
+                    <p:nvPicPr>
+                      <p:cNvPr id="0" name=""/>
+                      <p:cNvPicPr/>
+                      <p:nvPr/>
+                    </p:nvPicPr>
+                    <p:blipFill>
+                      <a:blip r:embed="rId5"/>
+                      <a:stretch>
+                        <a:fillRect/>
+                      </a:stretch>
+                    </p:blipFill>
+                    <p:spPr>
+                      <a:xfrm>
+                        <a:off x="4088860" y="3143099"/>
+                        <a:ext cx="1695855" cy="1166256"/>
+                      </a:xfrm>
+                      <a:prstGeom prst="rect">
+                        <a:avLst/>
+                      </a:prstGeom>
+                    </p:spPr>
+                  </p:pic>
+                </p:oleObj>
+              </mc:Fallback>
+            </mc:AlternateContent>
+          </a:graphicData>
+        </a:graphic>
+      </p:graphicFrame>
     </p:spTree>
     <p:extLst>
       <p:ext uri="{BB962C8B-B14F-4D97-AF65-F5344CB8AC3E}">
@@ -6752,7 +6846,7 @@
           <p:cNvPr id="2" name="Title 1">
             <a:extLst>
               <a:ext uri="{FF2B5EF4-FFF2-40B4-BE49-F238E27FC236}">
-                <a16:creationId xmlns:a16="http://schemas.microsoft.com/office/drawing/2014/main" id="{455E1979-85C8-413A-BC9A-8475121DAE7B}"/>
+                <a16:creationId xmlns:a16="http://schemas.microsoft.com/office/drawing/2014/main" id="{F2CD7C71-5E47-4A03-BEC1-278C98E4160B}"/>
               </a:ext>
             </a:extLst>
           </p:cNvPr>
@@ -6765,97 +6859,154 @@
         </p:nvSpPr>
         <p:spPr>
           <a:xfrm>
-            <a:off x="838200" y="583660"/>
-            <a:ext cx="10515600" cy="1060314"/>
+            <a:off x="838200" y="345670"/>
+            <a:ext cx="10515600" cy="1325563"/>
           </a:xfrm>
         </p:spPr>
         <p:txBody>
-          <a:bodyPr>
-            <a:normAutofit/>
-          </a:bodyPr>
-          <a:lstStyle/>
-          <a:p>
-            <a:r>
-              <a:rPr lang="en-US" dirty="0"/>
-              <a:t>How To Request for </a:t>
-            </a:r>
-            <a:r>
-              <a:rPr lang="en-US" dirty="0" err="1"/>
-              <a:t>Api</a:t>
-            </a:r>
-            <a:r>
-              <a:rPr lang="en-US" dirty="0"/>
-              <a:t> Key.</a:t>
-            </a:r>
-          </a:p>
-        </p:txBody>
-      </p:sp>
-      <p:sp>
-        <p:nvSpPr>
-          <p:cNvPr id="3" name="Content Placeholder 2">
+          <a:bodyPr/>
+          <a:lstStyle/>
+          <a:p>
+            <a:r>
+              <a:rPr lang="en-US" sz="3600" dirty="0">
+                <a:solidFill>
+                  <a:srgbClr val="D24726"/>
+                </a:solidFill>
+                <a:latin typeface="Segoe UI Light" panose="020B0702040204020203" pitchFamily="34" charset="0"/>
+                <a:cs typeface="Segoe UI" panose="020B0502040204020203" pitchFamily="34" charset="0"/>
+              </a:rPr>
+              <a:t>How</a:t>
+            </a:r>
+            <a:r>
+              <a:rPr lang="en-US" sz="2000" dirty="0">
+                <a:solidFill>
+                  <a:srgbClr val="D24726"/>
+                </a:solidFill>
+                <a:latin typeface="Segoe UI Light" panose="020B0702040204020203" pitchFamily="34" charset="0"/>
+                <a:cs typeface="Segoe UI" panose="020B0502040204020203" pitchFamily="34" charset="0"/>
+              </a:rPr>
+              <a:t> </a:t>
+            </a:r>
+            <a:r>
+              <a:rPr lang="en-US" sz="3600" dirty="0">
+                <a:solidFill>
+                  <a:srgbClr val="D24726"/>
+                </a:solidFill>
+                <a:latin typeface="Segoe UI Light" panose="020B0702040204020203" pitchFamily="34" charset="0"/>
+                <a:cs typeface="Segoe UI" panose="020B0502040204020203" pitchFamily="34" charset="0"/>
+              </a:rPr>
+              <a:t>To Request for API Key</a:t>
+            </a:r>
+          </a:p>
+        </p:txBody>
+      </p:sp>
+      <p:sp>
+        <p:nvSpPr>
+          <p:cNvPr id="5" name="TextBox 4">
             <a:extLst>
               <a:ext uri="{FF2B5EF4-FFF2-40B4-BE49-F238E27FC236}">
-                <a16:creationId xmlns:a16="http://schemas.microsoft.com/office/drawing/2014/main" id="{7764B78C-9E50-4EFD-82BB-24B4D0FDE39A}"/>
+                <a16:creationId xmlns:a16="http://schemas.microsoft.com/office/drawing/2014/main" id="{6772DE96-0820-41E2-83A1-602191135105}"/>
               </a:ext>
             </a:extLst>
           </p:cNvPr>
-          <p:cNvSpPr>
-            <a:spLocks noGrp="1"/>
-          </p:cNvSpPr>
-          <p:nvPr>
-            <p:ph idx="1"/>
-          </p:nvPr>
+          <p:cNvSpPr txBox="1"/>
+          <p:nvPr/>
         </p:nvSpPr>
         <p:spPr>
           <a:xfrm>
-            <a:off x="740923" y="1923002"/>
-            <a:ext cx="10515600" cy="4351338"/>
+            <a:off x="1235413" y="2003898"/>
+            <a:ext cx="8920264" cy="569387"/>
           </a:xfrm>
+          <a:prstGeom prst="rect">
+            <a:avLst/>
+          </a:prstGeom>
+          <a:noFill/>
         </p:spPr>
         <p:txBody>
-          <a:bodyPr/>
-          <a:lstStyle/>
-          <a:p>
-            <a:r>
-              <a:rPr lang="en-US" dirty="0"/>
-              <a:t>Please follow the instruction in embeded document given below.</a:t>
+          <a:bodyPr wrap="square" rtlCol="0">
+            <a:spAutoFit/>
+          </a:bodyPr>
+          <a:lstStyle/>
+          <a:p>
+            <a:pPr marL="285750" indent="-285750">
+              <a:buFont typeface="Wingdings" panose="05000000000000000000" pitchFamily="2" charset="2"/>
+              <a:buChar char="Ø"/>
+            </a:pPr>
+            <a:r>
+              <a:rPr lang="en-US" sz="1300" b="1" dirty="0">
+                <a:solidFill>
+                  <a:schemeClr val="tx1">
+                    <a:lumMod val="65000"/>
+                    <a:lumOff val="35000"/>
+                  </a:schemeClr>
+                </a:solidFill>
+                <a:latin typeface="Segoe UI Semilight" panose="020B0402040204020203" pitchFamily="34" charset="0"/>
+                <a:cs typeface="Segoe UI Semilight" panose="020B0402040204020203" pitchFamily="34" charset="0"/>
+              </a:rPr>
+              <a:t> Please check with the instructions in the embeded document given below.</a:t>
+            </a:r>
+          </a:p>
+          <a:p>
+            <a:endParaRPr lang="en-US" b="1" dirty="0"/>
+          </a:p>
+        </p:txBody>
+      </p:sp>
+      <p:sp>
+        <p:nvSpPr>
+          <p:cNvPr id="6" name="TextBox 5">
+            <a:extLst>
+              <a:ext uri="{FF2B5EF4-FFF2-40B4-BE49-F238E27FC236}">
+                <a16:creationId xmlns:a16="http://schemas.microsoft.com/office/drawing/2014/main" id="{E4CDEC08-6AEF-41F4-ABC0-B89430F7EB9D}"/>
+              </a:ext>
+            </a:extLst>
+          </p:cNvPr>
+          <p:cNvSpPr txBox="1"/>
+          <p:nvPr/>
+        </p:nvSpPr>
+        <p:spPr>
+          <a:xfrm>
+            <a:off x="1439694" y="4309782"/>
+            <a:ext cx="8920264" cy="877163"/>
+          </a:xfrm>
+          <a:prstGeom prst="rect">
+            <a:avLst/>
+          </a:prstGeom>
+          <a:noFill/>
+        </p:spPr>
+        <p:txBody>
+          <a:bodyPr wrap="square" rtlCol="0">
+            <a:spAutoFit/>
+          </a:bodyPr>
+          <a:lstStyle/>
+          <a:p>
+            <a:r>
+              <a:rPr lang="en-US" sz="2000" dirty="0">
+                <a:solidFill>
+                  <a:srgbClr val="D24726"/>
+                </a:solidFill>
+                <a:latin typeface="Segoe UI Light" panose="020B0702040204020203" pitchFamily="34" charset="0"/>
+                <a:ea typeface="+mj-ea"/>
+                <a:cs typeface="Segoe UI" panose="020B0502040204020203" pitchFamily="34" charset="0"/>
+              </a:rPr>
+              <a:t>File Location in Project</a:t>
             </a:r>
           </a:p>
           <a:p>
             <a:endParaRPr lang="en-US" dirty="0"/>
           </a:p>
           <a:p>
-            <a:pPr marL="0" indent="0">
-              <a:buNone/>
-            </a:pPr>
-            <a:r>
-              <a:rPr lang="en-US" dirty="0"/>
-              <a:t> </a:t>
-            </a:r>
-          </a:p>
-          <a:p>
-            <a:endParaRPr lang="en-US" dirty="0"/>
-          </a:p>
-          <a:p>
-            <a:endParaRPr lang="en-US" dirty="0"/>
-          </a:p>
-          <a:p>
-            <a:r>
-              <a:rPr lang="en-US" b="1" dirty="0"/>
-              <a:t>Project Location:</a:t>
-            </a:r>
-          </a:p>
-          <a:p>
-            <a:pPr marL="0" indent="0">
-              <a:buNone/>
-            </a:pPr>
-            <a:r>
-              <a:rPr lang="en-US" b="1" dirty="0"/>
-              <a:t>	</a:t>
-            </a:r>
-            <a:r>
-              <a:rPr lang="en-US" dirty="0"/>
-              <a:t>SoFi_TMDB_API_Project/Test Results/How_To_get_API_Key.pdf</a:t>
+            <a:r>
+              <a:rPr lang="en-US" sz="1300" b="1" dirty="0">
+                <a:solidFill>
+                  <a:schemeClr val="tx1">
+                    <a:lumMod val="65000"/>
+                    <a:lumOff val="35000"/>
+                  </a:schemeClr>
+                </a:solidFill>
+                <a:latin typeface="Segoe UI Semilight" panose="020B0402040204020203" pitchFamily="34" charset="0"/>
+                <a:cs typeface="Segoe UI Semilight" panose="020B0402040204020203" pitchFamily="34" charset="0"/>
+              </a:rPr>
+              <a:t>                         SoFi_TMDB_API_Project/User Manuals/ How_To_get_API_Key Manual</a:t>
             </a:r>
           </a:p>
         </p:txBody>
@@ -6865,7 +7016,7 @@
           <p:cNvPr id="4" name="Object 3">
             <a:extLst>
               <a:ext uri="{FF2B5EF4-FFF2-40B4-BE49-F238E27FC236}">
-                <a16:creationId xmlns:a16="http://schemas.microsoft.com/office/drawing/2014/main" id="{45BA2319-F6C8-4590-92D4-066BE387E9E8}"/>
+                <a16:creationId xmlns:a16="http://schemas.microsoft.com/office/drawing/2014/main" id="{8D7A394B-5F21-466C-A0E4-9AE6931FEB8B}"/>
               </a:ext>
             </a:extLst>
           </p:cNvPr>
@@ -6875,20 +7026,20 @@
           <p:nvPr>
             <p:extLst>
               <p:ext uri="{D42A27DB-BD31-4B8C-83A1-F6EECF244321}">
-                <p14:modId xmlns:p14="http://schemas.microsoft.com/office/powerpoint/2010/main" val="1280066338"/>
+                <p14:modId xmlns:p14="http://schemas.microsoft.com/office/powerpoint/2010/main" val="2061297309"/>
               </p:ext>
             </p:extLst>
           </p:nvPr>
         </p:nvGraphicFramePr>
         <p:xfrm>
-          <a:off x="5084323" y="3148654"/>
-          <a:ext cx="914400" cy="771525"/>
+          <a:off x="3746852" y="2989381"/>
+          <a:ext cx="1574177" cy="1080459"/>
         </p:xfrm>
         <a:graphic>
           <a:graphicData uri="http://schemas.openxmlformats.org/presentationml/2006/ole">
             <mc:AlternateContent xmlns:mc="http://schemas.openxmlformats.org/markup-compatibility/2006">
               <mc:Choice xmlns:v="urn:schemas-microsoft-com:vml" Requires="v">
-                <p:oleObj spid="_x0000_s2051" name="Acrobat Document" showAsIcon="1" r:id="rId3" imgW="914400" imgH="771480" progId="AcroExch.Document.DC">
+                <p:oleObj spid="_x0000_s4100" name="Acrobat Document" showAsIcon="1" r:id="rId3" imgW="914400" imgH="771480" progId="AcroExch.Document.DC">
                   <p:embed/>
                 </p:oleObj>
               </mc:Choice>
@@ -6909,8 +7060,8 @@
                     </p:blipFill>
                     <p:spPr>
                       <a:xfrm>
-                        <a:off x="5084323" y="3148654"/>
-                        <a:ext cx="914400" cy="771525"/>
+                        <a:off x="3746852" y="2989381"/>
+                        <a:ext cx="1574177" cy="1080459"/>
                       </a:xfrm>
                       <a:prstGeom prst="rect">
                         <a:avLst/>
@@ -6926,7 +7077,267 @@
     </p:spTree>
     <p:extLst>
       <p:ext uri="{BB962C8B-B14F-4D97-AF65-F5344CB8AC3E}">
-        <p14:creationId xmlns:p14="http://schemas.microsoft.com/office/powerpoint/2010/main" val="1365438557"/>
+        <p14:creationId xmlns:p14="http://schemas.microsoft.com/office/powerpoint/2010/main" val="3992317665"/>
+      </p:ext>
+    </p:extLst>
+  </p:cSld>
+  <p:clrMapOvr>
+    <a:masterClrMapping/>
+  </p:clrMapOvr>
+</p:sld>
+</file>
+
+<file path=ppt/slides/slide7.xml><?xml version="1.0" encoding="utf-8"?>
+<p:sld xmlns:a="http://schemas.openxmlformats.org/drawingml/2006/main" xmlns:r="http://schemas.openxmlformats.org/officeDocument/2006/relationships" xmlns:p="http://schemas.openxmlformats.org/presentationml/2006/main">
+  <p:cSld>
+    <p:spTree>
+      <p:nvGrpSpPr>
+        <p:cNvPr id="1" name=""/>
+        <p:cNvGrpSpPr/>
+        <p:nvPr/>
+      </p:nvGrpSpPr>
+      <p:grpSpPr>
+        <a:xfrm>
+          <a:off x="0" y="0"/>
+          <a:ext cx="0" cy="0"/>
+          <a:chOff x="0" y="0"/>
+          <a:chExt cx="0" cy="0"/>
+        </a:xfrm>
+      </p:grpSpPr>
+      <p:sp>
+        <p:nvSpPr>
+          <p:cNvPr id="2" name="Title 1">
+            <a:extLst>
+              <a:ext uri="{FF2B5EF4-FFF2-40B4-BE49-F238E27FC236}">
+                <a16:creationId xmlns:a16="http://schemas.microsoft.com/office/drawing/2014/main" id="{F2CD7C71-5E47-4A03-BEC1-278C98E4160B}"/>
+              </a:ext>
+            </a:extLst>
+          </p:cNvPr>
+          <p:cNvSpPr>
+            <a:spLocks noGrp="1"/>
+          </p:cNvSpPr>
+          <p:nvPr>
+            <p:ph type="title"/>
+          </p:nvPr>
+        </p:nvSpPr>
+        <p:spPr>
+          <a:xfrm>
+            <a:off x="838200" y="345670"/>
+            <a:ext cx="10515600" cy="1325563"/>
+          </a:xfrm>
+        </p:spPr>
+        <p:txBody>
+          <a:bodyPr/>
+          <a:lstStyle/>
+          <a:p>
+            <a:r>
+              <a:rPr lang="en-US" sz="3600" dirty="0">
+                <a:solidFill>
+                  <a:srgbClr val="D24726"/>
+                </a:solidFill>
+                <a:latin typeface="Segoe UI Light" panose="020B0702040204020203" pitchFamily="34" charset="0"/>
+                <a:cs typeface="Segoe UI" panose="020B0502040204020203" pitchFamily="34" charset="0"/>
+              </a:rPr>
+              <a:t>How To Clone Project From </a:t>
+            </a:r>
+            <a:r>
+              <a:rPr lang="en-US" sz="3600" dirty="0" err="1">
+                <a:solidFill>
+                  <a:srgbClr val="D24726"/>
+                </a:solidFill>
+                <a:latin typeface="Segoe UI Light" panose="020B0702040204020203" pitchFamily="34" charset="0"/>
+                <a:cs typeface="Segoe UI" panose="020B0502040204020203" pitchFamily="34" charset="0"/>
+              </a:rPr>
+              <a:t>GITHub</a:t>
+            </a:r>
+            <a:endParaRPr lang="en-US" sz="3600" dirty="0">
+              <a:solidFill>
+                <a:srgbClr val="D24726"/>
+              </a:solidFill>
+              <a:latin typeface="Segoe UI Light" panose="020B0702040204020203" pitchFamily="34" charset="0"/>
+              <a:cs typeface="Segoe UI" panose="020B0502040204020203" pitchFamily="34" charset="0"/>
+            </a:endParaRPr>
+          </a:p>
+        </p:txBody>
+      </p:sp>
+      <p:sp>
+        <p:nvSpPr>
+          <p:cNvPr id="5" name="TextBox 4">
+            <a:extLst>
+              <a:ext uri="{FF2B5EF4-FFF2-40B4-BE49-F238E27FC236}">
+                <a16:creationId xmlns:a16="http://schemas.microsoft.com/office/drawing/2014/main" id="{6772DE96-0820-41E2-83A1-602191135105}"/>
+              </a:ext>
+            </a:extLst>
+          </p:cNvPr>
+          <p:cNvSpPr txBox="1"/>
+          <p:nvPr/>
+        </p:nvSpPr>
+        <p:spPr>
+          <a:xfrm>
+            <a:off x="1235413" y="2003898"/>
+            <a:ext cx="8920264" cy="569387"/>
+          </a:xfrm>
+          <a:prstGeom prst="rect">
+            <a:avLst/>
+          </a:prstGeom>
+          <a:noFill/>
+        </p:spPr>
+        <p:txBody>
+          <a:bodyPr wrap="square" rtlCol="0">
+            <a:spAutoFit/>
+          </a:bodyPr>
+          <a:lstStyle/>
+          <a:p>
+            <a:pPr marL="285750" indent="-285750">
+              <a:buFont typeface="Wingdings" panose="05000000000000000000" pitchFamily="2" charset="2"/>
+              <a:buChar char="Ø"/>
+            </a:pPr>
+            <a:r>
+              <a:rPr lang="en-US" sz="1300" b="1" dirty="0">
+                <a:solidFill>
+                  <a:schemeClr val="tx1">
+                    <a:lumMod val="65000"/>
+                    <a:lumOff val="35000"/>
+                  </a:schemeClr>
+                </a:solidFill>
+                <a:latin typeface="Segoe UI Semilight" panose="020B0402040204020203" pitchFamily="34" charset="0"/>
+                <a:cs typeface="Segoe UI Semilight" panose="020B0402040204020203" pitchFamily="34" charset="0"/>
+              </a:rPr>
+              <a:t> Please check with the instructions in the embeded document given below.</a:t>
+            </a:r>
+          </a:p>
+          <a:p>
+            <a:endParaRPr lang="en-US" b="1" dirty="0"/>
+          </a:p>
+        </p:txBody>
+      </p:sp>
+      <p:sp>
+        <p:nvSpPr>
+          <p:cNvPr id="6" name="TextBox 5">
+            <a:extLst>
+              <a:ext uri="{FF2B5EF4-FFF2-40B4-BE49-F238E27FC236}">
+                <a16:creationId xmlns:a16="http://schemas.microsoft.com/office/drawing/2014/main" id="{E4CDEC08-6AEF-41F4-ABC0-B89430F7EB9D}"/>
+              </a:ext>
+            </a:extLst>
+          </p:cNvPr>
+          <p:cNvSpPr txBox="1"/>
+          <p:nvPr/>
+        </p:nvSpPr>
+        <p:spPr>
+          <a:xfrm>
+            <a:off x="1439694" y="4309782"/>
+            <a:ext cx="8920264" cy="877163"/>
+          </a:xfrm>
+          <a:prstGeom prst="rect">
+            <a:avLst/>
+          </a:prstGeom>
+          <a:noFill/>
+        </p:spPr>
+        <p:txBody>
+          <a:bodyPr wrap="square" rtlCol="0">
+            <a:spAutoFit/>
+          </a:bodyPr>
+          <a:lstStyle/>
+          <a:p>
+            <a:r>
+              <a:rPr lang="en-US" sz="2000" dirty="0">
+                <a:solidFill>
+                  <a:srgbClr val="D24726"/>
+                </a:solidFill>
+                <a:latin typeface="Segoe UI Light" panose="020B0702040204020203" pitchFamily="34" charset="0"/>
+                <a:ea typeface="+mj-ea"/>
+                <a:cs typeface="Segoe UI" panose="020B0502040204020203" pitchFamily="34" charset="0"/>
+              </a:rPr>
+              <a:t>File Location in Project</a:t>
+            </a:r>
+          </a:p>
+          <a:p>
+            <a:endParaRPr lang="en-US" dirty="0"/>
+          </a:p>
+          <a:p>
+            <a:r>
+              <a:rPr lang="en-US" sz="1300" b="1" dirty="0">
+                <a:solidFill>
+                  <a:schemeClr val="tx1">
+                    <a:lumMod val="65000"/>
+                    <a:lumOff val="35000"/>
+                  </a:schemeClr>
+                </a:solidFill>
+                <a:latin typeface="Segoe UI Semilight" panose="020B0402040204020203" pitchFamily="34" charset="0"/>
+                <a:cs typeface="Segoe UI Semilight" panose="020B0402040204020203" pitchFamily="34" charset="0"/>
+              </a:rPr>
+              <a:t>                         SoFi_TMDB_API_Project/User Manuals/ How_To_get_API_Key Manual</a:t>
+            </a:r>
+          </a:p>
+        </p:txBody>
+      </p:sp>
+      <p:graphicFrame>
+        <p:nvGraphicFramePr>
+          <p:cNvPr id="3" name="Object 2">
+            <a:extLst>
+              <a:ext uri="{FF2B5EF4-FFF2-40B4-BE49-F238E27FC236}">
+                <a16:creationId xmlns:a16="http://schemas.microsoft.com/office/drawing/2014/main" id="{9CBD8099-8690-47F2-9CCC-F84F101CD937}"/>
+              </a:ext>
+            </a:extLst>
+          </p:cNvPr>
+          <p:cNvGraphicFramePr>
+            <a:graphicFrameLocks noChangeAspect="1"/>
+          </p:cNvGraphicFramePr>
+          <p:nvPr/>
+        </p:nvGraphicFramePr>
+        <p:xfrm>
+          <a:off x="4088860" y="3143099"/>
+          <a:ext cx="1695855" cy="1166256"/>
+        </p:xfrm>
+        <a:graphic>
+          <a:graphicData uri="http://schemas.openxmlformats.org/presentationml/2006/ole">
+            <mc:AlternateContent xmlns:mc="http://schemas.openxmlformats.org/markup-compatibility/2006">
+              <mc:Choice xmlns:v="urn:schemas-microsoft-com:vml" Requires="v">
+                <p:oleObj spid="_x0000_s5123" name="Acrobat Document" showAsIcon="1" r:id="rId3" imgW="914400" imgH="771480" progId="AcroExch.Document.DC">
+                  <p:embed/>
+                </p:oleObj>
+              </mc:Choice>
+              <mc:Fallback>
+                <p:oleObj name="Acrobat Document" showAsIcon="1" r:id="rId3" imgW="914400" imgH="771480" progId="AcroExch.Document.DC">
+                  <p:embed/>
+                  <p:pic>
+                    <p:nvPicPr>
+                      <p:cNvPr id="3" name="Object 2">
+                        <a:extLst>
+                          <a:ext uri="{FF2B5EF4-FFF2-40B4-BE49-F238E27FC236}">
+                            <a16:creationId xmlns:a16="http://schemas.microsoft.com/office/drawing/2014/main" id="{9CBD8099-8690-47F2-9CCC-F84F101CD937}"/>
+                          </a:ext>
+                        </a:extLst>
+                      </p:cNvPr>
+                      <p:cNvPicPr/>
+                      <p:nvPr/>
+                    </p:nvPicPr>
+                    <p:blipFill>
+                      <a:blip r:embed="rId4"/>
+                      <a:stretch>
+                        <a:fillRect/>
+                      </a:stretch>
+                    </p:blipFill>
+                    <p:spPr>
+                      <a:xfrm>
+                        <a:off x="4088860" y="3143099"/>
+                        <a:ext cx="1695855" cy="1166256"/>
+                      </a:xfrm>
+                      <a:prstGeom prst="rect">
+                        <a:avLst/>
+                      </a:prstGeom>
+                    </p:spPr>
+                  </p:pic>
+                </p:oleObj>
+              </mc:Fallback>
+            </mc:AlternateContent>
+          </a:graphicData>
+        </a:graphic>
+      </p:graphicFrame>
+    </p:spTree>
+    <p:extLst>
+      <p:ext uri="{BB962C8B-B14F-4D97-AF65-F5344CB8AC3E}">
+        <p14:creationId xmlns:p14="http://schemas.microsoft.com/office/powerpoint/2010/main" val="252090912"/>
       </p:ext>
     </p:extLst>
   </p:cSld>

</xml_diff>

<commit_message>
New Files are added in the Project
</commit_message>
<xml_diff>
--- a/SoFi TMDB Api Project User Guide.pptx
+++ b/SoFi TMDB Api Project User Guide.pptx
@@ -6,7 +6,7 @@
     <p:sldMasterId id="2147483660" r:id="rId2"/>
   </p:sldMasterIdLst>
   <p:notesMasterIdLst>
-    <p:notesMasterId r:id="rId10"/>
+    <p:notesMasterId r:id="rId11"/>
   </p:notesMasterIdLst>
   <p:sldIdLst>
     <p:sldId id="257" r:id="rId3"/>
@@ -16,6 +16,7 @@
     <p:sldId id="265" r:id="rId7"/>
     <p:sldId id="267" r:id="rId8"/>
     <p:sldId id="268" r:id="rId9"/>
+    <p:sldId id="269" r:id="rId10"/>
   </p:sldIdLst>
   <p:sldSz cx="12192000" cy="6858000"/>
   <p:notesSz cx="6858000" cy="9144000"/>
@@ -6776,7 +6777,7 @@
           <a:graphicData uri="http://schemas.openxmlformats.org/presentationml/2006/ole">
             <mc:AlternateContent xmlns:mc="http://schemas.openxmlformats.org/markup-compatibility/2006">
               <mc:Choice xmlns:v="urn:schemas-microsoft-com:vml" Requires="v">
-                <p:oleObj spid="_x0000_s3076" name="Acrobat Document" showAsIcon="1" r:id="rId4" imgW="914400" imgH="771480" progId="AcroExch.Document.DC">
+                <p:oleObj spid="_x0000_s3078" name="Acrobat Document" showAsIcon="1" r:id="rId4" imgW="914400" imgH="771480" progId="AcroExch.Document.DC">
                   <p:embed/>
                 </p:oleObj>
               </mc:Choice>
@@ -7039,7 +7040,7 @@
           <a:graphicData uri="http://schemas.openxmlformats.org/presentationml/2006/ole">
             <mc:AlternateContent xmlns:mc="http://schemas.openxmlformats.org/markup-compatibility/2006">
               <mc:Choice xmlns:v="urn:schemas-microsoft-com:vml" Requires="v">
-                <p:oleObj spid="_x0000_s4100" name="Acrobat Document" showAsIcon="1" r:id="rId3" imgW="914400" imgH="771480" progId="AcroExch.Document.DC">
+                <p:oleObj spid="_x0000_s4102" name="Acrobat Document" showAsIcon="1" r:id="rId3" imgW="914400" imgH="771480" progId="AcroExch.Document.DC">
                   <p:embed/>
                 </p:oleObj>
               </mc:Choice>
@@ -7138,25 +7139,8 @@
                 <a:latin typeface="Segoe UI Light" panose="020B0702040204020203" pitchFamily="34" charset="0"/>
                 <a:cs typeface="Segoe UI" panose="020B0502040204020203" pitchFamily="34" charset="0"/>
               </a:rPr>
-              <a:t>How To Clone Project From </a:t>
-            </a:r>
-            <a:r>
-              <a:rPr lang="en-US" sz="3600" dirty="0" err="1">
-                <a:solidFill>
-                  <a:srgbClr val="D24726"/>
-                </a:solidFill>
-                <a:latin typeface="Segoe UI Light" panose="020B0702040204020203" pitchFamily="34" charset="0"/>
-                <a:cs typeface="Segoe UI" panose="020B0502040204020203" pitchFamily="34" charset="0"/>
-              </a:rPr>
-              <a:t>GITHub</a:t>
-            </a:r>
-            <a:endParaRPr lang="en-US" sz="3600" dirty="0">
-              <a:solidFill>
-                <a:srgbClr val="D24726"/>
-              </a:solidFill>
-              <a:latin typeface="Segoe UI Light" panose="020B0702040204020203" pitchFamily="34" charset="0"/>
-              <a:cs typeface="Segoe UI" panose="020B0502040204020203" pitchFamily="34" charset="0"/>
-            </a:endParaRPr>
+              <a:t>How To Clone Project From GitHub</a:t>
+            </a:r>
           </a:p>
         </p:txBody>
       </p:sp>
@@ -7226,7 +7210,7 @@
         <p:spPr>
           <a:xfrm>
             <a:off x="1439694" y="4309782"/>
-            <a:ext cx="8920264" cy="877163"/>
+            <a:ext cx="8920264" cy="1184940"/>
           </a:xfrm>
           <a:prstGeom prst="rect">
             <a:avLst/>
@@ -7238,6 +7222,16 @@
             <a:spAutoFit/>
           </a:bodyPr>
           <a:lstStyle/>
+          <a:p>
+            <a:endParaRPr lang="en-US" sz="2000" dirty="0">
+              <a:solidFill>
+                <a:srgbClr val="D24726"/>
+              </a:solidFill>
+              <a:latin typeface="Segoe UI Light" panose="020B0702040204020203" pitchFamily="34" charset="0"/>
+              <a:ea typeface="+mj-ea"/>
+              <a:cs typeface="Segoe UI" panose="020B0502040204020203" pitchFamily="34" charset="0"/>
+            </a:endParaRPr>
+          </a:p>
           <a:p>
             <a:r>
               <a:rPr lang="en-US" sz="2000" dirty="0">
@@ -7266,34 +7260,66 @@
                 <a:latin typeface="Segoe UI Semilight" panose="020B0402040204020203" pitchFamily="34" charset="0"/>
                 <a:cs typeface="Segoe UI Semilight" panose="020B0402040204020203" pitchFamily="34" charset="0"/>
               </a:rPr>
-              <a:t>                         SoFi_TMDB_API_Project/User Manuals/ How_To_get_API_Key Manual</a:t>
+              <a:t>                         SoFi_TMDB_API_Project/User Manuals/ How To Clone Project From </a:t>
+            </a:r>
+            <a:r>
+              <a:rPr lang="en-US" sz="1300" b="1" dirty="0" err="1">
+                <a:solidFill>
+                  <a:schemeClr val="tx1">
+                    <a:lumMod val="65000"/>
+                    <a:lumOff val="35000"/>
+                  </a:schemeClr>
+                </a:solidFill>
+                <a:latin typeface="Segoe UI Semilight" panose="020B0402040204020203" pitchFamily="34" charset="0"/>
+                <a:cs typeface="Segoe UI Semilight" panose="020B0402040204020203" pitchFamily="34" charset="0"/>
+              </a:rPr>
+              <a:t>Github</a:t>
+            </a:r>
+            <a:r>
+              <a:rPr lang="en-US" sz="1300" b="1" dirty="0">
+                <a:solidFill>
+                  <a:schemeClr val="tx1">
+                    <a:lumMod val="65000"/>
+                    <a:lumOff val="35000"/>
+                  </a:schemeClr>
+                </a:solidFill>
+                <a:latin typeface="Segoe UI Semilight" panose="020B0402040204020203" pitchFamily="34" charset="0"/>
+                <a:cs typeface="Segoe UI Semilight" panose="020B0402040204020203" pitchFamily="34" charset="0"/>
+              </a:rPr>
+              <a:t> Manual.pdf</a:t>
             </a:r>
           </a:p>
         </p:txBody>
       </p:sp>
       <p:graphicFrame>
         <p:nvGraphicFramePr>
-          <p:cNvPr id="3" name="Object 2">
+          <p:cNvPr id="4" name="Object 3">
             <a:extLst>
               <a:ext uri="{FF2B5EF4-FFF2-40B4-BE49-F238E27FC236}">
-                <a16:creationId xmlns:a16="http://schemas.microsoft.com/office/drawing/2014/main" id="{9CBD8099-8690-47F2-9CCC-F84F101CD937}"/>
+                <a16:creationId xmlns:a16="http://schemas.microsoft.com/office/drawing/2014/main" id="{32F8B25F-730E-4449-8738-2853179C0506}"/>
               </a:ext>
             </a:extLst>
           </p:cNvPr>
           <p:cNvGraphicFramePr>
             <a:graphicFrameLocks noChangeAspect="1"/>
           </p:cNvGraphicFramePr>
-          <p:nvPr/>
+          <p:nvPr>
+            <p:extLst>
+              <p:ext uri="{D42A27DB-BD31-4B8C-83A1-F6EECF244321}">
+                <p14:modId xmlns:p14="http://schemas.microsoft.com/office/powerpoint/2010/main" val="673621042"/>
+              </p:ext>
+            </p:extLst>
+          </p:nvPr>
         </p:nvGraphicFramePr>
         <p:xfrm>
-          <a:off x="4088860" y="3143099"/>
-          <a:ext cx="1695855" cy="1166256"/>
+          <a:off x="3803178" y="2811294"/>
+          <a:ext cx="2743537" cy="1411372"/>
         </p:xfrm>
         <a:graphic>
           <a:graphicData uri="http://schemas.openxmlformats.org/presentationml/2006/ole">
             <mc:AlternateContent xmlns:mc="http://schemas.openxmlformats.org/markup-compatibility/2006">
               <mc:Choice xmlns:v="urn:schemas-microsoft-com:vml" Requires="v">
-                <p:oleObj spid="_x0000_s5123" name="Acrobat Document" showAsIcon="1" r:id="rId3" imgW="914400" imgH="771480" progId="AcroExch.Document.DC">
+                <p:oleObj spid="_x0000_s5125" name="Acrobat Document" showAsIcon="1" r:id="rId3" imgW="914400" imgH="771480" progId="AcroExch.Document.DC">
                   <p:embed/>
                 </p:oleObj>
               </mc:Choice>
@@ -7302,13 +7328,7 @@
                   <p:embed/>
                   <p:pic>
                     <p:nvPicPr>
-                      <p:cNvPr id="3" name="Object 2">
-                        <a:extLst>
-                          <a:ext uri="{FF2B5EF4-FFF2-40B4-BE49-F238E27FC236}">
-                            <a16:creationId xmlns:a16="http://schemas.microsoft.com/office/drawing/2014/main" id="{9CBD8099-8690-47F2-9CCC-F84F101CD937}"/>
-                          </a:ext>
-                        </a:extLst>
-                      </p:cNvPr>
+                      <p:cNvPr id="0" name=""/>
                       <p:cNvPicPr/>
                       <p:nvPr/>
                     </p:nvPicPr>
@@ -7320,8 +7340,8 @@
                     </p:blipFill>
                     <p:spPr>
                       <a:xfrm>
-                        <a:off x="4088860" y="3143099"/>
-                        <a:ext cx="1695855" cy="1166256"/>
+                        <a:off x="3803178" y="2811294"/>
+                        <a:ext cx="2743537" cy="1411372"/>
                       </a:xfrm>
                       <a:prstGeom prst="rect">
                         <a:avLst/>
@@ -7338,6 +7358,198 @@
     <p:extLst>
       <p:ext uri="{BB962C8B-B14F-4D97-AF65-F5344CB8AC3E}">
         <p14:creationId xmlns:p14="http://schemas.microsoft.com/office/powerpoint/2010/main" val="252090912"/>
+      </p:ext>
+    </p:extLst>
+  </p:cSld>
+  <p:clrMapOvr>
+    <a:masterClrMapping/>
+  </p:clrMapOvr>
+</p:sld>
+</file>
+
+<file path=ppt/slides/slide8.xml><?xml version="1.0" encoding="utf-8"?>
+<p:sld xmlns:a="http://schemas.openxmlformats.org/drawingml/2006/main" xmlns:r="http://schemas.openxmlformats.org/officeDocument/2006/relationships" xmlns:p="http://schemas.openxmlformats.org/presentationml/2006/main">
+  <p:cSld>
+    <p:spTree>
+      <p:nvGrpSpPr>
+        <p:cNvPr id="1" name=""/>
+        <p:cNvGrpSpPr/>
+        <p:nvPr/>
+      </p:nvGrpSpPr>
+      <p:grpSpPr>
+        <a:xfrm>
+          <a:off x="0" y="0"/>
+          <a:ext cx="0" cy="0"/>
+          <a:chOff x="0" y="0"/>
+          <a:chExt cx="0" cy="0"/>
+        </a:xfrm>
+      </p:grpSpPr>
+      <p:sp>
+        <p:nvSpPr>
+          <p:cNvPr id="2" name="Title 1">
+            <a:extLst>
+              <a:ext uri="{FF2B5EF4-FFF2-40B4-BE49-F238E27FC236}">
+                <a16:creationId xmlns:a16="http://schemas.microsoft.com/office/drawing/2014/main" id="{F2CD7C71-5E47-4A03-BEC1-278C98E4160B}"/>
+              </a:ext>
+            </a:extLst>
+          </p:cNvPr>
+          <p:cNvSpPr>
+            <a:spLocks noGrp="1"/>
+          </p:cNvSpPr>
+          <p:nvPr>
+            <p:ph type="title"/>
+          </p:nvPr>
+        </p:nvSpPr>
+        <p:spPr>
+          <a:xfrm>
+            <a:off x="223737" y="345670"/>
+            <a:ext cx="11624552" cy="1325563"/>
+          </a:xfrm>
+        </p:spPr>
+        <p:txBody>
+          <a:bodyPr>
+            <a:normAutofit/>
+          </a:bodyPr>
+          <a:lstStyle/>
+          <a:p>
+            <a:r>
+              <a:rPr lang="en-US" sz="3600" dirty="0">
+                <a:solidFill>
+                  <a:srgbClr val="D24726"/>
+                </a:solidFill>
+                <a:latin typeface="Segoe UI Light" panose="020B0702040204020203" pitchFamily="34" charset="0"/>
+                <a:cs typeface="Segoe UI" panose="020B0502040204020203" pitchFamily="34" charset="0"/>
+              </a:rPr>
+              <a:t>How To Import Composite Project to Your Ready API.</a:t>
+            </a:r>
+          </a:p>
+        </p:txBody>
+      </p:sp>
+      <p:sp>
+        <p:nvSpPr>
+          <p:cNvPr id="5" name="TextBox 4">
+            <a:extLst>
+              <a:ext uri="{FF2B5EF4-FFF2-40B4-BE49-F238E27FC236}">
+                <a16:creationId xmlns:a16="http://schemas.microsoft.com/office/drawing/2014/main" id="{6772DE96-0820-41E2-83A1-602191135105}"/>
+              </a:ext>
+            </a:extLst>
+          </p:cNvPr>
+          <p:cNvSpPr txBox="1"/>
+          <p:nvPr/>
+        </p:nvSpPr>
+        <p:spPr>
+          <a:xfrm>
+            <a:off x="1235413" y="2003898"/>
+            <a:ext cx="8920264" cy="569387"/>
+          </a:xfrm>
+          <a:prstGeom prst="rect">
+            <a:avLst/>
+          </a:prstGeom>
+          <a:noFill/>
+        </p:spPr>
+        <p:txBody>
+          <a:bodyPr wrap="square" rtlCol="0">
+            <a:spAutoFit/>
+          </a:bodyPr>
+          <a:lstStyle/>
+          <a:p>
+            <a:pPr marL="285750" indent="-285750">
+              <a:buFont typeface="Wingdings" panose="05000000000000000000" pitchFamily="2" charset="2"/>
+              <a:buChar char="Ø"/>
+            </a:pPr>
+            <a:r>
+              <a:rPr lang="en-US" sz="1300" b="1" dirty="0">
+                <a:solidFill>
+                  <a:schemeClr val="tx1">
+                    <a:lumMod val="65000"/>
+                    <a:lumOff val="35000"/>
+                  </a:schemeClr>
+                </a:solidFill>
+                <a:latin typeface="Segoe UI Semilight" panose="020B0402040204020203" pitchFamily="34" charset="0"/>
+                <a:cs typeface="Segoe UI Semilight" panose="020B0402040204020203" pitchFamily="34" charset="0"/>
+              </a:rPr>
+              <a:t> Please check with the instructions in the embeded document given below.</a:t>
+            </a:r>
+          </a:p>
+          <a:p>
+            <a:endParaRPr lang="en-US" b="1" dirty="0"/>
+          </a:p>
+        </p:txBody>
+      </p:sp>
+      <p:sp>
+        <p:nvSpPr>
+          <p:cNvPr id="6" name="TextBox 5">
+            <a:extLst>
+              <a:ext uri="{FF2B5EF4-FFF2-40B4-BE49-F238E27FC236}">
+                <a16:creationId xmlns:a16="http://schemas.microsoft.com/office/drawing/2014/main" id="{E4CDEC08-6AEF-41F4-ABC0-B89430F7EB9D}"/>
+              </a:ext>
+            </a:extLst>
+          </p:cNvPr>
+          <p:cNvSpPr txBox="1"/>
+          <p:nvPr/>
+        </p:nvSpPr>
+        <p:spPr>
+          <a:xfrm>
+            <a:off x="1439694" y="4309782"/>
+            <a:ext cx="8920264" cy="1184940"/>
+          </a:xfrm>
+          <a:prstGeom prst="rect">
+            <a:avLst/>
+          </a:prstGeom>
+          <a:noFill/>
+        </p:spPr>
+        <p:txBody>
+          <a:bodyPr wrap="square" rtlCol="0">
+            <a:spAutoFit/>
+          </a:bodyPr>
+          <a:lstStyle/>
+          <a:p>
+            <a:endParaRPr lang="en-US" sz="2000" dirty="0">
+              <a:solidFill>
+                <a:srgbClr val="D24726"/>
+              </a:solidFill>
+              <a:latin typeface="Segoe UI Light" panose="020B0702040204020203" pitchFamily="34" charset="0"/>
+              <a:ea typeface="+mj-ea"/>
+              <a:cs typeface="Segoe UI" panose="020B0502040204020203" pitchFamily="34" charset="0"/>
+            </a:endParaRPr>
+          </a:p>
+          <a:p>
+            <a:r>
+              <a:rPr lang="en-US" sz="2000" dirty="0">
+                <a:solidFill>
+                  <a:srgbClr val="D24726"/>
+                </a:solidFill>
+                <a:latin typeface="Segoe UI Light" panose="020B0702040204020203" pitchFamily="34" charset="0"/>
+                <a:ea typeface="+mj-ea"/>
+                <a:cs typeface="Segoe UI" panose="020B0502040204020203" pitchFamily="34" charset="0"/>
+              </a:rPr>
+              <a:t>File Location in Project</a:t>
+            </a:r>
+          </a:p>
+          <a:p>
+            <a:endParaRPr lang="en-US" dirty="0"/>
+          </a:p>
+          <a:p>
+            <a:r>
+              <a:rPr lang="en-US" sz="1300" b="1" dirty="0">
+                <a:solidFill>
+                  <a:schemeClr val="tx1">
+                    <a:lumMod val="65000"/>
+                    <a:lumOff val="35000"/>
+                  </a:schemeClr>
+                </a:solidFill>
+                <a:latin typeface="Segoe UI Semilight" panose="020B0402040204020203" pitchFamily="34" charset="0"/>
+                <a:cs typeface="Segoe UI Semilight" panose="020B0402040204020203" pitchFamily="34" charset="0"/>
+              </a:rPr>
+              <a:t>                         SoFi_TMDB_API_Project/User Manuals/ How To Clone Project From GitHub Manual.pdf</a:t>
+            </a:r>
+          </a:p>
+        </p:txBody>
+      </p:sp>
+    </p:spTree>
+    <p:extLst>
+      <p:ext uri="{BB962C8B-B14F-4D97-AF65-F5344CB8AC3E}">
+        <p14:creationId xmlns:p14="http://schemas.microsoft.com/office/powerpoint/2010/main" val="3007977518"/>
       </p:ext>
     </p:extLst>
   </p:cSld>

</xml_diff>